<commit_message>
Creating Stochastic Modelling Notebook
- + fixed but in SampleApproach that initialized seeds poorly
</commit_message>
<xml_diff>
--- a/docs/Intro to fmdtools.pptx
+++ b/docs/Intro to fmdtools.pptx
@@ -242,7 +242,7 @@
           <a:p>
             <a:fld id="{711A52A6-9D8E-41FC-9651-78B3E515F872}" type="datetimeFigureOut">
               <a:rPr lang="en-US" smtClean="0"/>
-              <a:t>12/28/2021</a:t>
+              <a:t>12/29/2021</a:t>
             </a:fld>
             <a:endParaRPr lang="en-US"/>
           </a:p>
@@ -669,7 +669,7 @@
           <a:p>
             <a:fld id="{77F775AD-3704-4F98-A581-F4E052B5E341}" type="datetime1">
               <a:rPr lang="en-US" smtClean="0"/>
-              <a:t>12/28/2021</a:t>
+              <a:t>12/29/2021</a:t>
             </a:fld>
             <a:endParaRPr lang="en-US" dirty="0"/>
           </a:p>
@@ -918,7 +918,7 @@
           <a:p>
             <a:fld id="{B49B97F0-8049-4B63-9B9F-B08800B08AEA}" type="datetime1">
               <a:rPr lang="en-US" smtClean="0"/>
-              <a:t>12/28/2021</a:t>
+              <a:t>12/29/2021</a:t>
             </a:fld>
             <a:endParaRPr lang="en-US"/>
           </a:p>
@@ -1158,7 +1158,7 @@
           <a:p>
             <a:fld id="{76BB3555-78C2-4894-951A-9F28C24107FA}" type="datetime1">
               <a:rPr lang="en-US" smtClean="0"/>
-              <a:t>12/28/2021</a:t>
+              <a:t>12/29/2021</a:t>
             </a:fld>
             <a:endParaRPr lang="en-US"/>
           </a:p>
@@ -1388,7 +1388,7 @@
           <a:p>
             <a:fld id="{37A4B9B3-CD86-4259-A27A-F9B9C6081119}" type="datetime1">
               <a:rPr lang="en-US" smtClean="0"/>
-              <a:t>12/28/2021</a:t>
+              <a:t>12/29/2021</a:t>
             </a:fld>
             <a:endParaRPr lang="en-US"/>
           </a:p>
@@ -1666,7 +1666,7 @@
           <a:p>
             <a:fld id="{66287512-E62E-4968-99B9-D028D358C1D6}" type="datetime1">
               <a:rPr lang="en-US" smtClean="0"/>
-              <a:t>12/28/2021</a:t>
+              <a:t>12/29/2021</a:t>
             </a:fld>
             <a:endParaRPr lang="en-US"/>
           </a:p>
@@ -1989,7 +1989,7 @@
           <a:p>
             <a:fld id="{356AD7E7-9EE9-4D28-82A7-0AE338FFEED9}" type="datetime1">
               <a:rPr lang="en-US" smtClean="0"/>
-              <a:t>12/28/2021</a:t>
+              <a:t>12/29/2021</a:t>
             </a:fld>
             <a:endParaRPr lang="en-US"/>
           </a:p>
@@ -2463,7 +2463,7 @@
           <a:p>
             <a:fld id="{0B5CD5E0-6150-412F-8881-52709F06EC3B}" type="datetime1">
               <a:rPr lang="en-US" smtClean="0"/>
-              <a:t>12/28/2021</a:t>
+              <a:t>12/29/2021</a:t>
             </a:fld>
             <a:endParaRPr lang="en-US"/>
           </a:p>
@@ -2610,7 +2610,7 @@
           <a:p>
             <a:fld id="{9428AFA3-5281-4B53-8B8B-8FD665A2F0D7}" type="datetime1">
               <a:rPr lang="en-US" smtClean="0"/>
-              <a:t>12/28/2021</a:t>
+              <a:t>12/29/2021</a:t>
             </a:fld>
             <a:endParaRPr lang="en-US"/>
           </a:p>
@@ -2723,7 +2723,7 @@
           <a:p>
             <a:fld id="{556D1394-26AC-45DA-9E25-AB3CC25C7422}" type="datetime1">
               <a:rPr lang="en-US" smtClean="0"/>
-              <a:t>12/28/2021</a:t>
+              <a:t>12/29/2021</a:t>
             </a:fld>
             <a:endParaRPr lang="en-US"/>
           </a:p>
@@ -3048,7 +3048,7 @@
           <a:p>
             <a:fld id="{B641D803-18D9-4B72-95D8-021B736F630F}" type="datetime1">
               <a:rPr lang="en-US" smtClean="0"/>
-              <a:t>12/28/2021</a:t>
+              <a:t>12/29/2021</a:t>
             </a:fld>
             <a:endParaRPr lang="en-US"/>
           </a:p>
@@ -3340,7 +3340,7 @@
           <a:p>
             <a:fld id="{9F82DFCB-4787-4629-B4F0-DCD676BE203A}" type="datetime1">
               <a:rPr lang="en-US" smtClean="0"/>
-              <a:t>12/28/2021</a:t>
+              <a:t>12/29/2021</a:t>
             </a:fld>
             <a:endParaRPr lang="en-US"/>
           </a:p>
@@ -3580,7 +3580,7 @@
           <a:p>
             <a:fld id="{300C2ECC-D91C-40D5-A01C-469FC90F0645}" type="datetime1">
               <a:rPr lang="en-US" smtClean="0"/>
-              <a:t>12/28/2021</a:t>
+              <a:t>12/29/2021</a:t>
             </a:fld>
             <a:endParaRPr lang="en-US" dirty="0"/>
           </a:p>
@@ -4114,7 +4114,7 @@
           <a:p>
             <a:fld id="{4388EDFA-43D4-4D4C-AB0B-BD3EBC9D8CE3}" type="datetime1">
               <a:rPr lang="en-US" smtClean="0"/>
-              <a:t>12/28/2021</a:t>
+              <a:t>12/29/2021</a:t>
             </a:fld>
             <a:endParaRPr lang="en-US" dirty="0"/>
           </a:p>
@@ -4389,7 +4389,7 @@
           <a:p>
             <a:fld id="{A2718D2D-62ED-45AF-A1E2-9E90FD101627}" type="datetime1">
               <a:rPr lang="en-US" smtClean="0"/>
-              <a:t>12/28/2021</a:t>
+              <a:t>12/29/2021</a:t>
             </a:fld>
             <a:endParaRPr lang="en-US"/>
           </a:p>
@@ -4664,7 +4664,7 @@
           <a:p>
             <a:fld id="{C4201A4F-8F78-471A-958F-3ECF60515233}" type="datetime1">
               <a:rPr lang="en-US" smtClean="0"/>
-              <a:t>12/28/2021</a:t>
+              <a:t>12/29/2021</a:t>
             </a:fld>
             <a:endParaRPr lang="en-US"/>
           </a:p>
@@ -5930,7 +5930,7 @@
           <a:p>
             <a:fld id="{816CE958-480F-4C1E-A449-B4E9BBCC4CF8}" type="datetime1">
               <a:rPr lang="en-US" smtClean="0"/>
-              <a:t>12/28/2021</a:t>
+              <a:t>12/29/2021</a:t>
             </a:fld>
             <a:endParaRPr lang="en-US" dirty="0"/>
           </a:p>
@@ -7288,7 +7288,7 @@
           <a:p>
             <a:fld id="{BED2B183-217F-4BC0-B001-BC7C35BF6FFB}" type="datetime1">
               <a:rPr lang="en-US" smtClean="0"/>
-              <a:t>12/28/2021</a:t>
+              <a:t>12/29/2021</a:t>
             </a:fld>
             <a:endParaRPr lang="en-US"/>
           </a:p>
@@ -7492,7 +7492,7 @@
           <a:p>
             <a:fld id="{048BDAAE-0CD4-44CD-8607-E7F59634386A}" type="datetime1">
               <a:rPr lang="en-US" smtClean="0"/>
-              <a:t>12/28/2021</a:t>
+              <a:t>12/29/2021</a:t>
             </a:fld>
             <a:endParaRPr lang="en-US"/>
           </a:p>
@@ -7753,7 +7753,7 @@
           <a:p>
             <a:fld id="{847C5E2A-9CF3-4FC0-AEDE-F8AD112B137F}" type="datetime1">
               <a:rPr lang="en-US" smtClean="0"/>
-              <a:t>12/28/2021</a:t>
+              <a:t>12/29/2021</a:t>
             </a:fld>
             <a:endParaRPr lang="en-US"/>
           </a:p>
@@ -8249,7 +8249,7 @@
           <a:p>
             <a:fld id="{22ECCA47-FB90-4A95-9F47-34504C017D8D}" type="datetime1">
               <a:rPr lang="en-US" smtClean="0"/>
-              <a:t>12/28/2021</a:t>
+              <a:t>12/29/2021</a:t>
             </a:fld>
             <a:endParaRPr lang="en-US"/>
           </a:p>
@@ -10784,7 +10784,7 @@
           <a:p>
             <a:fld id="{325C0C2B-FD52-44F8-A140-1347C757CEDB}" type="datetime1">
               <a:rPr lang="en-US" smtClean="0"/>
-              <a:t>12/28/2021</a:t>
+              <a:t>12/29/2021</a:t>
             </a:fld>
             <a:endParaRPr lang="en-US"/>
           </a:p>
@@ -12191,7 +12191,7 @@
           <a:p>
             <a:fld id="{3B79F06D-C49D-4DB7-865B-71455723119B}" type="datetime1">
               <a:rPr lang="en-US" smtClean="0"/>
-              <a:t>12/28/2021</a:t>
+              <a:t>12/29/2021</a:t>
             </a:fld>
             <a:endParaRPr lang="en-US" dirty="0"/>
           </a:p>
@@ -12919,7 +12919,7 @@
           <a:p>
             <a:fld id="{5B2B2ECE-C27A-4FBC-A5B7-24ADD502157D}" type="datetime1">
               <a:rPr lang="en-US" smtClean="0"/>
-              <a:t>12/28/2021</a:t>
+              <a:t>12/29/2021</a:t>
             </a:fld>
             <a:endParaRPr lang="en-US"/>
           </a:p>
@@ -13210,7 +13210,7 @@
           <a:p>
             <a:fld id="{1731B435-902B-4CAA-9121-DA572BF5E292}" type="datetime1">
               <a:rPr lang="en-US" smtClean="0"/>
-              <a:t>12/28/2021</a:t>
+              <a:t>12/29/2021</a:t>
             </a:fld>
             <a:endParaRPr lang="en-US"/>
           </a:p>
@@ -13906,7 +13906,7 @@
           <a:p>
             <a:fld id="{C8D67213-7DC7-4566-B4E8-39CBEF03CE40}" type="datetime1">
               <a:rPr lang="en-US" smtClean="0"/>
-              <a:t>12/28/2021</a:t>
+              <a:t>12/29/2021</a:t>
             </a:fld>
             <a:endParaRPr lang="en-US"/>
           </a:p>
@@ -14233,7 +14233,7 @@
           <a:p>
             <a:fld id="{7DBF9849-58D3-4F19-9398-5C19541DD8B5}" type="datetime1">
               <a:rPr lang="en-US" smtClean="0"/>
-              <a:t>12/28/2021</a:t>
+              <a:t>12/29/2021</a:t>
             </a:fld>
             <a:endParaRPr lang="en-US"/>
           </a:p>
@@ -15399,8 +15399,8 @@
           </a:p>
         </p:txBody>
       </p:sp>
-      <mc:AlternateContent xmlns:mc="http://schemas.openxmlformats.org/markup-compatibility/2006">
-        <mc:Choice xmlns:a14="http://schemas.microsoft.com/office/drawing/2010/main" Requires="a14">
+      <mc:AlternateContent xmlns:mc="http://schemas.openxmlformats.org/markup-compatibility/2006" xmlns:a14="http://schemas.microsoft.com/office/drawing/2010/main">
+        <mc:Choice Requires="a14">
           <p:sp>
             <p:nvSpPr>
               <p:cNvPr id="28" name="Oval 27">
@@ -15507,7 +15507,7 @@
             </p:txBody>
           </p:sp>
         </mc:Choice>
-        <mc:Fallback>
+        <mc:Fallback xmlns="">
           <p:sp>
             <p:nvSpPr>
               <p:cNvPr id="28" name="Oval 27">
@@ -15621,7 +15621,7 @@
           <a:p>
             <a:fld id="{97B5B71A-C210-4A41-9D4A-E72BF6E30274}" type="datetime1">
               <a:rPr lang="en-US" smtClean="0"/>
-              <a:t>12/28/2021</a:t>
+              <a:t>12/29/2021</a:t>
             </a:fld>
             <a:endParaRPr lang="en-US"/>
           </a:p>
@@ -15804,7 +15804,7 @@
           <a:p>
             <a:fld id="{A3176588-272A-4987-B4C9-924A09E3E482}" type="datetime1">
               <a:rPr lang="en-US" smtClean="0"/>
-              <a:t>12/28/2021</a:t>
+              <a:t>12/29/2021</a:t>
             </a:fld>
             <a:endParaRPr lang="en-US"/>
           </a:p>
@@ -15920,7 +15920,7 @@
           <a:p>
             <a:fld id="{B5436C9C-2E17-4388-95ED-94439EAB1C0F}" type="datetime1">
               <a:rPr lang="en-US" smtClean="0"/>
-              <a:t>12/28/2021</a:t>
+              <a:t>12/29/2021</a:t>
             </a:fld>
             <a:endParaRPr lang="en-US"/>
           </a:p>
@@ -17008,7 +17008,7 @@
           <a:p>
             <a:fld id="{C81BBE4E-96F5-4AD3-882E-48793DD5740D}" type="datetime1">
               <a:rPr lang="en-US" smtClean="0"/>
-              <a:t>12/28/2021</a:t>
+              <a:t>12/29/2021</a:t>
             </a:fld>
             <a:endParaRPr lang="en-US"/>
           </a:p>
@@ -17346,7 +17346,7 @@
           <a:p>
             <a:fld id="{C37500C9-F11F-462E-86AE-DBEE126043CC}" type="datetime1">
               <a:rPr lang="en-US" smtClean="0"/>
-              <a:t>12/28/2021</a:t>
+              <a:t>12/29/2021</a:t>
             </a:fld>
             <a:endParaRPr lang="en-US"/>
           </a:p>
@@ -17462,7 +17462,7 @@
           <a:p>
             <a:fld id="{B5436C9C-2E17-4388-95ED-94439EAB1C0F}" type="datetime1">
               <a:rPr lang="en-US" smtClean="0"/>
-              <a:t>12/28/2021</a:t>
+              <a:t>12/29/2021</a:t>
             </a:fld>
             <a:endParaRPr lang="en-US"/>
           </a:p>
@@ -18808,7 +18808,7 @@
           <a:p>
             <a:fld id="{4D066056-E556-4216-9C89-0D01EBF00A92}" type="datetime1">
               <a:rPr lang="en-US" smtClean="0"/>
-              <a:t>12/28/2021</a:t>
+              <a:t>12/29/2021</a:t>
             </a:fld>
             <a:endParaRPr lang="en-US"/>
           </a:p>
@@ -19753,7 +19753,7 @@
           <a:p>
             <a:fld id="{4D066056-E556-4216-9C89-0D01EBF00A92}" type="datetime1">
               <a:rPr lang="en-US" smtClean="0"/>
-              <a:t>12/28/2021</a:t>
+              <a:t>12/29/2021</a:t>
             </a:fld>
             <a:endParaRPr lang="en-US"/>
           </a:p>
@@ -20406,7 +20406,7 @@
           <a:p>
             <a:fld id="{1731B435-902B-4CAA-9121-DA572BF5E292}" type="datetime1">
               <a:rPr lang="en-US" smtClean="0"/>
-              <a:t>12/28/2021</a:t>
+              <a:t>12/29/2021</a:t>
             </a:fld>
             <a:endParaRPr lang="en-US"/>
           </a:p>
@@ -20645,7 +20645,7 @@
           <a:p>
             <a:fld id="{7E577182-BE1B-4D02-83BE-934CD6168783}" type="datetime1">
               <a:rPr lang="en-US" smtClean="0"/>
-              <a:t>12/28/2021</a:t>
+              <a:t>12/29/2021</a:t>
             </a:fld>
             <a:endParaRPr lang="en-US"/>
           </a:p>
@@ -20812,7 +20812,7 @@
           <a:p>
             <a:fld id="{3F17661D-1C8C-4DAB-9D77-C6D1B8FB4259}" type="datetime1">
               <a:rPr lang="en-US" smtClean="0"/>
-              <a:t>12/28/2021</a:t>
+              <a:t>12/29/2021</a:t>
             </a:fld>
             <a:endParaRPr lang="en-US"/>
           </a:p>
@@ -22733,7 +22733,7 @@
           <a:p>
             <a:fld id="{A6695094-39D8-4D6B-B0E8-E94DC8E8EED8}" type="datetime1">
               <a:rPr lang="en-US" smtClean="0"/>
-              <a:t>12/28/2021</a:t>
+              <a:t>12/29/2021</a:t>
             </a:fld>
             <a:endParaRPr lang="en-US"/>
           </a:p>
@@ -23014,7 +23014,7 @@
           <a:p>
             <a:fld id="{F42917D8-DE2B-4B56-9269-E3946BB7F747}" type="datetime1">
               <a:rPr lang="en-US" smtClean="0"/>
-              <a:t>12/28/2021</a:t>
+              <a:t>12/29/2021</a:t>
             </a:fld>
             <a:endParaRPr lang="en-US"/>
           </a:p>
@@ -23657,7 +23657,7 @@
           <a:p>
             <a:fld id="{2C692DC2-27F8-41E2-A26C-4A5AEAD6F271}" type="datetime1">
               <a:rPr lang="en-US" smtClean="0"/>
-              <a:t>12/28/2021</a:t>
+              <a:t>12/29/2021</a:t>
             </a:fld>
             <a:endParaRPr lang="en-US"/>
           </a:p>
@@ -24308,7 +24308,7 @@
           <a:p>
             <a:fld id="{027C03D3-C4D8-4F82-B3DF-07F42D9AF747}" type="datetime1">
               <a:rPr lang="en-US" smtClean="0"/>
-              <a:t>12/28/2021</a:t>
+              <a:t>12/29/2021</a:t>
             </a:fld>
             <a:endParaRPr lang="en-US"/>
           </a:p>
@@ -24859,7 +24859,7 @@
           <a:p>
             <a:fld id="{2CBDB339-778E-4C7A-9A03-DDF59C39E9F9}" type="datetime1">
               <a:rPr lang="en-US" smtClean="0"/>
-              <a:t>12/28/2021</a:t>
+              <a:t>12/29/2021</a:t>
             </a:fld>
             <a:endParaRPr lang="en-US"/>
           </a:p>
@@ -25058,7 +25058,7 @@
           <a:p>
             <a:fld id="{F2B4AA4E-DFA2-485D-8105-D345E4DF8240}" type="datetime1">
               <a:rPr lang="en-US" smtClean="0"/>
-              <a:t>12/28/2021</a:t>
+              <a:t>12/29/2021</a:t>
             </a:fld>
             <a:endParaRPr lang="en-US"/>
           </a:p>
@@ -25107,7 +25107,7 @@
         </p:nvSpPr>
         <p:spPr>
           <a:xfrm>
-            <a:off x="7829700" y="3173736"/>
+            <a:off x="7826401" y="2089303"/>
             <a:ext cx="3221548" cy="712432"/>
           </a:xfrm>
           <a:prstGeom prst="flowChartProcess">
@@ -25152,7 +25152,7 @@
                   <a:schemeClr val="tx1"/>
                 </a:solidFill>
               </a:rPr>
-              <a:t>9. Stochastic simulation</a:t>
+              <a:t>8. Stochastic Simulation</a:t>
             </a:r>
           </a:p>
           <a:p>
@@ -25179,7 +25179,15 @@
                   <a:schemeClr val="tx1"/>
                 </a:solidFill>
               </a:rPr>
-              <a:t>/</a:t>
+              <a:t>/Stochastic </a:t>
+            </a:r>
+            <a:r>
+              <a:rPr lang="en-US" sz="1400">
+                <a:solidFill>
+                  <a:schemeClr val="tx1"/>
+                </a:solidFill>
+              </a:rPr>
+              <a:t>Modelling.</a:t>
             </a:r>
             <a:r>
               <a:rPr lang="en-US" sz="1400" dirty="0" err="1">
@@ -25187,7 +25195,7 @@
                   <a:schemeClr val="tx1"/>
                 </a:solidFill>
               </a:rPr>
-              <a:t>stoch_example.ipynb</a:t>
+              <a:t>ipynb</a:t>
             </a:r>
             <a:endParaRPr lang="en-US" sz="1400" dirty="0">
               <a:solidFill>
@@ -25916,7 +25924,7 @@
         </p:nvSpPr>
         <p:spPr>
           <a:xfrm>
-            <a:off x="7829699" y="2107497"/>
+            <a:off x="4028624" y="3622580"/>
             <a:ext cx="3221549" cy="712432"/>
           </a:xfrm>
           <a:prstGeom prst="flowChartProcess">
@@ -25961,7 +25969,7 @@
                   <a:schemeClr val="tx1"/>
                 </a:solidFill>
               </a:rPr>
-              <a:t>8. Nominal/Nested Approaches</a:t>
+              <a:t>7. Nominal/Nested Approaches</a:t>
             </a:r>
           </a:p>
           <a:p>
@@ -26012,7 +26020,7 @@
         </p:nvSpPr>
         <p:spPr>
           <a:xfrm>
-            <a:off x="4031924" y="3622580"/>
+            <a:off x="7802397" y="3129022"/>
             <a:ext cx="3221549" cy="737999"/>
           </a:xfrm>
           <a:prstGeom prst="flowChartProcess">
@@ -26057,7 +26065,7 @@
                   <a:schemeClr val="tx1"/>
                 </a:solidFill>
               </a:rPr>
-              <a:t>7. Further Examples</a:t>
+              <a:t>9. Further Examples</a:t>
             </a:r>
           </a:p>
           <a:p>
@@ -26245,7 +26253,7 @@
           <a:p>
             <a:fld id="{37A4B9B3-CD86-4259-A27A-F9B9C6081119}" type="datetime1">
               <a:rPr lang="en-US" smtClean="0"/>
-              <a:t>12/28/2021</a:t>
+              <a:t>12/29/2021</a:t>
             </a:fld>
             <a:endParaRPr lang="en-US"/>
           </a:p>
@@ -27633,7 +27641,7 @@
           <a:p>
             <a:fld id="{97B5B71A-C210-4A41-9D4A-E72BF6E30274}" type="datetime1">
               <a:rPr lang="en-US" smtClean="0"/>
-              <a:t>12/28/2021</a:t>
+              <a:t>12/29/2021</a:t>
             </a:fld>
             <a:endParaRPr lang="en-US"/>
           </a:p>
@@ -30277,7 +30285,7 @@
           <a:p>
             <a:fld id="{4F293EC2-9353-465E-8275-590A21556A4C}" type="datetime1">
               <a:rPr lang="en-US" smtClean="0"/>
-              <a:t>12/28/2021</a:t>
+              <a:t>12/29/2021</a:t>
             </a:fld>
             <a:endParaRPr lang="en-US"/>
           </a:p>
@@ -31900,7 +31908,7 @@
           <a:p>
             <a:fld id="{BFA3C805-31B6-4A11-AAC4-FD0B22218204}" type="datetime1">
               <a:rPr lang="en-US" smtClean="0"/>
-              <a:t>12/28/2021</a:t>
+              <a:t>12/29/2021</a:t>
             </a:fld>
             <a:endParaRPr lang="en-US"/>
           </a:p>
@@ -32136,7 +32144,7 @@
           <a:p>
             <a:fld id="{2EF51449-35FB-44B7-9F78-8BE693FE99B8}" type="datetime1">
               <a:rPr lang="en-US" smtClean="0"/>
-              <a:t>12/28/2021</a:t>
+              <a:t>12/29/2021</a:t>
             </a:fld>
             <a:endParaRPr lang="en-US"/>
           </a:p>
@@ -32336,7 +32344,7 @@
           <a:p>
             <a:fld id="{3CD4156D-2DFA-4CBC-8BBF-D9C396665CA3}" type="datetime1">
               <a:rPr lang="en-US" smtClean="0"/>
-              <a:t>12/28/2021</a:t>
+              <a:t>12/29/2021</a:t>
             </a:fld>
             <a:endParaRPr lang="en-US"/>
           </a:p>
@@ -32460,7 +32468,7 @@
           <a:p>
             <a:fld id="{E8F6B82B-A579-437C-AABB-EF257589C124}" type="datetime1">
               <a:rPr lang="en-US" smtClean="0"/>
-              <a:t>12/28/2021</a:t>
+              <a:t>12/29/2021</a:t>
             </a:fld>
             <a:endParaRPr lang="en-US"/>
           </a:p>
@@ -34496,18 +34504,18 @@
 </file>
 
 <file path=customXml/item2.xml><?xml version="1.0" encoding="utf-8"?>
-<p:properties xmlns:p="http://schemas.microsoft.com/office/2006/metadata/properties" xmlns:xsi="http://www.w3.org/2001/XMLSchema-instance" xmlns:pc="http://schemas.microsoft.com/office/infopath/2007/PartnerControls">
-  <documentManagement/>
-</p:properties>
-</file>
-
-<file path=customXml/item3.xml><?xml version="1.0" encoding="utf-8"?>
 <?mso-contentType ?>
 <FormTemplates xmlns="http://schemas.microsoft.com/sharepoint/v3/contenttype/forms">
   <Display>DocumentLibraryForm</Display>
   <Edit>DocumentLibraryForm</Edit>
   <New>DocumentLibraryForm</New>
 </FormTemplates>
+</file>
+
+<file path=customXml/item3.xml><?xml version="1.0" encoding="utf-8"?>
+<p:properties xmlns:p="http://schemas.microsoft.com/office/2006/metadata/properties" xmlns:xsi="http://www.w3.org/2001/XMLSchema-instance" xmlns:pc="http://schemas.microsoft.com/office/infopath/2007/PartnerControls">
+  <documentManagement/>
+</p:properties>
 </file>
 
 <file path=customXml/itemProps1.xml><?xml version="1.0" encoding="utf-8"?>
@@ -34527,6 +34535,14 @@
 </file>
 
 <file path=customXml/itemProps2.xml><?xml version="1.0" encoding="utf-8"?>
+<ds:datastoreItem xmlns:ds="http://schemas.openxmlformats.org/officeDocument/2006/customXml" ds:itemID="{D3728C9A-7C9B-4A99-A7F5-4857043C7DB3}">
+  <ds:schemaRefs>
+    <ds:schemaRef ds:uri="http://schemas.microsoft.com/sharepoint/v3/contenttype/forms"/>
+  </ds:schemaRefs>
+</ds:datastoreItem>
+</file>
+
+<file path=customXml/itemProps3.xml><?xml version="1.0" encoding="utf-8"?>
 <ds:datastoreItem xmlns:ds="http://schemas.openxmlformats.org/officeDocument/2006/customXml" ds:itemID="{92B7266E-DF44-460A-A16F-F5ABEAF9A56A}">
   <ds:schemaRefs>
     <ds:schemaRef ds:uri="http://purl.org/dc/terms/"/>
@@ -34539,12 +34555,4 @@
     <ds:schemaRef ds:uri="http://www.w3.org/XML/1998/namespace"/>
   </ds:schemaRefs>
 </ds:datastoreItem>
-</file>
-
-<file path=customXml/itemProps3.xml><?xml version="1.0" encoding="utf-8"?>
-<ds:datastoreItem xmlns:ds="http://schemas.openxmlformats.org/officeDocument/2006/customXml" ds:itemID="{D3728C9A-7C9B-4A99-A7F5-4857043C7DB3}">
-  <ds:schemaRefs>
-    <ds:schemaRef ds:uri="http://schemas.microsoft.com/sharepoint/v3/contenttype/forms"/>
-  </ds:schemaRefs>
-</ds:datastoreItem>
 </file>
</xml_diff>

<commit_message>
Updates for v.1.1 patches
- Updating documentation from merge features
- Fixing bugs from documentation in modeldef
</commit_message>
<xml_diff>
--- a/docs/Intro to fmdtools.pptx
+++ b/docs/Intro to fmdtools.pptx
@@ -242,7 +242,7 @@
           <a:p>
             <a:fld id="{711A52A6-9D8E-41FC-9651-78B3E515F872}" type="datetimeFigureOut">
               <a:rPr lang="en-US" smtClean="0"/>
-              <a:t>1/5/2022</a:t>
+              <a:t>4/11/2022</a:t>
             </a:fld>
             <a:endParaRPr lang="en-US"/>
           </a:p>
@@ -669,7 +669,7 @@
           <a:p>
             <a:fld id="{77F775AD-3704-4F98-A581-F4E052B5E341}" type="datetime1">
               <a:rPr lang="en-US" smtClean="0"/>
-              <a:t>1/5/2022</a:t>
+              <a:t>4/11/2022</a:t>
             </a:fld>
             <a:endParaRPr lang="en-US" dirty="0"/>
           </a:p>
@@ -918,7 +918,7 @@
           <a:p>
             <a:fld id="{B49B97F0-8049-4B63-9B9F-B08800B08AEA}" type="datetime1">
               <a:rPr lang="en-US" smtClean="0"/>
-              <a:t>1/5/2022</a:t>
+              <a:t>4/11/2022</a:t>
             </a:fld>
             <a:endParaRPr lang="en-US"/>
           </a:p>
@@ -1158,7 +1158,7 @@
           <a:p>
             <a:fld id="{76BB3555-78C2-4894-951A-9F28C24107FA}" type="datetime1">
               <a:rPr lang="en-US" smtClean="0"/>
-              <a:t>1/5/2022</a:t>
+              <a:t>4/11/2022</a:t>
             </a:fld>
             <a:endParaRPr lang="en-US"/>
           </a:p>
@@ -1388,7 +1388,7 @@
           <a:p>
             <a:fld id="{37A4B9B3-CD86-4259-A27A-F9B9C6081119}" type="datetime1">
               <a:rPr lang="en-US" smtClean="0"/>
-              <a:t>1/5/2022</a:t>
+              <a:t>4/11/2022</a:t>
             </a:fld>
             <a:endParaRPr lang="en-US"/>
           </a:p>
@@ -1666,7 +1666,7 @@
           <a:p>
             <a:fld id="{66287512-E62E-4968-99B9-D028D358C1D6}" type="datetime1">
               <a:rPr lang="en-US" smtClean="0"/>
-              <a:t>1/5/2022</a:t>
+              <a:t>4/11/2022</a:t>
             </a:fld>
             <a:endParaRPr lang="en-US"/>
           </a:p>
@@ -1989,7 +1989,7 @@
           <a:p>
             <a:fld id="{356AD7E7-9EE9-4D28-82A7-0AE338FFEED9}" type="datetime1">
               <a:rPr lang="en-US" smtClean="0"/>
-              <a:t>1/5/2022</a:t>
+              <a:t>4/11/2022</a:t>
             </a:fld>
             <a:endParaRPr lang="en-US"/>
           </a:p>
@@ -2463,7 +2463,7 @@
           <a:p>
             <a:fld id="{0B5CD5E0-6150-412F-8881-52709F06EC3B}" type="datetime1">
               <a:rPr lang="en-US" smtClean="0"/>
-              <a:t>1/5/2022</a:t>
+              <a:t>4/11/2022</a:t>
             </a:fld>
             <a:endParaRPr lang="en-US"/>
           </a:p>
@@ -2610,7 +2610,7 @@
           <a:p>
             <a:fld id="{9428AFA3-5281-4B53-8B8B-8FD665A2F0D7}" type="datetime1">
               <a:rPr lang="en-US" smtClean="0"/>
-              <a:t>1/5/2022</a:t>
+              <a:t>4/11/2022</a:t>
             </a:fld>
             <a:endParaRPr lang="en-US"/>
           </a:p>
@@ -2723,7 +2723,7 @@
           <a:p>
             <a:fld id="{556D1394-26AC-45DA-9E25-AB3CC25C7422}" type="datetime1">
               <a:rPr lang="en-US" smtClean="0"/>
-              <a:t>1/5/2022</a:t>
+              <a:t>4/11/2022</a:t>
             </a:fld>
             <a:endParaRPr lang="en-US"/>
           </a:p>
@@ -3048,7 +3048,7 @@
           <a:p>
             <a:fld id="{B641D803-18D9-4B72-95D8-021B736F630F}" type="datetime1">
               <a:rPr lang="en-US" smtClean="0"/>
-              <a:t>1/5/2022</a:t>
+              <a:t>4/11/2022</a:t>
             </a:fld>
             <a:endParaRPr lang="en-US"/>
           </a:p>
@@ -3340,7 +3340,7 @@
           <a:p>
             <a:fld id="{9F82DFCB-4787-4629-B4F0-DCD676BE203A}" type="datetime1">
               <a:rPr lang="en-US" smtClean="0"/>
-              <a:t>1/5/2022</a:t>
+              <a:t>4/11/2022</a:t>
             </a:fld>
             <a:endParaRPr lang="en-US"/>
           </a:p>
@@ -3580,7 +3580,7 @@
           <a:p>
             <a:fld id="{300C2ECC-D91C-40D5-A01C-469FC90F0645}" type="datetime1">
               <a:rPr lang="en-US" smtClean="0"/>
-              <a:t>1/5/2022</a:t>
+              <a:t>4/11/2022</a:t>
             </a:fld>
             <a:endParaRPr lang="en-US" dirty="0"/>
           </a:p>
@@ -4039,7 +4039,7 @@
           <a:p>
             <a:r>
               <a:rPr lang="en-US" dirty="0"/>
-              <a:t>Version 1.0</a:t>
+              <a:t>Version 1.1</a:t>
             </a:r>
           </a:p>
         </p:txBody>
@@ -4114,7 +4114,7 @@
           <a:p>
             <a:fld id="{4388EDFA-43D4-4D4C-AB0B-BD3EBC9D8CE3}" type="datetime1">
               <a:rPr lang="en-US" smtClean="0"/>
-              <a:t>1/5/2022</a:t>
+              <a:t>4/11/2022</a:t>
             </a:fld>
             <a:endParaRPr lang="en-US" dirty="0"/>
           </a:p>
@@ -4243,7 +4243,7 @@
               <a:rPr lang="en-US" sz="2400" dirty="0">
                 <a:hlinkClick r:id="rId2"/>
               </a:rPr>
-              <a:t>https://github.com/NASA-SW-VnV/fmdtools</a:t>
+              <a:t>https://github.com/nasa/fmdtools</a:t>
             </a:r>
             <a:endParaRPr lang="en-US" sz="2400" dirty="0"/>
           </a:p>
@@ -4389,7 +4389,7 @@
           <a:p>
             <a:fld id="{A2718D2D-62ED-45AF-A1E2-9E90FD101627}" type="datetime1">
               <a:rPr lang="en-US" smtClean="0"/>
-              <a:t>1/5/2022</a:t>
+              <a:t>4/11/2022</a:t>
             </a:fld>
             <a:endParaRPr lang="en-US"/>
           </a:p>
@@ -4583,7 +4583,7 @@
               <a:rPr lang="en-US" sz="2400" dirty="0">
                 <a:hlinkClick r:id="rId3"/>
               </a:rPr>
-              <a:t>https://github.com/NASA-SW-VnV/fmdtools</a:t>
+              <a:t>https://github.com/nasa/fmdtools</a:t>
             </a:r>
             <a:endParaRPr lang="en-US" dirty="0"/>
           </a:p>
@@ -4664,7 +4664,7 @@
           <a:p>
             <a:fld id="{C4201A4F-8F78-471A-958F-3ECF60515233}" type="datetime1">
               <a:rPr lang="en-US" smtClean="0"/>
-              <a:t>1/5/2022</a:t>
+              <a:t>4/11/2022</a:t>
             </a:fld>
             <a:endParaRPr lang="en-US"/>
           </a:p>
@@ -5930,7 +5930,7 @@
           <a:p>
             <a:fld id="{816CE958-480F-4C1E-A449-B4E9BBCC4CF8}" type="datetime1">
               <a:rPr lang="en-US" smtClean="0"/>
-              <a:t>1/5/2022</a:t>
+              <a:t>4/11/2022</a:t>
             </a:fld>
             <a:endParaRPr lang="en-US" dirty="0"/>
           </a:p>
@@ -6444,7 +6444,7 @@
                   <a:schemeClr val="tx1"/>
                 </a:solidFill>
               </a:rPr>
-              <a:t>plot.mdlhistvals</a:t>
+              <a:t>plot.mdlhists</a:t>
             </a:r>
             <a:r>
               <a:rPr lang="en-US" dirty="0">
@@ -7288,7 +7288,7 @@
           <a:p>
             <a:fld id="{BED2B183-217F-4BC0-B001-BC7C35BF6FFB}" type="datetime1">
               <a:rPr lang="en-US" smtClean="0"/>
-              <a:t>1/5/2022</a:t>
+              <a:t>4/11/2022</a:t>
             </a:fld>
             <a:endParaRPr lang="en-US"/>
           </a:p>
@@ -7492,7 +7492,7 @@
           <a:p>
             <a:fld id="{048BDAAE-0CD4-44CD-8607-E7F59634386A}" type="datetime1">
               <a:rPr lang="en-US" smtClean="0"/>
-              <a:t>1/5/2022</a:t>
+              <a:t>4/11/2022</a:t>
             </a:fld>
             <a:endParaRPr lang="en-US"/>
           </a:p>
@@ -7753,7 +7753,7 @@
           <a:p>
             <a:fld id="{847C5E2A-9CF3-4FC0-AEDE-F8AD112B137F}" type="datetime1">
               <a:rPr lang="en-US" smtClean="0"/>
-              <a:t>1/5/2022</a:t>
+              <a:t>4/11/2022</a:t>
             </a:fld>
             <a:endParaRPr lang="en-US"/>
           </a:p>
@@ -8249,7 +8249,7 @@
           <a:p>
             <a:fld id="{22ECCA47-FB90-4A95-9F47-34504C017D8D}" type="datetime1">
               <a:rPr lang="en-US" smtClean="0"/>
-              <a:t>1/5/2022</a:t>
+              <a:t>4/11/2022</a:t>
             </a:fld>
             <a:endParaRPr lang="en-US"/>
           </a:p>
@@ -10784,7 +10784,7 @@
           <a:p>
             <a:fld id="{325C0C2B-FD52-44F8-A140-1347C757CEDB}" type="datetime1">
               <a:rPr lang="en-US" smtClean="0"/>
-              <a:t>1/5/2022</a:t>
+              <a:t>4/11/2022</a:t>
             </a:fld>
             <a:endParaRPr lang="en-US"/>
           </a:p>
@@ -12191,7 +12191,7 @@
           <a:p>
             <a:fld id="{3B79F06D-C49D-4DB7-865B-71455723119B}" type="datetime1">
               <a:rPr lang="en-US" smtClean="0"/>
-              <a:t>1/5/2022</a:t>
+              <a:t>4/11/2022</a:t>
             </a:fld>
             <a:endParaRPr lang="en-US" dirty="0"/>
           </a:p>
@@ -12919,7 +12919,7 @@
           <a:p>
             <a:fld id="{5B2B2ECE-C27A-4FBC-A5B7-24ADD502157D}" type="datetime1">
               <a:rPr lang="en-US" smtClean="0"/>
-              <a:t>1/5/2022</a:t>
+              <a:t>4/11/2022</a:t>
             </a:fld>
             <a:endParaRPr lang="en-US"/>
           </a:p>
@@ -13210,7 +13210,7 @@
           <a:p>
             <a:fld id="{1731B435-902B-4CAA-9121-DA572BF5E292}" type="datetime1">
               <a:rPr lang="en-US" smtClean="0"/>
-              <a:t>1/5/2022</a:t>
+              <a:t>4/11/2022</a:t>
             </a:fld>
             <a:endParaRPr lang="en-US"/>
           </a:p>
@@ -13906,7 +13906,7 @@
           <a:p>
             <a:fld id="{C8D67213-7DC7-4566-B4E8-39CBEF03CE40}" type="datetime1">
               <a:rPr lang="en-US" smtClean="0"/>
-              <a:t>1/5/2022</a:t>
+              <a:t>4/11/2022</a:t>
             </a:fld>
             <a:endParaRPr lang="en-US"/>
           </a:p>
@@ -14233,7 +14233,7 @@
           <a:p>
             <a:fld id="{7DBF9849-58D3-4F19-9398-5C19541DD8B5}" type="datetime1">
               <a:rPr lang="en-US" smtClean="0"/>
-              <a:t>1/5/2022</a:t>
+              <a:t>4/11/2022</a:t>
             </a:fld>
             <a:endParaRPr lang="en-US"/>
           </a:p>
@@ -15621,7 +15621,7 @@
           <a:p>
             <a:fld id="{97B5B71A-C210-4A41-9D4A-E72BF6E30274}" type="datetime1">
               <a:rPr lang="en-US" smtClean="0"/>
-              <a:t>1/5/2022</a:t>
+              <a:t>4/11/2022</a:t>
             </a:fld>
             <a:endParaRPr lang="en-US"/>
           </a:p>
@@ -15804,7 +15804,7 @@
           <a:p>
             <a:fld id="{A3176588-272A-4987-B4C9-924A09E3E482}" type="datetime1">
               <a:rPr lang="en-US" smtClean="0"/>
-              <a:t>1/5/2022</a:t>
+              <a:t>4/11/2022</a:t>
             </a:fld>
             <a:endParaRPr lang="en-US"/>
           </a:p>
@@ -15920,7 +15920,7 @@
           <a:p>
             <a:fld id="{B5436C9C-2E17-4388-95ED-94439EAB1C0F}" type="datetime1">
               <a:rPr lang="en-US" smtClean="0"/>
-              <a:t>1/5/2022</a:t>
+              <a:t>4/11/2022</a:t>
             </a:fld>
             <a:endParaRPr lang="en-US"/>
           </a:p>
@@ -17008,7 +17008,7 @@
           <a:p>
             <a:fld id="{C81BBE4E-96F5-4AD3-882E-48793DD5740D}" type="datetime1">
               <a:rPr lang="en-US" smtClean="0"/>
-              <a:t>1/5/2022</a:t>
+              <a:t>4/11/2022</a:t>
             </a:fld>
             <a:endParaRPr lang="en-US"/>
           </a:p>
@@ -17346,7 +17346,7 @@
           <a:p>
             <a:fld id="{C37500C9-F11F-462E-86AE-DBEE126043CC}" type="datetime1">
               <a:rPr lang="en-US" smtClean="0"/>
-              <a:t>1/5/2022</a:t>
+              <a:t>4/11/2022</a:t>
             </a:fld>
             <a:endParaRPr lang="en-US"/>
           </a:p>
@@ -17462,7 +17462,7 @@
           <a:p>
             <a:fld id="{B5436C9C-2E17-4388-95ED-94439EAB1C0F}" type="datetime1">
               <a:rPr lang="en-US" smtClean="0"/>
-              <a:t>1/5/2022</a:t>
+              <a:t>4/11/2022</a:t>
             </a:fld>
             <a:endParaRPr lang="en-US"/>
           </a:p>
@@ -17722,7 +17722,7 @@
               <a:rPr lang="en-US" sz="1600" b="1" dirty="0" err="1">
                 <a:latin typeface="Bahnschrift" panose="020B0502040204020203" pitchFamily="34" charset="0"/>
               </a:rPr>
-              <a:t>ominal_approach</a:t>
+              <a:t>nominal_approach</a:t>
             </a:r>
             <a:r>
               <a:rPr lang="en-US" sz="1600" b="1" dirty="0">
@@ -18808,7 +18808,7 @@
           <a:p>
             <a:fld id="{4D066056-E556-4216-9C89-0D01EBF00A92}" type="datetime1">
               <a:rPr lang="en-US" smtClean="0"/>
-              <a:t>1/5/2022</a:t>
+              <a:t>4/11/2022</a:t>
             </a:fld>
             <a:endParaRPr lang="en-US"/>
           </a:p>
@@ -19753,7 +19753,7 @@
           <a:p>
             <a:fld id="{4D066056-E556-4216-9C89-0D01EBF00A92}" type="datetime1">
               <a:rPr lang="en-US" smtClean="0"/>
-              <a:t>1/5/2022</a:t>
+              <a:t>4/11/2022</a:t>
             </a:fld>
             <a:endParaRPr lang="en-US"/>
           </a:p>
@@ -20406,7 +20406,7 @@
           <a:p>
             <a:fld id="{1731B435-902B-4CAA-9121-DA572BF5E292}" type="datetime1">
               <a:rPr lang="en-US" smtClean="0"/>
-              <a:t>1/5/2022</a:t>
+              <a:t>4/11/2022</a:t>
             </a:fld>
             <a:endParaRPr lang="en-US"/>
           </a:p>
@@ -20645,7 +20645,7 @@
           <a:p>
             <a:fld id="{7E577182-BE1B-4D02-83BE-934CD6168783}" type="datetime1">
               <a:rPr lang="en-US" smtClean="0"/>
-              <a:t>1/5/2022</a:t>
+              <a:t>4/11/2022</a:t>
             </a:fld>
             <a:endParaRPr lang="en-US"/>
           </a:p>
@@ -20812,7 +20812,7 @@
           <a:p>
             <a:fld id="{3F17661D-1C8C-4DAB-9D77-C6D1B8FB4259}" type="datetime1">
               <a:rPr lang="en-US" smtClean="0"/>
-              <a:t>1/5/2022</a:t>
+              <a:t>4/11/2022</a:t>
             </a:fld>
             <a:endParaRPr lang="en-US"/>
           </a:p>
@@ -21013,7 +21013,7 @@
         </p:nvSpPr>
         <p:spPr>
           <a:xfrm>
-            <a:off x="3377735" y="5884409"/>
+            <a:off x="3383131" y="5994664"/>
             <a:ext cx="2572305" cy="705320"/>
           </a:xfrm>
           <a:prstGeom prst="flowChartProcess">
@@ -21470,23 +21470,7 @@
                   <a:schemeClr val="tx1"/>
                 </a:solidFill>
               </a:rPr>
-              <a:t>mdlhist</a:t>
-            </a:r>
-            <a:r>
-              <a:rPr lang="en-US" sz="1600" b="1" dirty="0">
-                <a:solidFill>
-                  <a:schemeClr val="tx1"/>
-                </a:solidFill>
-              </a:rPr>
-              <a:t>/s/</a:t>
-            </a:r>
-            <a:r>
-              <a:rPr lang="en-US" sz="1600" b="1" dirty="0" err="1">
-                <a:solidFill>
-                  <a:schemeClr val="tx1"/>
-                </a:solidFill>
-              </a:rPr>
-              <a:t>vals</a:t>
+              <a:t>mdlhists</a:t>
             </a:r>
             <a:r>
               <a:rPr lang="en-US" sz="1600" b="1" dirty="0">
@@ -21751,7 +21735,7 @@
         </p:nvSpPr>
         <p:spPr>
           <a:xfrm>
-            <a:off x="389138" y="1323184"/>
+            <a:off x="389138" y="1310398"/>
             <a:ext cx="2853431" cy="4264016"/>
           </a:xfrm>
           <a:prstGeom prst="flowChartProcess">
@@ -22443,7 +22427,7 @@
         </p:blipFill>
         <p:spPr>
           <a:xfrm>
-            <a:off x="3501280" y="5953942"/>
+            <a:off x="3489715" y="6083866"/>
             <a:ext cx="2359136" cy="538932"/>
           </a:xfrm>
           <a:prstGeom prst="rect">
@@ -22599,8 +22583,8 @@
         </p:nvCxnSpPr>
         <p:spPr>
           <a:xfrm flipH="1">
-            <a:off x="4663888" y="5534816"/>
-            <a:ext cx="5397" cy="349593"/>
+            <a:off x="4669284" y="5534816"/>
+            <a:ext cx="1" cy="459848"/>
           </a:xfrm>
           <a:prstGeom prst="line">
             <a:avLst/>
@@ -22733,7 +22717,7 @@
           <a:p>
             <a:fld id="{A6695094-39D8-4D6B-B0E8-E94DC8E8EED8}" type="datetime1">
               <a:rPr lang="en-US" smtClean="0"/>
-              <a:t>1/5/2022</a:t>
+              <a:t>4/11/2022</a:t>
             </a:fld>
             <a:endParaRPr lang="en-US"/>
           </a:p>
@@ -22768,303 +22752,22 @@
           </a:p>
         </p:txBody>
       </p:sp>
-    </p:spTree>
-    <p:extLst>
-      <p:ext uri="{BB962C8B-B14F-4D97-AF65-F5344CB8AC3E}">
-        <p14:creationId xmlns:p14="http://schemas.microsoft.com/office/powerpoint/2010/main" val="1064696857"/>
-      </p:ext>
-    </p:extLst>
-  </p:cSld>
-  <p:clrMapOvr>
-    <a:masterClrMapping/>
-  </p:clrMapOvr>
-</p:sld>
-</file>
-
-<file path=ppt/slides/slide33.xml><?xml version="1.0" encoding="utf-8"?>
-<p:sld xmlns:a="http://schemas.openxmlformats.org/drawingml/2006/main" xmlns:r="http://schemas.openxmlformats.org/officeDocument/2006/relationships" xmlns:p="http://schemas.openxmlformats.org/presentationml/2006/main">
-  <p:cSld>
-    <p:spTree>
-      <p:nvGrpSpPr>
-        <p:cNvPr id="1" name=""/>
-        <p:cNvGrpSpPr/>
-        <p:nvPr/>
-      </p:nvGrpSpPr>
-      <p:grpSpPr>
-        <a:xfrm>
-          <a:off x="0" y="0"/>
-          <a:ext cx="0" cy="0"/>
-          <a:chOff x="0" y="0"/>
-          <a:chExt cx="0" cy="0"/>
-        </a:xfrm>
-      </p:grpSpPr>
-      <p:sp>
-        <p:nvSpPr>
-          <p:cNvPr id="2" name="Title 1">
-            <a:extLst>
-              <a:ext uri="{FF2B5EF4-FFF2-40B4-BE49-F238E27FC236}">
-                <a16:creationId xmlns:a16="http://schemas.microsoft.com/office/drawing/2014/main" id="{02561039-60D8-4270-86A9-2DED0E29583F}"/>
-              </a:ext>
-            </a:extLst>
-          </p:cNvPr>
-          <p:cNvSpPr>
-            <a:spLocks noGrp="1"/>
-          </p:cNvSpPr>
-          <p:nvPr>
-            <p:ph type="title"/>
-          </p:nvPr>
-        </p:nvSpPr>
-        <p:spPr/>
-        <p:txBody>
-          <a:bodyPr/>
-          <a:lstStyle/>
-          <a:p>
-            <a:r>
-              <a:rPr lang="en-US" dirty="0"/>
-              <a:t>plot.py</a:t>
-            </a:r>
-          </a:p>
-        </p:txBody>
-      </p:sp>
-      <p:pic>
-        <p:nvPicPr>
-          <p:cNvPr id="3" name="Picture 2">
-            <a:extLst>
-              <a:ext uri="{FF2B5EF4-FFF2-40B4-BE49-F238E27FC236}">
-                <a16:creationId xmlns:a16="http://schemas.microsoft.com/office/drawing/2014/main" id="{682DDE72-77AC-4832-8B85-D776A90279B6}"/>
-              </a:ext>
-            </a:extLst>
-          </p:cNvPr>
-          <p:cNvPicPr>
-            <a:picLocks noChangeAspect="1"/>
-          </p:cNvPicPr>
+      <p:sp>
+        <p:nvSpPr>
+          <p:cNvPr id="23" name="Flowchart: Process 22">
+            <a:extLst>
+              <a:ext uri="{FF2B5EF4-FFF2-40B4-BE49-F238E27FC236}">
+                <a16:creationId xmlns:a16="http://schemas.microsoft.com/office/drawing/2014/main" id="{9512BDB7-AD65-4688-B513-C0DE77DBCE39}"/>
+              </a:ext>
+            </a:extLst>
+          </p:cNvPr>
+          <p:cNvSpPr/>
           <p:nvPr/>
-        </p:nvPicPr>
-        <p:blipFill>
-          <a:blip r:embed="rId2"/>
-          <a:stretch>
-            <a:fillRect/>
-          </a:stretch>
-        </p:blipFill>
+        </p:nvSpPr>
         <p:spPr>
           <a:xfrm>
-            <a:off x="4168206" y="1159460"/>
-            <a:ext cx="5623864" cy="3649263"/>
-          </a:xfrm>
-          <a:prstGeom prst="rect">
-            <a:avLst/>
-          </a:prstGeom>
-        </p:spPr>
-      </p:pic>
-      <p:sp>
-        <p:nvSpPr>
-          <p:cNvPr id="6" name="TextBox 5">
-            <a:extLst>
-              <a:ext uri="{FF2B5EF4-FFF2-40B4-BE49-F238E27FC236}">
-                <a16:creationId xmlns:a16="http://schemas.microsoft.com/office/drawing/2014/main" id="{2ED2A948-D17E-4C54-9DFF-051336585E59}"/>
-              </a:ext>
-            </a:extLst>
-          </p:cNvPr>
-          <p:cNvSpPr txBox="1"/>
-          <p:nvPr/>
-        </p:nvSpPr>
-        <p:spPr>
-          <a:xfrm>
-            <a:off x="4082248" y="4808723"/>
-            <a:ext cx="6988206" cy="1477328"/>
-          </a:xfrm>
-          <a:prstGeom prst="rect">
-            <a:avLst/>
-          </a:prstGeom>
-          <a:noFill/>
-        </p:spPr>
-        <p:txBody>
-          <a:bodyPr wrap="square">
-            <a:spAutoFit/>
-          </a:bodyPr>
-          <a:lstStyle/>
-          <a:p>
-            <a:r>
-              <a:rPr lang="en-US" b="1" dirty="0">
-                <a:latin typeface="Bahnschrift" panose="020B0502040204020203" pitchFamily="34" charset="0"/>
-              </a:rPr>
-              <a:t>Example Syntax:</a:t>
-            </a:r>
-          </a:p>
-          <a:p>
-            <a:r>
-              <a:rPr lang="en-US" dirty="0" err="1">
-                <a:latin typeface="Bahnschrift" panose="020B0502040204020203" pitchFamily="34" charset="0"/>
-              </a:rPr>
-              <a:t>rd.plot.mdlhistvals</a:t>
-            </a:r>
-            <a:r>
-              <a:rPr lang="en-US" dirty="0">
-                <a:latin typeface="Bahnschrift" panose="020B0502040204020203" pitchFamily="34" charset="0"/>
-              </a:rPr>
-              <a:t>(</a:t>
-            </a:r>
-            <a:r>
-              <a:rPr lang="en-US" dirty="0" err="1">
-                <a:latin typeface="Bahnschrift" panose="020B0502040204020203" pitchFamily="34" charset="0"/>
-              </a:rPr>
-              <a:t>mdlhist</a:t>
-            </a:r>
-            <a:r>
-              <a:rPr lang="en-US" dirty="0">
-                <a:latin typeface="Bahnschrift" panose="020B0502040204020203" pitchFamily="34" charset="0"/>
-              </a:rPr>
-              <a:t>, ‘</a:t>
-            </a:r>
-            <a:r>
-              <a:rPr lang="en-US" dirty="0" err="1">
-                <a:latin typeface="Bahnschrift" panose="020B0502040204020203" pitchFamily="34" charset="0"/>
-              </a:rPr>
-              <a:t>faultname</a:t>
-            </a:r>
-            <a:r>
-              <a:rPr lang="en-US" dirty="0">
-                <a:latin typeface="Bahnschrift" panose="020B0502040204020203" pitchFamily="34" charset="0"/>
-              </a:rPr>
-              <a:t>’, </a:t>
-            </a:r>
-          </a:p>
-          <a:p>
-            <a:r>
-              <a:rPr lang="en-US" dirty="0">
-                <a:latin typeface="Bahnschrift" panose="020B0502040204020203" pitchFamily="34" charset="0"/>
-              </a:rPr>
-              <a:t>		time=</a:t>
-            </a:r>
-            <a:r>
-              <a:rPr lang="en-US" dirty="0" err="1">
-                <a:latin typeface="Bahnschrift" panose="020B0502040204020203" pitchFamily="34" charset="0"/>
-              </a:rPr>
-              <a:t>faulttime</a:t>
-            </a:r>
-            <a:r>
-              <a:rPr lang="en-US" dirty="0">
-                <a:latin typeface="Bahnschrift" panose="020B0502040204020203" pitchFamily="34" charset="0"/>
-              </a:rPr>
-              <a:t>,</a:t>
-            </a:r>
-          </a:p>
-          <a:p>
-            <a:r>
-              <a:rPr lang="en-US" dirty="0">
-                <a:latin typeface="Bahnschrift" panose="020B0502040204020203" pitchFamily="34" charset="0"/>
-              </a:rPr>
-              <a:t>		</a:t>
-            </a:r>
-            <a:r>
-              <a:rPr lang="en-US" dirty="0" err="1">
-                <a:latin typeface="Bahnschrift" panose="020B0502040204020203" pitchFamily="34" charset="0"/>
-              </a:rPr>
-              <a:t>fxnflowvals</a:t>
-            </a:r>
-            <a:r>
-              <a:rPr lang="en-US" dirty="0">
-                <a:latin typeface="Bahnschrift" panose="020B0502040204020203" pitchFamily="34" charset="0"/>
-              </a:rPr>
-              <a:t>={‘Flow1':[‘val1', ‘val2'],’flow2’:’val1’}, </a:t>
-            </a:r>
-          </a:p>
-          <a:p>
-            <a:r>
-              <a:rPr lang="en-US" dirty="0">
-                <a:latin typeface="Bahnschrift" panose="020B0502040204020203" pitchFamily="34" charset="0"/>
-              </a:rPr>
-              <a:t>		cols=2, </a:t>
-            </a:r>
-            <a:r>
-              <a:rPr lang="en-US" dirty="0" err="1">
-                <a:latin typeface="Bahnschrift" panose="020B0502040204020203" pitchFamily="34" charset="0"/>
-              </a:rPr>
-              <a:t>timelabel</a:t>
-            </a:r>
-            <a:r>
-              <a:rPr lang="en-US" dirty="0">
-                <a:latin typeface="Bahnschrift" panose="020B0502040204020203" pitchFamily="34" charset="0"/>
-              </a:rPr>
-              <a:t>="time (min)")</a:t>
-            </a:r>
-          </a:p>
-        </p:txBody>
-      </p:sp>
-      <p:sp>
-        <p:nvSpPr>
-          <p:cNvPr id="5" name="Date Placeholder 4">
-            <a:extLst>
-              <a:ext uri="{FF2B5EF4-FFF2-40B4-BE49-F238E27FC236}">
-                <a16:creationId xmlns:a16="http://schemas.microsoft.com/office/drawing/2014/main" id="{408F61AE-2A39-407A-AF18-082F28F65E49}"/>
-              </a:ext>
-            </a:extLst>
-          </p:cNvPr>
-          <p:cNvSpPr>
-            <a:spLocks noGrp="1"/>
-          </p:cNvSpPr>
-          <p:nvPr>
-            <p:ph type="dt" sz="half" idx="10"/>
-          </p:nvPr>
-        </p:nvSpPr>
-        <p:spPr/>
-        <p:txBody>
-          <a:bodyPr/>
-          <a:lstStyle/>
-          <a:p>
-            <a:fld id="{F42917D8-DE2B-4B56-9269-E3946BB7F747}" type="datetime1">
-              <a:rPr lang="en-US" smtClean="0"/>
-              <a:t>1/5/2022</a:t>
-            </a:fld>
-            <a:endParaRPr lang="en-US"/>
-          </a:p>
-        </p:txBody>
-      </p:sp>
-      <p:sp>
-        <p:nvSpPr>
-          <p:cNvPr id="7" name="Slide Number Placeholder 6">
-            <a:extLst>
-              <a:ext uri="{FF2B5EF4-FFF2-40B4-BE49-F238E27FC236}">
-                <a16:creationId xmlns:a16="http://schemas.microsoft.com/office/drawing/2014/main" id="{56CDAAF2-4669-4619-8909-0B04FA426572}"/>
-              </a:ext>
-            </a:extLst>
-          </p:cNvPr>
-          <p:cNvSpPr>
-            <a:spLocks noGrp="1"/>
-          </p:cNvSpPr>
-          <p:nvPr>
-            <p:ph type="sldNum" sz="quarter" idx="12"/>
-          </p:nvPr>
-        </p:nvSpPr>
-        <p:spPr/>
-        <p:txBody>
-          <a:bodyPr/>
-          <a:lstStyle/>
-          <a:p>
-            <a:fld id="{7A4D9045-47C6-4ED3-A320-E2DFE9546330}" type="slidenum">
-              <a:rPr lang="en-US" smtClean="0"/>
-              <a:t>33</a:t>
-            </a:fld>
-            <a:endParaRPr lang="en-US" dirty="0"/>
-          </a:p>
-        </p:txBody>
-      </p:sp>
-      <p:sp>
-        <p:nvSpPr>
-          <p:cNvPr id="8" name="Flowchart: Process 7">
-            <a:extLst>
-              <a:ext uri="{FF2B5EF4-FFF2-40B4-BE49-F238E27FC236}">
-                <a16:creationId xmlns:a16="http://schemas.microsoft.com/office/drawing/2014/main" id="{F7363C5E-2395-44AF-98BD-62D1AB528FA8}"/>
-              </a:ext>
-            </a:extLst>
-          </p:cNvPr>
-          <p:cNvSpPr/>
-          <p:nvPr/>
-        </p:nvSpPr>
-        <p:spPr>
-          <a:xfrm>
-            <a:off x="838200" y="1503183"/>
-            <a:ext cx="2853431" cy="4211633"/>
+            <a:off x="3247972" y="1310399"/>
+            <a:ext cx="2853431" cy="4696281"/>
           </a:xfrm>
           <a:prstGeom prst="flowChartProcess">
             <a:avLst/>
@@ -23136,6 +22839,22 @@
                   <a:schemeClr val="tx1"/>
                 </a:solidFill>
               </a:rPr>
+              <a:t>mdlhists</a:t>
+            </a:r>
+            <a:r>
+              <a:rPr lang="en-US" sz="1600" b="1" dirty="0">
+                <a:solidFill>
+                  <a:schemeClr val="tx1"/>
+                </a:solidFill>
+              </a:rPr>
+              <a:t>(</a:t>
+            </a:r>
+            <a:r>
+              <a:rPr lang="en-US" sz="1600" b="1" dirty="0" err="1">
+                <a:solidFill>
+                  <a:schemeClr val="tx1"/>
+                </a:solidFill>
+              </a:rPr>
               <a:t>mdlhist</a:t>
             </a:r>
             <a:r>
@@ -23144,7 +22863,35 @@
                   <a:schemeClr val="tx1"/>
                 </a:solidFill>
               </a:rPr>
-              <a:t>/s/</a:t>
+              <a:t>)</a:t>
+            </a:r>
+            <a:r>
+              <a:rPr lang="en-US" sz="1600" dirty="0">
+                <a:solidFill>
+                  <a:schemeClr val="tx1"/>
+                </a:solidFill>
+              </a:rPr>
+              <a:t>:</a:t>
+            </a:r>
+          </a:p>
+          <a:p>
+            <a:r>
+              <a:rPr lang="en-US" sz="1600" dirty="0">
+                <a:solidFill>
+                  <a:schemeClr val="tx1"/>
+                </a:solidFill>
+              </a:rPr>
+              <a:t>Plots behavior of given states over time in a set of scenarios</a:t>
+            </a:r>
+          </a:p>
+          <a:p>
+            <a:r>
+              <a:rPr lang="en-US" sz="1600" b="1" dirty="0">
+                <a:solidFill>
+                  <a:schemeClr val="tx1"/>
+                </a:solidFill>
+              </a:rPr>
+              <a:t>-</a:t>
             </a:r>
             <a:r>
               <a:rPr lang="en-US" sz="1600" b="1" dirty="0" err="1">
@@ -23152,7 +22899,7 @@
                   <a:schemeClr val="tx1"/>
                 </a:solidFill>
               </a:rPr>
-              <a:t>vals</a:t>
+              <a:t>metric_dist</a:t>
             </a:r>
             <a:r>
               <a:rPr lang="en-US" sz="1600" b="1" dirty="0">
@@ -23160,6 +22907,94 @@
                   <a:schemeClr val="tx1"/>
                 </a:solidFill>
               </a:rPr>
+              <a:t>()/_from():</a:t>
+            </a:r>
+          </a:p>
+          <a:p>
+            <a:r>
+              <a:rPr lang="en-US" sz="1600" dirty="0">
+                <a:solidFill>
+                  <a:schemeClr val="tx1"/>
+                </a:solidFill>
+              </a:rPr>
+              <a:t>Histograms of modelled metrics</a:t>
+            </a:r>
+          </a:p>
+          <a:p>
+            <a:r>
+              <a:rPr lang="en-US" sz="1600" dirty="0">
+                <a:solidFill>
+                  <a:schemeClr val="tx1"/>
+                </a:solidFill>
+              </a:rPr>
+              <a:t>-</a:t>
+            </a:r>
+            <a:r>
+              <a:rPr lang="en-US" sz="1600" b="1" dirty="0" err="1">
+                <a:solidFill>
+                  <a:schemeClr val="tx1"/>
+                </a:solidFill>
+              </a:rPr>
+              <a:t>samplecost</a:t>
+            </a:r>
+            <a:r>
+              <a:rPr lang="en-US" sz="1600" b="1" dirty="0">
+                <a:solidFill>
+                  <a:schemeClr val="tx1"/>
+                </a:solidFill>
+              </a:rPr>
+              <a:t>(app, </a:t>
+            </a:r>
+            <a:r>
+              <a:rPr lang="en-US" sz="1600" b="1" dirty="0" err="1">
+                <a:solidFill>
+                  <a:schemeClr val="tx1"/>
+                </a:solidFill>
+              </a:rPr>
+              <a:t>endclasses</a:t>
+            </a:r>
+            <a:r>
+              <a:rPr lang="en-US" sz="1600" b="1" dirty="0">
+                <a:solidFill>
+                  <a:schemeClr val="tx1"/>
+                </a:solidFill>
+              </a:rPr>
+              <a:t>):</a:t>
+            </a:r>
+          </a:p>
+          <a:p>
+            <a:r>
+              <a:rPr lang="en-US" sz="1600" dirty="0">
+                <a:solidFill>
+                  <a:schemeClr val="tx1"/>
+                </a:solidFill>
+              </a:rPr>
+              <a:t>Cost and rates of a set of faults </a:t>
+            </a:r>
+          </a:p>
+          <a:p>
+            <a:r>
+              <a:rPr lang="en-US" sz="1600" dirty="0">
+                <a:solidFill>
+                  <a:schemeClr val="tx1"/>
+                </a:solidFill>
+              </a:rPr>
+              <a:t>-</a:t>
+            </a:r>
+            <a:r>
+              <a:rPr lang="en-US" sz="1600" b="1" dirty="0" err="1">
+                <a:solidFill>
+                  <a:schemeClr val="tx1"/>
+                </a:solidFill>
+              </a:rPr>
+              <a:t>costovertime</a:t>
+            </a:r>
+            <a:r>
+              <a:rPr lang="en-US" sz="1600" b="1" dirty="0">
+                <a:solidFill>
+                  <a:schemeClr val="tx1"/>
+                </a:solidFill>
+              </a:rPr>
               <a:t>(</a:t>
             </a:r>
             <a:r>
@@ -23168,14 +23003,539 @@
                   <a:schemeClr val="tx1"/>
                 </a:solidFill>
               </a:rPr>
+              <a:t>endclasses,app</a:t>
+            </a:r>
+            <a:r>
+              <a:rPr lang="en-US" sz="1600" b="1" dirty="0">
+                <a:solidFill>
+                  <a:schemeClr val="tx1"/>
+                </a:solidFill>
+              </a:rPr>
+              <a:t>)</a:t>
+            </a:r>
+            <a:r>
+              <a:rPr lang="en-US" sz="1600" dirty="0">
+                <a:solidFill>
+                  <a:schemeClr val="tx1"/>
+                </a:solidFill>
+              </a:rPr>
+              <a:t>:</a:t>
+            </a:r>
+          </a:p>
+          <a:p>
+            <a:r>
+              <a:rPr lang="en-US" sz="1600" dirty="0">
+                <a:solidFill>
+                  <a:schemeClr val="tx1"/>
+                </a:solidFill>
+              </a:rPr>
+              <a:t>Cost of fault modes over time</a:t>
+            </a:r>
+          </a:p>
+          <a:p>
+            <a:r>
+              <a:rPr lang="en-US" sz="1600" b="1" dirty="0">
+                <a:solidFill>
+                  <a:schemeClr val="tx1"/>
+                </a:solidFill>
+              </a:rPr>
+              <a:t>-phases(</a:t>
+            </a:r>
+            <a:r>
+              <a:rPr lang="en-US" sz="1600" b="1" dirty="0" err="1">
+                <a:solidFill>
+                  <a:schemeClr val="tx1"/>
+                </a:solidFill>
+              </a:rPr>
+              <a:t>mdlphases</a:t>
+            </a:r>
+            <a:r>
+              <a:rPr lang="en-US" sz="1600" b="1" dirty="0">
+                <a:solidFill>
+                  <a:schemeClr val="tx1"/>
+                </a:solidFill>
+              </a:rPr>
+              <a:t>)</a:t>
+            </a:r>
+          </a:p>
+          <a:p>
+            <a:r>
+              <a:rPr lang="en-US" sz="1600" dirty="0">
+                <a:solidFill>
+                  <a:schemeClr val="tx1"/>
+                </a:solidFill>
+              </a:rPr>
+              <a:t>Function modes over time.</a:t>
+            </a:r>
+          </a:p>
+          <a:p>
+            <a:r>
+              <a:rPr lang="en-US" sz="1600" b="1" dirty="0">
+                <a:solidFill>
+                  <a:schemeClr val="tx1"/>
+                </a:solidFill>
+              </a:rPr>
+              <a:t>-nominal_vals_1d/2d/3d():</a:t>
+            </a:r>
+          </a:p>
+          <a:p>
+            <a:r>
+              <a:rPr lang="en-US" sz="1600" dirty="0">
+                <a:solidFill>
+                  <a:schemeClr val="tx1"/>
+                </a:solidFill>
+              </a:rPr>
+              <a:t>Simulation metric(s) in terms of input parameters</a:t>
+            </a:r>
+          </a:p>
+          <a:p>
+            <a:r>
+              <a:rPr lang="en-US" sz="1600" b="1" dirty="0">
+                <a:solidFill>
+                  <a:schemeClr val="tx1"/>
+                </a:solidFill>
+              </a:rPr>
+              <a:t>-nom/</a:t>
+            </a:r>
+            <a:r>
+              <a:rPr lang="en-US" sz="1600" b="1" dirty="0" err="1">
+                <a:solidFill>
+                  <a:schemeClr val="tx1"/>
+                </a:solidFill>
+              </a:rPr>
+              <a:t>res_factor_comparison</a:t>
+            </a:r>
+            <a:r>
+              <a:rPr lang="en-US" sz="1600" b="1" dirty="0">
+                <a:solidFill>
+                  <a:schemeClr val="tx1"/>
+                </a:solidFill>
+              </a:rPr>
+              <a:t>()</a:t>
+            </a:r>
+          </a:p>
+          <a:p>
+            <a:r>
+              <a:rPr lang="en-US" sz="1600" dirty="0">
+                <a:solidFill>
+                  <a:schemeClr val="tx1"/>
+                </a:solidFill>
+              </a:rPr>
+              <a:t>Comparison of simulation statistics over given factors</a:t>
+            </a:r>
+          </a:p>
+        </p:txBody>
+      </p:sp>
+    </p:spTree>
+    <p:extLst>
+      <p:ext uri="{BB962C8B-B14F-4D97-AF65-F5344CB8AC3E}">
+        <p14:creationId xmlns:p14="http://schemas.microsoft.com/office/powerpoint/2010/main" val="1064696857"/>
+      </p:ext>
+    </p:extLst>
+  </p:cSld>
+  <p:clrMapOvr>
+    <a:masterClrMapping/>
+  </p:clrMapOvr>
+</p:sld>
+</file>
+
+<file path=ppt/slides/slide33.xml><?xml version="1.0" encoding="utf-8"?>
+<p:sld xmlns:a="http://schemas.openxmlformats.org/drawingml/2006/main" xmlns:r="http://schemas.openxmlformats.org/officeDocument/2006/relationships" xmlns:p="http://schemas.openxmlformats.org/presentationml/2006/main">
+  <p:cSld>
+    <p:spTree>
+      <p:nvGrpSpPr>
+        <p:cNvPr id="1" name=""/>
+        <p:cNvGrpSpPr/>
+        <p:nvPr/>
+      </p:nvGrpSpPr>
+      <p:grpSpPr>
+        <a:xfrm>
+          <a:off x="0" y="0"/>
+          <a:ext cx="0" cy="0"/>
+          <a:chOff x="0" y="0"/>
+          <a:chExt cx="0" cy="0"/>
+        </a:xfrm>
+      </p:grpSpPr>
+      <p:sp>
+        <p:nvSpPr>
+          <p:cNvPr id="2" name="Title 1">
+            <a:extLst>
+              <a:ext uri="{FF2B5EF4-FFF2-40B4-BE49-F238E27FC236}">
+                <a16:creationId xmlns:a16="http://schemas.microsoft.com/office/drawing/2014/main" id="{02561039-60D8-4270-86A9-2DED0E29583F}"/>
+              </a:ext>
+            </a:extLst>
+          </p:cNvPr>
+          <p:cNvSpPr>
+            <a:spLocks noGrp="1"/>
+          </p:cNvSpPr>
+          <p:nvPr>
+            <p:ph type="title"/>
+          </p:nvPr>
+        </p:nvSpPr>
+        <p:spPr/>
+        <p:txBody>
+          <a:bodyPr/>
+          <a:lstStyle/>
+          <a:p>
+            <a:r>
+              <a:rPr lang="en-US" dirty="0"/>
+              <a:t>plot.py</a:t>
+            </a:r>
+          </a:p>
+        </p:txBody>
+      </p:sp>
+      <p:pic>
+        <p:nvPicPr>
+          <p:cNvPr id="3" name="Picture 2">
+            <a:extLst>
+              <a:ext uri="{FF2B5EF4-FFF2-40B4-BE49-F238E27FC236}">
+                <a16:creationId xmlns:a16="http://schemas.microsoft.com/office/drawing/2014/main" id="{682DDE72-77AC-4832-8B85-D776A90279B6}"/>
+              </a:ext>
+            </a:extLst>
+          </p:cNvPr>
+          <p:cNvPicPr>
+            <a:picLocks noChangeAspect="1"/>
+          </p:cNvPicPr>
+          <p:nvPr/>
+        </p:nvPicPr>
+        <p:blipFill>
+          <a:blip r:embed="rId2"/>
+          <a:stretch>
+            <a:fillRect/>
+          </a:stretch>
+        </p:blipFill>
+        <p:spPr>
+          <a:xfrm>
+            <a:off x="4168206" y="1159460"/>
+            <a:ext cx="5623864" cy="3649263"/>
+          </a:xfrm>
+          <a:prstGeom prst="rect">
+            <a:avLst/>
+          </a:prstGeom>
+        </p:spPr>
+      </p:pic>
+      <p:sp>
+        <p:nvSpPr>
+          <p:cNvPr id="6" name="TextBox 5">
+            <a:extLst>
+              <a:ext uri="{FF2B5EF4-FFF2-40B4-BE49-F238E27FC236}">
+                <a16:creationId xmlns:a16="http://schemas.microsoft.com/office/drawing/2014/main" id="{2ED2A948-D17E-4C54-9DFF-051336585E59}"/>
+              </a:ext>
+            </a:extLst>
+          </p:cNvPr>
+          <p:cNvSpPr txBox="1"/>
+          <p:nvPr/>
+        </p:nvSpPr>
+        <p:spPr>
+          <a:xfrm>
+            <a:off x="4082248" y="4808723"/>
+            <a:ext cx="6988206" cy="1477328"/>
+          </a:xfrm>
+          <a:prstGeom prst="rect">
+            <a:avLst/>
+          </a:prstGeom>
+          <a:noFill/>
+        </p:spPr>
+        <p:txBody>
+          <a:bodyPr wrap="square">
+            <a:spAutoFit/>
+          </a:bodyPr>
+          <a:lstStyle/>
+          <a:p>
+            <a:r>
+              <a:rPr lang="en-US" b="1" dirty="0">
+                <a:latin typeface="Bahnschrift" panose="020B0502040204020203" pitchFamily="34" charset="0"/>
+              </a:rPr>
+              <a:t>Example Syntax:</a:t>
+            </a:r>
+          </a:p>
+          <a:p>
+            <a:r>
+              <a:rPr lang="en-US" dirty="0">
+                <a:latin typeface="Bahnschrift" panose="020B0502040204020203" pitchFamily="34" charset="0"/>
+              </a:rPr>
+              <a:t>fig, ax = </a:t>
+            </a:r>
+            <a:r>
+              <a:rPr lang="en-US" dirty="0" err="1">
+                <a:latin typeface="Bahnschrift" panose="020B0502040204020203" pitchFamily="34" charset="0"/>
+              </a:rPr>
+              <a:t>rd.plot.mdlhists</a:t>
+            </a:r>
+            <a:r>
+              <a:rPr lang="en-US" dirty="0">
+                <a:latin typeface="Bahnschrift" panose="020B0502040204020203" pitchFamily="34" charset="0"/>
+              </a:rPr>
+              <a:t>(</a:t>
+            </a:r>
+            <a:r>
+              <a:rPr lang="en-US" dirty="0" err="1">
+                <a:latin typeface="Bahnschrift" panose="020B0502040204020203" pitchFamily="34" charset="0"/>
+              </a:rPr>
               <a:t>mdlhist</a:t>
             </a:r>
             <a:r>
+              <a:rPr lang="en-US" dirty="0">
+                <a:latin typeface="Bahnschrift" panose="020B0502040204020203" pitchFamily="34" charset="0"/>
+              </a:rPr>
+              <a:t>, title=“Response to </a:t>
+            </a:r>
+            <a:r>
+              <a:rPr lang="en-US" dirty="0" err="1">
+                <a:latin typeface="Bahnschrift" panose="020B0502040204020203" pitchFamily="34" charset="0"/>
+              </a:rPr>
+              <a:t>faultname</a:t>
+            </a:r>
+            <a:r>
+              <a:rPr lang="en-US" dirty="0">
+                <a:latin typeface="Bahnschrift" panose="020B0502040204020203" pitchFamily="34" charset="0"/>
+              </a:rPr>
+              <a:t>”,</a:t>
+            </a:r>
+          </a:p>
+          <a:p>
+            <a:r>
+              <a:rPr lang="en-US" dirty="0">
+                <a:latin typeface="Bahnschrift" panose="020B0502040204020203" pitchFamily="34" charset="0"/>
+              </a:rPr>
+              <a:t>		</a:t>
+            </a:r>
+            <a:r>
+              <a:rPr lang="en-US" dirty="0" err="1">
+                <a:latin typeface="Bahnschrift" panose="020B0502040204020203" pitchFamily="34" charset="0"/>
+              </a:rPr>
+              <a:t>time_slice</a:t>
+            </a:r>
+            <a:r>
+              <a:rPr lang="en-US" dirty="0">
+                <a:latin typeface="Bahnschrift" panose="020B0502040204020203" pitchFamily="34" charset="0"/>
+              </a:rPr>
+              <a:t>=</a:t>
+            </a:r>
+            <a:r>
+              <a:rPr lang="en-US" dirty="0" err="1">
+                <a:latin typeface="Bahnschrift" panose="020B0502040204020203" pitchFamily="34" charset="0"/>
+              </a:rPr>
+              <a:t>faulttime</a:t>
+            </a:r>
+            <a:r>
+              <a:rPr lang="en-US" dirty="0">
+                <a:latin typeface="Bahnschrift" panose="020B0502040204020203" pitchFamily="34" charset="0"/>
+              </a:rPr>
+              <a:t>,</a:t>
+            </a:r>
+          </a:p>
+          <a:p>
+            <a:r>
+              <a:rPr lang="en-US" dirty="0">
+                <a:latin typeface="Bahnschrift" panose="020B0502040204020203" pitchFamily="34" charset="0"/>
+              </a:rPr>
+              <a:t>		</a:t>
+            </a:r>
+            <a:r>
+              <a:rPr lang="en-US" dirty="0" err="1">
+                <a:latin typeface="Bahnschrift" panose="020B0502040204020203" pitchFamily="34" charset="0"/>
+              </a:rPr>
+              <a:t>fxnflowvals</a:t>
+            </a:r>
+            <a:r>
+              <a:rPr lang="en-US" dirty="0">
+                <a:latin typeface="Bahnschrift" panose="020B0502040204020203" pitchFamily="34" charset="0"/>
+              </a:rPr>
+              <a:t>={‘Flow1':[‘val1', ‘val2'],’flow2’:’val1’}, </a:t>
+            </a:r>
+          </a:p>
+          <a:p>
+            <a:r>
+              <a:rPr lang="en-US" dirty="0">
+                <a:latin typeface="Bahnschrift" panose="020B0502040204020203" pitchFamily="34" charset="0"/>
+              </a:rPr>
+              <a:t>		cols=2, </a:t>
+            </a:r>
+            <a:r>
+              <a:rPr lang="en-US" dirty="0" err="1">
+                <a:latin typeface="Bahnschrift" panose="020B0502040204020203" pitchFamily="34" charset="0"/>
+              </a:rPr>
+              <a:t>timelabel</a:t>
+            </a:r>
+            <a:r>
+              <a:rPr lang="en-US" dirty="0">
+                <a:latin typeface="Bahnschrift" panose="020B0502040204020203" pitchFamily="34" charset="0"/>
+              </a:rPr>
+              <a:t>="time (min)")</a:t>
+            </a:r>
+          </a:p>
+        </p:txBody>
+      </p:sp>
+      <p:sp>
+        <p:nvSpPr>
+          <p:cNvPr id="5" name="Date Placeholder 4">
+            <a:extLst>
+              <a:ext uri="{FF2B5EF4-FFF2-40B4-BE49-F238E27FC236}">
+                <a16:creationId xmlns:a16="http://schemas.microsoft.com/office/drawing/2014/main" id="{408F61AE-2A39-407A-AF18-082F28F65E49}"/>
+              </a:ext>
+            </a:extLst>
+          </p:cNvPr>
+          <p:cNvSpPr>
+            <a:spLocks noGrp="1"/>
+          </p:cNvSpPr>
+          <p:nvPr>
+            <p:ph type="dt" sz="half" idx="10"/>
+          </p:nvPr>
+        </p:nvSpPr>
+        <p:spPr/>
+        <p:txBody>
+          <a:bodyPr/>
+          <a:lstStyle/>
+          <a:p>
+            <a:fld id="{F42917D8-DE2B-4B56-9269-E3946BB7F747}" type="datetime1">
+              <a:rPr lang="en-US" smtClean="0"/>
+              <a:t>4/11/2022</a:t>
+            </a:fld>
+            <a:endParaRPr lang="en-US"/>
+          </a:p>
+        </p:txBody>
+      </p:sp>
+      <p:sp>
+        <p:nvSpPr>
+          <p:cNvPr id="7" name="Slide Number Placeholder 6">
+            <a:extLst>
+              <a:ext uri="{FF2B5EF4-FFF2-40B4-BE49-F238E27FC236}">
+                <a16:creationId xmlns:a16="http://schemas.microsoft.com/office/drawing/2014/main" id="{56CDAAF2-4669-4619-8909-0B04FA426572}"/>
+              </a:ext>
+            </a:extLst>
+          </p:cNvPr>
+          <p:cNvSpPr>
+            <a:spLocks noGrp="1"/>
+          </p:cNvSpPr>
+          <p:nvPr>
+            <p:ph type="sldNum" sz="quarter" idx="12"/>
+          </p:nvPr>
+        </p:nvSpPr>
+        <p:spPr/>
+        <p:txBody>
+          <a:bodyPr/>
+          <a:lstStyle/>
+          <a:p>
+            <a:fld id="{7A4D9045-47C6-4ED3-A320-E2DFE9546330}" type="slidenum">
+              <a:rPr lang="en-US" smtClean="0"/>
+              <a:t>33</a:t>
+            </a:fld>
+            <a:endParaRPr lang="en-US" dirty="0"/>
+          </a:p>
+        </p:txBody>
+      </p:sp>
+      <p:sp>
+        <p:nvSpPr>
+          <p:cNvPr id="8" name="Flowchart: Process 7">
+            <a:extLst>
+              <a:ext uri="{FF2B5EF4-FFF2-40B4-BE49-F238E27FC236}">
+                <a16:creationId xmlns:a16="http://schemas.microsoft.com/office/drawing/2014/main" id="{F7363C5E-2395-44AF-98BD-62D1AB528FA8}"/>
+              </a:ext>
+            </a:extLst>
+          </p:cNvPr>
+          <p:cNvSpPr/>
+          <p:nvPr/>
+        </p:nvSpPr>
+        <p:spPr>
+          <a:xfrm>
+            <a:off x="838200" y="1503183"/>
+            <a:ext cx="2853431" cy="4696281"/>
+          </a:xfrm>
+          <a:prstGeom prst="flowChartProcess">
+            <a:avLst/>
+          </a:prstGeom>
+          <a:solidFill>
+            <a:schemeClr val="bg1"/>
+          </a:solidFill>
+          <a:ln w="38100">
+            <a:solidFill>
+              <a:schemeClr val="tx1">
+                <a:lumMod val="50000"/>
+                <a:lumOff val="50000"/>
+              </a:schemeClr>
+            </a:solidFill>
+          </a:ln>
+        </p:spPr>
+        <p:style>
+          <a:lnRef idx="2">
+            <a:schemeClr val="accent1">
+              <a:shade val="50000"/>
+            </a:schemeClr>
+          </a:lnRef>
+          <a:fillRef idx="1">
+            <a:schemeClr val="accent1"/>
+          </a:fillRef>
+          <a:effectRef idx="0">
+            <a:schemeClr val="accent1"/>
+          </a:effectRef>
+          <a:fontRef idx="minor">
+            <a:schemeClr val="lt1"/>
+          </a:fontRef>
+        </p:style>
+        <p:txBody>
+          <a:bodyPr rtlCol="0" anchor="ctr"/>
+          <a:lstStyle/>
+          <a:p>
+            <a:pPr algn="ctr"/>
+            <a:r>
+              <a:rPr lang="en-US" b="1" dirty="0">
+                <a:solidFill>
+                  <a:schemeClr val="tx1"/>
+                </a:solidFill>
+              </a:rPr>
+              <a:t>plot.py</a:t>
+            </a:r>
+          </a:p>
+          <a:p>
+            <a:r>
+              <a:rPr lang="en-US" sz="1600" dirty="0">
+                <a:solidFill>
+                  <a:schemeClr val="tx1"/>
+                </a:solidFill>
+              </a:rPr>
+              <a:t>Behavioral/Statistical Plotting</a:t>
+            </a:r>
+          </a:p>
+          <a:p>
+            <a:r>
               <a:rPr lang="en-US" sz="1600" b="1" dirty="0">
                 <a:solidFill>
                   <a:schemeClr val="tx1"/>
                 </a:solidFill>
               </a:rPr>
+              <a:t>-</a:t>
+            </a:r>
+            <a:r>
+              <a:rPr lang="en-US" sz="1600" b="1" dirty="0" err="1">
+                <a:solidFill>
+                  <a:schemeClr val="tx1"/>
+                </a:solidFill>
+              </a:rPr>
+              <a:t>mdlhists</a:t>
+            </a:r>
+            <a:r>
+              <a:rPr lang="en-US" sz="1600" b="1" dirty="0">
+                <a:solidFill>
+                  <a:schemeClr val="tx1"/>
+                </a:solidFill>
+              </a:rPr>
+              <a:t>(</a:t>
+            </a:r>
+            <a:r>
+              <a:rPr lang="en-US" sz="1600" b="1" dirty="0" err="1">
+                <a:solidFill>
+                  <a:schemeClr val="tx1"/>
+                </a:solidFill>
+              </a:rPr>
+              <a:t>mdlhist</a:t>
+            </a:r>
+            <a:r>
+              <a:rPr lang="en-US" sz="1600" b="1" dirty="0">
+                <a:solidFill>
+                  <a:schemeClr val="tx1"/>
+                </a:solidFill>
+              </a:rPr>
               <a:t>)</a:t>
             </a:r>
             <a:r>
@@ -23195,6 +23555,42 @@
                 </a:solidFill>
               </a:rPr>
               <a:t>Plots behavior of given states over time in a set of scenarios</a:t>
+            </a:r>
+          </a:p>
+          <a:p>
+            <a:r>
+              <a:rPr lang="en-US" sz="1600" b="1" dirty="0">
+                <a:solidFill>
+                  <a:schemeClr val="tx1"/>
+                </a:solidFill>
+              </a:rPr>
+              <a:t>-</a:t>
+            </a:r>
+            <a:r>
+              <a:rPr lang="en-US" sz="1600" b="1" dirty="0" err="1">
+                <a:solidFill>
+                  <a:schemeClr val="tx1"/>
+                </a:solidFill>
+              </a:rPr>
+              <a:t>metric_dist</a:t>
+            </a:r>
+            <a:r>
+              <a:rPr lang="en-US" sz="1600" b="1" dirty="0">
+                <a:solidFill>
+                  <a:schemeClr val="tx1"/>
+                </a:solidFill>
+              </a:rPr>
+              <a:t>()/_from():</a:t>
+            </a:r>
+          </a:p>
+          <a:p>
+            <a:r>
+              <a:rPr lang="en-US" sz="1600" dirty="0">
+                <a:solidFill>
+                  <a:schemeClr val="tx1"/>
+                </a:solidFill>
+              </a:rPr>
+              <a:t>Histograms of modelled metrics</a:t>
             </a:r>
           </a:p>
           <a:p>
@@ -23528,6 +23924,12 @@
           </a:p>
           <a:p>
             <a:r>
+              <a:rPr lang="en-US" dirty="0">
+                <a:latin typeface="Bahnschrift" panose="020B0502040204020203" pitchFamily="34" charset="0"/>
+              </a:rPr>
+              <a:t>fig, ax = </a:t>
+            </a:r>
+            <a:r>
               <a:rPr lang="en-US" dirty="0" err="1">
                 <a:latin typeface="Bahnschrift" panose="020B0502040204020203" pitchFamily="34" charset="0"/>
               </a:rPr>
@@ -23554,6 +23956,12 @@
           </a:p>
           <a:p>
             <a:r>
+              <a:rPr lang="en-US" dirty="0">
+                <a:latin typeface="Bahnschrift" panose="020B0502040204020203" pitchFamily="34" charset="0"/>
+              </a:rPr>
+              <a:t>fig, ax = </a:t>
+            </a:r>
+            <a:r>
               <a:rPr lang="en-US" dirty="0" err="1">
                 <a:latin typeface="Bahnschrift" panose="020B0502040204020203" pitchFamily="34" charset="0"/>
               </a:rPr>
@@ -23579,6 +23987,12 @@
             </a:r>
           </a:p>
           <a:p>
+            <a:r>
+              <a:rPr lang="en-US" dirty="0">
+                <a:latin typeface="Bahnschrift" panose="020B0502040204020203" pitchFamily="34" charset="0"/>
+              </a:rPr>
+              <a:t>fig, ax = </a:t>
+            </a:r>
             <a:r>
               <a:rPr lang="en-US" dirty="0" err="1">
                 <a:latin typeface="Bahnschrift" panose="020B0502040204020203" pitchFamily="34" charset="0"/>
@@ -23657,7 +24071,7 @@
           <a:p>
             <a:fld id="{2C692DC2-27F8-41E2-A26C-4A5AEAD6F271}" type="datetime1">
               <a:rPr lang="en-US" smtClean="0"/>
-              <a:t>1/5/2022</a:t>
+              <a:t>4/11/2022</a:t>
             </a:fld>
             <a:endParaRPr lang="en-US"/>
           </a:p>
@@ -24308,7 +24722,7 @@
           <a:p>
             <a:fld id="{027C03D3-C4D8-4F82-B3DF-07F42D9AF747}" type="datetime1">
               <a:rPr lang="en-US" smtClean="0"/>
-              <a:t>1/5/2022</a:t>
+              <a:t>4/11/2022</a:t>
             </a:fld>
             <a:endParaRPr lang="en-US"/>
           </a:p>
@@ -24859,7 +25273,7 @@
           <a:p>
             <a:fld id="{2CBDB339-778E-4C7A-9A03-DDF59C39E9F9}" type="datetime1">
               <a:rPr lang="en-US" smtClean="0"/>
-              <a:t>1/5/2022</a:t>
+              <a:t>4/11/2022</a:t>
             </a:fld>
             <a:endParaRPr lang="en-US"/>
           </a:p>
@@ -25058,7 +25472,7 @@
           <a:p>
             <a:fld id="{F2B4AA4E-DFA2-485D-8105-D345E4DF8240}" type="datetime1">
               <a:rPr lang="en-US" smtClean="0"/>
-              <a:t>1/5/2022</a:t>
+              <a:t>4/11/2022</a:t>
             </a:fld>
             <a:endParaRPr lang="en-US"/>
           </a:p>
@@ -26253,7 +26667,7 @@
           <a:p>
             <a:fld id="{37A4B9B3-CD86-4259-A27A-F9B9C6081119}" type="datetime1">
               <a:rPr lang="en-US" smtClean="0"/>
-              <a:t>1/5/2022</a:t>
+              <a:t>4/11/2022</a:t>
             </a:fld>
             <a:endParaRPr lang="en-US"/>
           </a:p>
@@ -27641,7 +28055,7 @@
           <a:p>
             <a:fld id="{97B5B71A-C210-4A41-9D4A-E72BF6E30274}" type="datetime1">
               <a:rPr lang="en-US" smtClean="0"/>
-              <a:t>1/5/2022</a:t>
+              <a:t>4/11/2022</a:t>
             </a:fld>
             <a:endParaRPr lang="en-US"/>
           </a:p>
@@ -30285,7 +30699,7 @@
           <a:p>
             <a:fld id="{4F293EC2-9353-465E-8275-590A21556A4C}" type="datetime1">
               <a:rPr lang="en-US" smtClean="0"/>
-              <a:t>1/5/2022</a:t>
+              <a:t>4/11/2022</a:t>
             </a:fld>
             <a:endParaRPr lang="en-US"/>
           </a:p>
@@ -31908,7 +32322,7 @@
           <a:p>
             <a:fld id="{BFA3C805-31B6-4A11-AAC4-FD0B22218204}" type="datetime1">
               <a:rPr lang="en-US" smtClean="0"/>
-              <a:t>1/5/2022</a:t>
+              <a:t>4/11/2022</a:t>
             </a:fld>
             <a:endParaRPr lang="en-US"/>
           </a:p>
@@ -32144,7 +32558,7 @@
           <a:p>
             <a:fld id="{2EF51449-35FB-44B7-9F78-8BE693FE99B8}" type="datetime1">
               <a:rPr lang="en-US" smtClean="0"/>
-              <a:t>1/5/2022</a:t>
+              <a:t>4/11/2022</a:t>
             </a:fld>
             <a:endParaRPr lang="en-US"/>
           </a:p>
@@ -32344,7 +32758,7 @@
           <a:p>
             <a:fld id="{3CD4156D-2DFA-4CBC-8BBF-D9C396665CA3}" type="datetime1">
               <a:rPr lang="en-US" smtClean="0"/>
-              <a:t>1/5/2022</a:t>
+              <a:t>4/11/2022</a:t>
             </a:fld>
             <a:endParaRPr lang="en-US"/>
           </a:p>
@@ -32468,7 +32882,7 @@
           <a:p>
             <a:fld id="{E8F6B82B-A579-437C-AABB-EF257589C124}" type="datetime1">
               <a:rPr lang="en-US" smtClean="0"/>
-              <a:t>1/5/2022</a:t>
+              <a:t>4/11/2022</a:t>
             </a:fld>
             <a:endParaRPr lang="en-US"/>
           </a:p>
@@ -34390,6 +34804,15 @@
 </file>
 
 <file path=customXml/item1.xml><?xml version="1.0" encoding="utf-8"?>
+<?mso-contentType ?>
+<FormTemplates xmlns="http://schemas.microsoft.com/sharepoint/v3/contenttype/forms">
+  <Display>DocumentLibraryForm</Display>
+  <Edit>DocumentLibraryForm</Edit>
+  <New>DocumentLibraryForm</New>
+</FormTemplates>
+</file>
+
+<file path=customXml/item2.xml><?xml version="1.0" encoding="utf-8"?>
 <ct:contentTypeSchema xmlns:ct="http://schemas.microsoft.com/office/2006/metadata/contentType" xmlns:ma="http://schemas.microsoft.com/office/2006/metadata/properties/metaAttributes" ct:_="" ma:_="" ma:contentTypeName="Document" ma:contentTypeID="0x0101002F0B4413AAFFE34B9A5E0B87EBB2BF4F" ma:contentTypeVersion="0" ma:contentTypeDescription="Create a new document." ma:contentTypeScope="" ma:versionID="9632435baf965c6c093711282b9a8698">
   <xsd:schema xmlns:xsd="http://www.w3.org/2001/XMLSchema" xmlns:xs="http://www.w3.org/2001/XMLSchema" xmlns:p="http://schemas.microsoft.com/office/2006/metadata/properties" targetNamespace="http://schemas.microsoft.com/office/2006/metadata/properties" ma:root="true" ma:fieldsID="ad47a0f10127d9e30d85633090e6731d">
     <xsd:element name="properties">
@@ -34503,15 +34926,6 @@
 </ct:contentTypeSchema>
 </file>
 
-<file path=customXml/item2.xml><?xml version="1.0" encoding="utf-8"?>
-<?mso-contentType ?>
-<FormTemplates xmlns="http://schemas.microsoft.com/sharepoint/v3/contenttype/forms">
-  <Display>DocumentLibraryForm</Display>
-  <Edit>DocumentLibraryForm</Edit>
-  <New>DocumentLibraryForm</New>
-</FormTemplates>
-</file>
-
 <file path=customXml/item3.xml><?xml version="1.0" encoding="utf-8"?>
 <p:properties xmlns:p="http://schemas.microsoft.com/office/2006/metadata/properties" xmlns:xsi="http://www.w3.org/2001/XMLSchema-instance" xmlns:pc="http://schemas.microsoft.com/office/infopath/2007/PartnerControls">
   <documentManagement/>
@@ -34519,6 +34933,14 @@
 </file>
 
 <file path=customXml/itemProps1.xml><?xml version="1.0" encoding="utf-8"?>
+<ds:datastoreItem xmlns:ds="http://schemas.openxmlformats.org/officeDocument/2006/customXml" ds:itemID="{D3728C9A-7C9B-4A99-A7F5-4857043C7DB3}">
+  <ds:schemaRefs>
+    <ds:schemaRef ds:uri="http://schemas.microsoft.com/sharepoint/v3/contenttype/forms"/>
+  </ds:schemaRefs>
+</ds:datastoreItem>
+</file>
+
+<file path=customXml/itemProps2.xml><?xml version="1.0" encoding="utf-8"?>
 <ds:datastoreItem xmlns:ds="http://schemas.openxmlformats.org/officeDocument/2006/customXml" ds:itemID="{8807AEC1-3868-4489-99AA-F6101CBA6951}">
   <ds:schemaRefs>
     <ds:schemaRef ds:uri="http://schemas.microsoft.com/office/2006/metadata/contentType"/>
@@ -34530,14 +34952,6 @@
     <ds:schemaRef ds:uri="http://purl.org/dc/terms/"/>
     <ds:schemaRef ds:uri="http://schemas.microsoft.com/internal/obd"/>
     <ds:schemaRef ds:uri="http://schemas.microsoft.com/office/infopath/2007/PartnerControls"/>
-  </ds:schemaRefs>
-</ds:datastoreItem>
-</file>
-
-<file path=customXml/itemProps2.xml><?xml version="1.0" encoding="utf-8"?>
-<ds:datastoreItem xmlns:ds="http://schemas.openxmlformats.org/officeDocument/2006/customXml" ds:itemID="{D3728C9A-7C9B-4A99-A7F5-4857043C7DB3}">
-  <ds:schemaRefs>
-    <ds:schemaRef ds:uri="http://schemas.microsoft.com/sharepoint/v3/contenttype/forms"/>
   </ds:schemaRefs>
 </ds:datastoreItem>
 </file>

</xml_diff>

<commit_message>
Regenerating notebooks and other docs
</commit_message>
<xml_diff>
--- a/docs/Intro to fmdtools.pptx
+++ b/docs/Intro to fmdtools.pptx
@@ -242,7 +242,7 @@
           <a:p>
             <a:fld id="{711A52A6-9D8E-41FC-9651-78B3E515F872}" type="datetimeFigureOut">
               <a:rPr lang="en-US" smtClean="0"/>
-              <a:t>6/21/2022</a:t>
+              <a:t>12/21/2022</a:t>
             </a:fld>
             <a:endParaRPr lang="en-US"/>
           </a:p>
@@ -669,7 +669,7 @@
           <a:p>
             <a:fld id="{77F775AD-3704-4F98-A581-F4E052B5E341}" type="datetime1">
               <a:rPr lang="en-US" smtClean="0"/>
-              <a:t>6/21/2022</a:t>
+              <a:t>12/21/2022</a:t>
             </a:fld>
             <a:endParaRPr lang="en-US" dirty="0"/>
           </a:p>
@@ -918,7 +918,7 @@
           <a:p>
             <a:fld id="{B49B97F0-8049-4B63-9B9F-B08800B08AEA}" type="datetime1">
               <a:rPr lang="en-US" smtClean="0"/>
-              <a:t>6/21/2022</a:t>
+              <a:t>12/21/2022</a:t>
             </a:fld>
             <a:endParaRPr lang="en-US"/>
           </a:p>
@@ -1158,7 +1158,7 @@
           <a:p>
             <a:fld id="{76BB3555-78C2-4894-951A-9F28C24107FA}" type="datetime1">
               <a:rPr lang="en-US" smtClean="0"/>
-              <a:t>6/21/2022</a:t>
+              <a:t>12/21/2022</a:t>
             </a:fld>
             <a:endParaRPr lang="en-US"/>
           </a:p>
@@ -1388,7 +1388,7 @@
           <a:p>
             <a:fld id="{37A4B9B3-CD86-4259-A27A-F9B9C6081119}" type="datetime1">
               <a:rPr lang="en-US" smtClean="0"/>
-              <a:t>6/21/2022</a:t>
+              <a:t>12/21/2022</a:t>
             </a:fld>
             <a:endParaRPr lang="en-US"/>
           </a:p>
@@ -1666,7 +1666,7 @@
           <a:p>
             <a:fld id="{66287512-E62E-4968-99B9-D028D358C1D6}" type="datetime1">
               <a:rPr lang="en-US" smtClean="0"/>
-              <a:t>6/21/2022</a:t>
+              <a:t>12/21/2022</a:t>
             </a:fld>
             <a:endParaRPr lang="en-US"/>
           </a:p>
@@ -1989,7 +1989,7 @@
           <a:p>
             <a:fld id="{356AD7E7-9EE9-4D28-82A7-0AE338FFEED9}" type="datetime1">
               <a:rPr lang="en-US" smtClean="0"/>
-              <a:t>6/21/2022</a:t>
+              <a:t>12/21/2022</a:t>
             </a:fld>
             <a:endParaRPr lang="en-US"/>
           </a:p>
@@ -2463,7 +2463,7 @@
           <a:p>
             <a:fld id="{0B5CD5E0-6150-412F-8881-52709F06EC3B}" type="datetime1">
               <a:rPr lang="en-US" smtClean="0"/>
-              <a:t>6/21/2022</a:t>
+              <a:t>12/21/2022</a:t>
             </a:fld>
             <a:endParaRPr lang="en-US"/>
           </a:p>
@@ -2610,7 +2610,7 @@
           <a:p>
             <a:fld id="{9428AFA3-5281-4B53-8B8B-8FD665A2F0D7}" type="datetime1">
               <a:rPr lang="en-US" smtClean="0"/>
-              <a:t>6/21/2022</a:t>
+              <a:t>12/21/2022</a:t>
             </a:fld>
             <a:endParaRPr lang="en-US"/>
           </a:p>
@@ -2723,7 +2723,7 @@
           <a:p>
             <a:fld id="{556D1394-26AC-45DA-9E25-AB3CC25C7422}" type="datetime1">
               <a:rPr lang="en-US" smtClean="0"/>
-              <a:t>6/21/2022</a:t>
+              <a:t>12/21/2022</a:t>
             </a:fld>
             <a:endParaRPr lang="en-US"/>
           </a:p>
@@ -3048,7 +3048,7 @@
           <a:p>
             <a:fld id="{B641D803-18D9-4B72-95D8-021B736F630F}" type="datetime1">
               <a:rPr lang="en-US" smtClean="0"/>
-              <a:t>6/21/2022</a:t>
+              <a:t>12/21/2022</a:t>
             </a:fld>
             <a:endParaRPr lang="en-US"/>
           </a:p>
@@ -3340,7 +3340,7 @@
           <a:p>
             <a:fld id="{9F82DFCB-4787-4629-B4F0-DCD676BE203A}" type="datetime1">
               <a:rPr lang="en-US" smtClean="0"/>
-              <a:t>6/21/2022</a:t>
+              <a:t>12/21/2022</a:t>
             </a:fld>
             <a:endParaRPr lang="en-US"/>
           </a:p>
@@ -3580,7 +3580,7 @@
           <a:p>
             <a:fld id="{300C2ECC-D91C-40D5-A01C-469FC90F0645}" type="datetime1">
               <a:rPr lang="en-US" smtClean="0"/>
-              <a:t>6/21/2022</a:t>
+              <a:t>12/21/2022</a:t>
             </a:fld>
             <a:endParaRPr lang="en-US" dirty="0"/>
           </a:p>
@@ -4039,7 +4039,7 @@
           <a:p>
             <a:r>
               <a:rPr lang="en-US" dirty="0"/>
-              <a:t>Version 1.1</a:t>
+              <a:t>Version 1.3</a:t>
             </a:r>
           </a:p>
         </p:txBody>
@@ -4114,7 +4114,7 @@
           <a:p>
             <a:fld id="{4388EDFA-43D4-4D4C-AB0B-BD3EBC9D8CE3}" type="datetime1">
               <a:rPr lang="en-US" smtClean="0"/>
-              <a:t>6/21/2022</a:t>
+              <a:t>12/21/2022</a:t>
             </a:fld>
             <a:endParaRPr lang="en-US" dirty="0"/>
           </a:p>
@@ -4232,7 +4232,7 @@
         </p:spPr>
         <p:txBody>
           <a:bodyPr>
-            <a:normAutofit/>
+            <a:normAutofit fontScale="92500" lnSpcReduction="20000"/>
           </a:bodyPr>
           <a:lstStyle/>
           <a:p>
@@ -4279,7 +4279,7 @@
             <a:pPr lvl="1"/>
             <a:r>
               <a:rPr lang="en-US" sz="2000" dirty="0" err="1"/>
-              <a:t>Example_pump</a:t>
+              <a:t>example_pump</a:t>
             </a:r>
             <a:r>
               <a:rPr lang="en-US" sz="2000" dirty="0"/>
@@ -4290,7 +4290,7 @@
             <a:pPr lvl="1"/>
             <a:r>
               <a:rPr lang="en-US" sz="2000" dirty="0" err="1"/>
-              <a:t>Example_multirotor</a:t>
+              <a:t>example_multirotor</a:t>
             </a:r>
             <a:r>
               <a:rPr lang="en-US" sz="2000" dirty="0"/>
@@ -4302,14 +4302,14 @@
             </a:r>
             <a:r>
               <a:rPr lang="en-US" sz="2000" dirty="0"/>
-              <a:t>: A Fault Propagation Toolkit for Resilience Assessment in Early Design.“</a:t>
+              <a:t>: A Fault Propagation Toolkit for Resilience Assessment in Early Design“ as well as an example of combined architecture, flight plan, and fault policy optimization</a:t>
             </a:r>
           </a:p>
           <a:p>
             <a:pPr lvl="1"/>
             <a:r>
               <a:rPr lang="en-US" sz="2000" dirty="0" err="1"/>
-              <a:t>Example_eps</a:t>
+              <a:t>example_eps</a:t>
             </a:r>
             <a:r>
               <a:rPr lang="en-US" sz="2000" dirty="0"/>
@@ -4320,11 +4320,22 @@
             <a:pPr lvl="1"/>
             <a:r>
               <a:rPr lang="en-US" sz="2000" dirty="0" err="1"/>
-              <a:t>Example_tank</a:t>
+              <a:t>example_tank</a:t>
             </a:r>
             <a:r>
               <a:rPr lang="en-US" sz="2000" dirty="0"/>
-              <a:t>	- Example of a human error model implemented with components</a:t>
+              <a:t>	- Example of a human error model implemented with components, as well as an example of combined architecture/fault policy optimization</a:t>
+            </a:r>
+          </a:p>
+          <a:p>
+            <a:pPr lvl="1"/>
+            <a:r>
+              <a:rPr lang="en-US" sz="2000" dirty="0" err="1"/>
+              <a:t>example_rover</a:t>
+            </a:r>
+            <a:r>
+              <a:rPr lang="en-US" sz="2000" dirty="0"/>
+              <a:t>	- Example of human modelling constructs (PSFs, degradation models) as well as synthetic mode generation, policy optimization, and optimization for mode generation</a:t>
             </a:r>
           </a:p>
           <a:p>
@@ -4336,7 +4347,7 @@
           <a:p>
             <a:r>
               <a:rPr lang="en-US" sz="2400" dirty="0"/>
-              <a:t>/tests		- automated software tests</a:t>
+              <a:t>/tests			- automated software tests</a:t>
             </a:r>
           </a:p>
           <a:p>
@@ -4389,7 +4400,7 @@
           <a:p>
             <a:fld id="{A2718D2D-62ED-45AF-A1E2-9E90FD101627}" type="datetime1">
               <a:rPr lang="en-US" smtClean="0"/>
-              <a:t>6/21/2022</a:t>
+              <a:t>12/21/2022</a:t>
             </a:fld>
             <a:endParaRPr lang="en-US"/>
           </a:p>
@@ -4664,7 +4675,7 @@
           <a:p>
             <a:fld id="{C4201A4F-8F78-471A-958F-3ECF60515233}" type="datetime1">
               <a:rPr lang="en-US" smtClean="0"/>
-              <a:t>6/21/2022</a:t>
+              <a:t>12/21/2022</a:t>
             </a:fld>
             <a:endParaRPr lang="en-US"/>
           </a:p>
@@ -5448,8 +5459,8 @@
         </p:nvSpPr>
         <p:spPr>
           <a:xfrm>
-            <a:off x="4504307" y="3906175"/>
-            <a:ext cx="3183385" cy="2379215"/>
+            <a:off x="4504307" y="3906176"/>
+            <a:ext cx="3183385" cy="931314"/>
           </a:xfrm>
           <a:prstGeom prst="flowChartProcess">
             <a:avLst/>
@@ -5505,109 +5516,6 @@
               </a:rPr>
               <a:t>Propagation of model behaviors in nominal and faulty scenarios</a:t>
             </a:r>
-          </a:p>
-          <a:p>
-            <a:pPr marL="285750" indent="-285750">
-              <a:buFontTx/>
-              <a:buChar char="-"/>
-            </a:pPr>
-            <a:r>
-              <a:rPr lang="en-US" dirty="0">
-                <a:solidFill>
-                  <a:schemeClr val="tx1"/>
-                </a:solidFill>
-              </a:rPr>
-              <a:t>nominal(), </a:t>
-            </a:r>
-            <a:r>
-              <a:rPr lang="en-US" dirty="0" err="1">
-                <a:solidFill>
-                  <a:schemeClr val="tx1"/>
-                </a:solidFill>
-              </a:rPr>
-              <a:t>one_fault</a:t>
-            </a:r>
-            <a:r>
-              <a:rPr lang="en-US" dirty="0">
-                <a:solidFill>
-                  <a:schemeClr val="tx1"/>
-                </a:solidFill>
-              </a:rPr>
-              <a:t>()</a:t>
-            </a:r>
-          </a:p>
-          <a:p>
-            <a:pPr marL="285750" indent="-285750">
-              <a:buFontTx/>
-              <a:buChar char="-"/>
-            </a:pPr>
-            <a:r>
-              <a:rPr lang="en-US" dirty="0" err="1">
-                <a:solidFill>
-                  <a:schemeClr val="tx1"/>
-                </a:solidFill>
-              </a:rPr>
-              <a:t>singlefaults</a:t>
-            </a:r>
-            <a:r>
-              <a:rPr lang="en-US" dirty="0">
-                <a:solidFill>
-                  <a:schemeClr val="tx1"/>
-                </a:solidFill>
-              </a:rPr>
-              <a:t>(), approach()</a:t>
-            </a:r>
-          </a:p>
-          <a:p>
-            <a:pPr marL="285750" indent="-285750">
-              <a:buFontTx/>
-              <a:buChar char="-"/>
-            </a:pPr>
-            <a:r>
-              <a:rPr lang="en-US" dirty="0" err="1">
-                <a:solidFill>
-                  <a:schemeClr val="tx1"/>
-                </a:solidFill>
-              </a:rPr>
-              <a:t>nominal_approach</a:t>
-            </a:r>
-            <a:r>
-              <a:rPr lang="en-US" dirty="0">
-                <a:solidFill>
-                  <a:schemeClr val="tx1"/>
-                </a:solidFill>
-              </a:rPr>
-              <a:t>()</a:t>
-            </a:r>
-          </a:p>
-          <a:p>
-            <a:pPr marL="285750" indent="-285750">
-              <a:buFontTx/>
-              <a:buChar char="-"/>
-            </a:pPr>
-            <a:r>
-              <a:rPr lang="en-US" dirty="0" err="1">
-                <a:solidFill>
-                  <a:schemeClr val="tx1"/>
-                </a:solidFill>
-              </a:rPr>
-              <a:t>nested_approach</a:t>
-            </a:r>
-            <a:r>
-              <a:rPr lang="en-US" dirty="0">
-                <a:solidFill>
-                  <a:schemeClr val="tx1"/>
-                </a:solidFill>
-              </a:rPr>
-              <a:t>()</a:t>
-            </a:r>
-          </a:p>
-          <a:p>
-            <a:endParaRPr lang="en-US" dirty="0">
-              <a:solidFill>
-                <a:schemeClr val="tx1"/>
-              </a:solidFill>
-            </a:endParaRPr>
           </a:p>
         </p:txBody>
       </p:sp>
@@ -5930,7 +5838,7 @@
           <a:p>
             <a:fld id="{816CE958-480F-4C1E-A449-B4E9BBCC4CF8}" type="datetime1">
               <a:rPr lang="en-US" smtClean="0"/>
-              <a:t>6/21/2022</a:t>
+              <a:t>12/21/2022</a:t>
             </a:fld>
             <a:endParaRPr lang="en-US" dirty="0"/>
           </a:p>
@@ -5962,6 +5870,104 @@
               <a:t>12</a:t>
             </a:fld>
             <a:endParaRPr lang="en-US" dirty="0"/>
+          </a:p>
+        </p:txBody>
+      </p:sp>
+      <p:sp>
+        <p:nvSpPr>
+          <p:cNvPr id="8" name="Flowchart: Process 7">
+            <a:extLst>
+              <a:ext uri="{FF2B5EF4-FFF2-40B4-BE49-F238E27FC236}">
+                <a16:creationId xmlns:a16="http://schemas.microsoft.com/office/drawing/2014/main" id="{621B74A8-58B4-D0A3-2DD3-9BF53B3E26BE}"/>
+              </a:ext>
+            </a:extLst>
+          </p:cNvPr>
+          <p:cNvSpPr/>
+          <p:nvPr/>
+        </p:nvSpPr>
+        <p:spPr>
+          <a:xfrm>
+            <a:off x="4504307" y="4837490"/>
+            <a:ext cx="3183385" cy="1447900"/>
+          </a:xfrm>
+          <a:prstGeom prst="flowChartProcess">
+            <a:avLst/>
+          </a:prstGeom>
+          <a:solidFill>
+            <a:schemeClr val="bg1"/>
+          </a:solidFill>
+          <a:ln w="38100">
+            <a:solidFill>
+              <a:schemeClr val="tx1">
+                <a:lumMod val="50000"/>
+                <a:lumOff val="50000"/>
+              </a:schemeClr>
+            </a:solidFill>
+          </a:ln>
+        </p:spPr>
+        <p:style>
+          <a:lnRef idx="2">
+            <a:schemeClr val="accent1">
+              <a:shade val="50000"/>
+            </a:schemeClr>
+          </a:lnRef>
+          <a:fillRef idx="1">
+            <a:schemeClr val="accent1"/>
+          </a:fillRef>
+          <a:effectRef idx="0">
+            <a:schemeClr val="accent1"/>
+          </a:effectRef>
+          <a:fontRef idx="minor">
+            <a:schemeClr val="lt1"/>
+          </a:fontRef>
+        </p:style>
+        <p:txBody>
+          <a:bodyPr rtlCol="0" anchor="ctr"/>
+          <a:lstStyle/>
+          <a:p>
+            <a:pPr algn="ctr"/>
+            <a:r>
+              <a:rPr lang="en-US" b="1" dirty="0">
+                <a:solidFill>
+                  <a:schemeClr val="tx1"/>
+                </a:solidFill>
+              </a:rPr>
+              <a:t>search.py</a:t>
+            </a:r>
+          </a:p>
+          <a:p>
+            <a:r>
+              <a:rPr lang="en-US" b="1" dirty="0" err="1">
+                <a:solidFill>
+                  <a:schemeClr val="tx1"/>
+                </a:solidFill>
+              </a:rPr>
+              <a:t>ProblemInterface</a:t>
+            </a:r>
+            <a:r>
+              <a:rPr lang="en-US" dirty="0">
+                <a:solidFill>
+                  <a:schemeClr val="tx1"/>
+                </a:solidFill>
+              </a:rPr>
+              <a:t> and </a:t>
+            </a:r>
+            <a:r>
+              <a:rPr lang="en-US" b="1" dirty="0" err="1">
+                <a:solidFill>
+                  <a:schemeClr val="tx1"/>
+                </a:solidFill>
+              </a:rPr>
+              <a:t>DynamicInterface</a:t>
+            </a:r>
+            <a:r>
+              <a:rPr lang="en-US" dirty="0">
+                <a:solidFill>
+                  <a:schemeClr val="tx1"/>
+                </a:solidFill>
+              </a:rPr>
+              <a:t> class: Interfaces for optimization of model parameters/scenarios</a:t>
+            </a:r>
           </a:p>
         </p:txBody>
       </p:sp>
@@ -6400,7 +6406,7 @@
                   <a:schemeClr val="tx1"/>
                 </a:solidFill>
               </a:rPr>
-              <a:t>(mdl, fault) …</a:t>
+              <a:t>(mdl, fault, t) …</a:t>
             </a:r>
           </a:p>
           <a:p>
@@ -7288,7 +7294,7 @@
           <a:p>
             <a:fld id="{BED2B183-217F-4BC0-B001-BC7C35BF6FFB}" type="datetime1">
               <a:rPr lang="en-US" smtClean="0"/>
-              <a:t>6/21/2022</a:t>
+              <a:t>12/21/2022</a:t>
             </a:fld>
             <a:endParaRPr lang="en-US"/>
           </a:p>
@@ -7492,7 +7498,7 @@
           <a:p>
             <a:fld id="{048BDAAE-0CD4-44CD-8607-E7F59634386A}" type="datetime1">
               <a:rPr lang="en-US" smtClean="0"/>
-              <a:t>6/21/2022</a:t>
+              <a:t>12/21/2022</a:t>
             </a:fld>
             <a:endParaRPr lang="en-US"/>
           </a:p>
@@ -7753,7 +7759,7 @@
           <a:p>
             <a:fld id="{847C5E2A-9CF3-4FC0-AEDE-F8AD112B137F}" type="datetime1">
               <a:rPr lang="en-US" smtClean="0"/>
-              <a:t>6/21/2022</a:t>
+              <a:t>12/21/2022</a:t>
             </a:fld>
             <a:endParaRPr lang="en-US"/>
           </a:p>
@@ -8249,7 +8255,7 @@
           <a:p>
             <a:fld id="{22ECCA47-FB90-4A95-9F47-34504C017D8D}" type="datetime1">
               <a:rPr lang="en-US" smtClean="0"/>
-              <a:t>6/21/2022</a:t>
+              <a:t>12/21/2022</a:t>
             </a:fld>
             <a:endParaRPr lang="en-US"/>
           </a:p>
@@ -10784,7 +10790,7 @@
           <a:p>
             <a:fld id="{325C0C2B-FD52-44F8-A140-1347C757CEDB}" type="datetime1">
               <a:rPr lang="en-US" smtClean="0"/>
-              <a:t>6/21/2022</a:t>
+              <a:t>12/21/2022</a:t>
             </a:fld>
             <a:endParaRPr lang="en-US"/>
           </a:p>
@@ -11794,7 +11800,7 @@
             </a:pPr>
             <a:r>
               <a:rPr lang="en-US" dirty="0"/>
-              <a:t>		self.state1.inc( = self.state1 + self.flowname.val2</a:t>
+              <a:t>		self.state1.inc(self.flowname.val2)</a:t>
             </a:r>
           </a:p>
           <a:p>
@@ -12191,7 +12197,7 @@
           <a:p>
             <a:fld id="{3B79F06D-C49D-4DB7-865B-71455723119B}" type="datetime1">
               <a:rPr lang="en-US" smtClean="0"/>
-              <a:t>6/21/2022</a:t>
+              <a:t>12/21/2022</a:t>
             </a:fld>
             <a:endParaRPr lang="en-US" dirty="0"/>
           </a:p>
@@ -12919,7 +12925,7 @@
           <a:p>
             <a:fld id="{5B2B2ECE-C27A-4FBC-A5B7-24ADD502157D}" type="datetime1">
               <a:rPr lang="en-US" smtClean="0"/>
-              <a:t>6/21/2022</a:t>
+              <a:t>12/21/2022</a:t>
             </a:fld>
             <a:endParaRPr lang="en-US"/>
           </a:p>
@@ -13210,7 +13216,7 @@
           <a:p>
             <a:fld id="{1731B435-902B-4CAA-9121-DA572BF5E292}" type="datetime1">
               <a:rPr lang="en-US" smtClean="0"/>
-              <a:t>6/21/2022</a:t>
+              <a:t>12/21/2022</a:t>
             </a:fld>
             <a:endParaRPr lang="en-US"/>
           </a:p>
@@ -13906,7 +13912,7 @@
           <a:p>
             <a:fld id="{C8D67213-7DC7-4566-B4E8-39CBEF03CE40}" type="datetime1">
               <a:rPr lang="en-US" smtClean="0"/>
-              <a:t>6/21/2022</a:t>
+              <a:t>12/21/2022</a:t>
             </a:fld>
             <a:endParaRPr lang="en-US"/>
           </a:p>
@@ -14233,7 +14239,7 @@
           <a:p>
             <a:fld id="{7DBF9849-58D3-4F19-9398-5C19541DD8B5}" type="datetime1">
               <a:rPr lang="en-US" smtClean="0"/>
-              <a:t>6/21/2022</a:t>
+              <a:t>12/21/2022</a:t>
             </a:fld>
             <a:endParaRPr lang="en-US"/>
           </a:p>
@@ -15621,7 +15627,7 @@
           <a:p>
             <a:fld id="{97B5B71A-C210-4A41-9D4A-E72BF6E30274}" type="datetime1">
               <a:rPr lang="en-US" smtClean="0"/>
-              <a:t>6/21/2022</a:t>
+              <a:t>12/21/2022</a:t>
             </a:fld>
             <a:endParaRPr lang="en-US"/>
           </a:p>
@@ -15804,7 +15810,7 @@
           <a:p>
             <a:fld id="{A3176588-272A-4987-B4C9-924A09E3E482}" type="datetime1">
               <a:rPr lang="en-US" smtClean="0"/>
-              <a:t>6/21/2022</a:t>
+              <a:t>12/21/2022</a:t>
             </a:fld>
             <a:endParaRPr lang="en-US"/>
           </a:p>
@@ -15920,7 +15926,7 @@
           <a:p>
             <a:fld id="{B5436C9C-2E17-4388-95ED-94439EAB1C0F}" type="datetime1">
               <a:rPr lang="en-US" smtClean="0"/>
-              <a:t>6/21/2022</a:t>
+              <a:t>12/21/2022</a:t>
             </a:fld>
             <a:endParaRPr lang="en-US"/>
           </a:p>
@@ -17008,7 +17014,7 @@
           <a:p>
             <a:fld id="{C81BBE4E-96F5-4AD3-882E-48793DD5740D}" type="datetime1">
               <a:rPr lang="en-US" smtClean="0"/>
-              <a:t>6/21/2022</a:t>
+              <a:t>12/21/2022</a:t>
             </a:fld>
             <a:endParaRPr lang="en-US"/>
           </a:p>
@@ -17125,7 +17131,7 @@
         </p:spPr>
         <p:txBody>
           <a:bodyPr>
-            <a:normAutofit fontScale="77500" lnSpcReduction="20000"/>
+            <a:normAutofit fontScale="70000" lnSpcReduction="20000"/>
           </a:bodyPr>
           <a:lstStyle/>
           <a:p>
@@ -17176,14 +17182,30 @@
             </a:r>
             <a:r>
               <a:rPr lang="en-US" dirty="0"/>
-              <a:t>)</a:t>
+              <a:t>, disturbances)</a:t>
             </a:r>
           </a:p>
           <a:p>
             <a:pPr lvl="1"/>
             <a:r>
               <a:rPr lang="en-US" dirty="0"/>
-              <a:t>Simulates system once with and without a fault</a:t>
+              <a:t>Simulates system once </a:t>
+            </a:r>
+            <a:r>
+              <a:rPr lang="en-US" b="1" dirty="0"/>
+              <a:t>with</a:t>
+            </a:r>
+            <a:r>
+              <a:rPr lang="en-US" dirty="0"/>
+              <a:t> and </a:t>
+            </a:r>
+            <a:r>
+              <a:rPr lang="en-US" b="1" dirty="0"/>
+              <a:t>without</a:t>
+            </a:r>
+            <a:r>
+              <a:rPr lang="en-US" dirty="0"/>
+              <a:t> a fault</a:t>
             </a:r>
           </a:p>
           <a:p>
@@ -17284,6 +17306,14 @@
             <a:r>
               <a:rPr lang="en-US" dirty="0" err="1"/>
               <a:t>mdl,nomapp</a:t>
+            </a:r>
+            <a:r>
+              <a:rPr lang="en-US" dirty="0"/>
+              <a:t>, **</a:t>
+            </a:r>
+            <a:r>
+              <a:rPr lang="en-US" dirty="0" err="1"/>
+              <a:t>app_args</a:t>
             </a:r>
             <a:r>
               <a:rPr lang="en-US" dirty="0"/>
@@ -17346,7 +17376,7 @@
           <a:p>
             <a:fld id="{C37500C9-F11F-462E-86AE-DBEE126043CC}" type="datetime1">
               <a:rPr lang="en-US" smtClean="0"/>
-              <a:t>6/21/2022</a:t>
+              <a:t>12/21/2022</a:t>
             </a:fld>
             <a:endParaRPr lang="en-US"/>
           </a:p>
@@ -17462,7 +17492,7 @@
           <a:p>
             <a:fld id="{B5436C9C-2E17-4388-95ED-94439EAB1C0F}" type="datetime1">
               <a:rPr lang="en-US" smtClean="0"/>
-              <a:t>6/21/2022</a:t>
+              <a:t>12/21/2022</a:t>
             </a:fld>
             <a:endParaRPr lang="en-US"/>
           </a:p>
@@ -18808,7 +18838,7 @@
           <a:p>
             <a:fld id="{4D066056-E556-4216-9C89-0D01EBF00A92}" type="datetime1">
               <a:rPr lang="en-US" smtClean="0"/>
-              <a:t>6/21/2022</a:t>
+              <a:t>12/21/2022</a:t>
             </a:fld>
             <a:endParaRPr lang="en-US"/>
           </a:p>
@@ -19753,7 +19783,7 @@
           <a:p>
             <a:fld id="{4D066056-E556-4216-9C89-0D01EBF00A92}" type="datetime1">
               <a:rPr lang="en-US" smtClean="0"/>
-              <a:t>6/21/2022</a:t>
+              <a:t>12/21/2022</a:t>
             </a:fld>
             <a:endParaRPr lang="en-US"/>
           </a:p>
@@ -20406,7 +20436,7 @@
           <a:p>
             <a:fld id="{1731B435-902B-4CAA-9121-DA572BF5E292}" type="datetime1">
               <a:rPr lang="en-US" smtClean="0"/>
-              <a:t>6/21/2022</a:t>
+              <a:t>12/21/2022</a:t>
             </a:fld>
             <a:endParaRPr lang="en-US"/>
           </a:p>
@@ -20645,7 +20675,7 @@
           <a:p>
             <a:fld id="{7E577182-BE1B-4D02-83BE-934CD6168783}" type="datetime1">
               <a:rPr lang="en-US" smtClean="0"/>
-              <a:t>6/21/2022</a:t>
+              <a:t>12/21/2022</a:t>
             </a:fld>
             <a:endParaRPr lang="en-US"/>
           </a:p>
@@ -20812,7 +20842,7 @@
           <a:p>
             <a:fld id="{3F17661D-1C8C-4DAB-9D77-C6D1B8FB4259}" type="datetime1">
               <a:rPr lang="en-US" smtClean="0"/>
-              <a:t>6/21/2022</a:t>
+              <a:t>12/21/2022</a:t>
             </a:fld>
             <a:endParaRPr lang="en-US"/>
           </a:p>
@@ -22717,7 +22747,7 @@
           <a:p>
             <a:fld id="{A6695094-39D8-4D6B-B0E8-E94DC8E8EED8}" type="datetime1">
               <a:rPr lang="en-US" smtClean="0"/>
-              <a:t>6/21/2022</a:t>
+              <a:t>12/21/2022</a:t>
             </a:fld>
             <a:endParaRPr lang="en-US"/>
           </a:p>
@@ -23390,7 +23420,7 @@
           <a:p>
             <a:fld id="{F42917D8-DE2B-4B56-9269-E3946BB7F747}" type="datetime1">
               <a:rPr lang="en-US" smtClean="0"/>
-              <a:t>6/21/2022</a:t>
+              <a:t>12/21/2022</a:t>
             </a:fld>
             <a:endParaRPr lang="en-US"/>
           </a:p>
@@ -24071,7 +24101,7 @@
           <a:p>
             <a:fld id="{2C692DC2-27F8-41E2-A26C-4A5AEAD6F271}" type="datetime1">
               <a:rPr lang="en-US" smtClean="0"/>
-              <a:t>6/21/2022</a:t>
+              <a:t>12/21/2022</a:t>
             </a:fld>
             <a:endParaRPr lang="en-US"/>
           </a:p>
@@ -24722,7 +24752,7 @@
           <a:p>
             <a:fld id="{027C03D3-C4D8-4F82-B3DF-07F42D9AF747}" type="datetime1">
               <a:rPr lang="en-US" smtClean="0"/>
-              <a:t>6/21/2022</a:t>
+              <a:t>12/21/2022</a:t>
             </a:fld>
             <a:endParaRPr lang="en-US"/>
           </a:p>
@@ -25265,7 +25295,7 @@
           <a:p>
             <a:fld id="{2CBDB339-778E-4C7A-9A03-DDF59C39E9F9}" type="datetime1">
               <a:rPr lang="en-US" smtClean="0"/>
-              <a:t>6/21/2022</a:t>
+              <a:t>12/21/2022</a:t>
             </a:fld>
             <a:endParaRPr lang="en-US"/>
           </a:p>
@@ -25332,189 +25362,20 @@
       </p:grpSpPr>
       <p:sp>
         <p:nvSpPr>
-          <p:cNvPr id="2" name="Title 1">
-            <a:extLst>
-              <a:ext uri="{FF2B5EF4-FFF2-40B4-BE49-F238E27FC236}">
-                <a16:creationId xmlns:a16="http://schemas.microsoft.com/office/drawing/2014/main" id="{649BD08B-7BD7-4253-86D2-B422D04F88EA}"/>
-              </a:ext>
-            </a:extLst>
-          </p:cNvPr>
-          <p:cNvSpPr>
-            <a:spLocks noGrp="1"/>
-          </p:cNvSpPr>
-          <p:nvPr>
-            <p:ph type="title"/>
-          </p:nvPr>
-        </p:nvSpPr>
-        <p:spPr/>
-        <p:txBody>
-          <a:bodyPr/>
-          <a:lstStyle/>
-          <a:p>
-            <a:r>
-              <a:rPr lang="en-US" dirty="0"/>
-              <a:t>Further Reading</a:t>
-            </a:r>
-          </a:p>
-        </p:txBody>
-      </p:sp>
-      <p:sp>
-        <p:nvSpPr>
-          <p:cNvPr id="3" name="Content Placeholder 2">
-            <a:extLst>
-              <a:ext uri="{FF2B5EF4-FFF2-40B4-BE49-F238E27FC236}">
-                <a16:creationId xmlns:a16="http://schemas.microsoft.com/office/drawing/2014/main" id="{A5EE87F7-4734-48A0-B7B7-7C2AE4C68364}"/>
-              </a:ext>
-            </a:extLst>
-          </p:cNvPr>
-          <p:cNvSpPr>
-            <a:spLocks noGrp="1"/>
-          </p:cNvSpPr>
-          <p:nvPr>
-            <p:ph idx="1"/>
-          </p:nvPr>
+          <p:cNvPr id="24" name="Flowchart: Process 23">
+            <a:extLst>
+              <a:ext uri="{FF2B5EF4-FFF2-40B4-BE49-F238E27FC236}">
+                <a16:creationId xmlns:a16="http://schemas.microsoft.com/office/drawing/2014/main" id="{0DA22C5F-7356-4811-8DCD-8F01DB90DD2C}"/>
+              </a:ext>
+            </a:extLst>
+          </p:cNvPr>
+          <p:cNvSpPr/>
+          <p:nvPr/>
         </p:nvSpPr>
         <p:spPr>
           <a:xfrm>
-            <a:off x="838200" y="4514400"/>
-            <a:ext cx="10515600" cy="1662562"/>
-          </a:xfrm>
-        </p:spPr>
-        <p:txBody>
-          <a:bodyPr>
-            <a:normAutofit fontScale="70000" lnSpcReduction="20000"/>
-          </a:bodyPr>
-          <a:lstStyle/>
-          <a:p>
-            <a:pPr marL="0" indent="0">
-              <a:buNone/>
-            </a:pPr>
-            <a:r>
-              <a:rPr lang="en-US" dirty="0"/>
-              <a:t>Explanatory Papers</a:t>
-            </a:r>
-          </a:p>
-          <a:p>
-            <a:r>
-              <a:rPr lang="en-US" dirty="0"/>
-              <a:t>D. Hulse, H. Walsh, A. Dong, C. Hoyle, I.Y. </a:t>
-            </a:r>
-            <a:r>
-              <a:rPr lang="en-US" dirty="0" err="1"/>
-              <a:t>Tumer</a:t>
-            </a:r>
-            <a:r>
-              <a:rPr lang="en-US" dirty="0"/>
-              <a:t>, C. Kulkarni, K. Goebel, “</a:t>
-            </a:r>
-            <a:r>
-              <a:rPr lang="en-US" dirty="0" err="1"/>
-              <a:t>fmdtools</a:t>
-            </a:r>
-            <a:r>
-              <a:rPr lang="en-US" dirty="0"/>
-              <a:t>: A Fault Propagation Toolkit for Resilience Assessment in Early Design“ IJPHM. Submitted</a:t>
-            </a:r>
-          </a:p>
-          <a:p>
-            <a:r>
-              <a:rPr lang="en-US" dirty="0"/>
-              <a:t>D. Hulse, C. Hoyle, I.Y. </a:t>
-            </a:r>
-            <a:r>
-              <a:rPr lang="en-US" dirty="0" err="1"/>
-              <a:t>Tumer</a:t>
-            </a:r>
-            <a:r>
-              <a:rPr lang="en-US" dirty="0"/>
-              <a:t>, K. Goebel, C. Kulkarni, “Temporal Fault Injection Considerations in Resilience Quantification.” ASME IDETC/CIE 2020, Design Automation Conference. IDETC2020-19287. </a:t>
-            </a:r>
-          </a:p>
-          <a:p>
-            <a:endParaRPr lang="en-US" dirty="0"/>
-          </a:p>
-          <a:p>
-            <a:endParaRPr lang="en-US" dirty="0"/>
-          </a:p>
-          <a:p>
-            <a:endParaRPr lang="en-US" dirty="0"/>
-          </a:p>
-        </p:txBody>
-      </p:sp>
-      <p:sp>
-        <p:nvSpPr>
-          <p:cNvPr id="4" name="Date Placeholder 3">
-            <a:extLst>
-              <a:ext uri="{FF2B5EF4-FFF2-40B4-BE49-F238E27FC236}">
-                <a16:creationId xmlns:a16="http://schemas.microsoft.com/office/drawing/2014/main" id="{284263ED-CD25-4CBA-9796-D1266F68690B}"/>
-              </a:ext>
-            </a:extLst>
-          </p:cNvPr>
-          <p:cNvSpPr>
-            <a:spLocks noGrp="1"/>
-          </p:cNvSpPr>
-          <p:nvPr>
-            <p:ph type="dt" sz="half" idx="10"/>
-          </p:nvPr>
-        </p:nvSpPr>
-        <p:spPr/>
-        <p:txBody>
-          <a:bodyPr/>
-          <a:lstStyle/>
-          <a:p>
-            <a:fld id="{F2B4AA4E-DFA2-485D-8105-D345E4DF8240}" type="datetime1">
-              <a:rPr lang="en-US" smtClean="0"/>
-              <a:t>6/21/2022</a:t>
-            </a:fld>
-            <a:endParaRPr lang="en-US"/>
-          </a:p>
-        </p:txBody>
-      </p:sp>
-      <p:sp>
-        <p:nvSpPr>
-          <p:cNvPr id="5" name="Slide Number Placeholder 4">
-            <a:extLst>
-              <a:ext uri="{FF2B5EF4-FFF2-40B4-BE49-F238E27FC236}">
-                <a16:creationId xmlns:a16="http://schemas.microsoft.com/office/drawing/2014/main" id="{B7E9811C-CDA6-4272-881F-417F62C1A4A7}"/>
-              </a:ext>
-            </a:extLst>
-          </p:cNvPr>
-          <p:cNvSpPr>
-            <a:spLocks noGrp="1"/>
-          </p:cNvSpPr>
-          <p:nvPr>
-            <p:ph type="sldNum" sz="quarter" idx="12"/>
-          </p:nvPr>
-        </p:nvSpPr>
-        <p:spPr/>
-        <p:txBody>
-          <a:bodyPr/>
-          <a:lstStyle/>
-          <a:p>
-            <a:fld id="{7A4D9045-47C6-4ED3-A320-E2DFE9546330}" type="slidenum">
-              <a:rPr lang="en-US" smtClean="0"/>
-              <a:t>37</a:t>
-            </a:fld>
-            <a:endParaRPr lang="en-US" dirty="0"/>
-          </a:p>
-        </p:txBody>
-      </p:sp>
-      <p:sp>
-        <p:nvSpPr>
-          <p:cNvPr id="6" name="Flowchart: Process 5">
-            <a:extLst>
-              <a:ext uri="{FF2B5EF4-FFF2-40B4-BE49-F238E27FC236}">
-                <a16:creationId xmlns:a16="http://schemas.microsoft.com/office/drawing/2014/main" id="{BB429D8C-249B-4BEA-AAC2-3E7F806D3147}"/>
-              </a:ext>
-            </a:extLst>
-          </p:cNvPr>
-          <p:cNvSpPr/>
-          <p:nvPr/>
-        </p:nvSpPr>
-        <p:spPr>
-          <a:xfrm>
-            <a:off x="7826401" y="2089303"/>
-            <a:ext cx="3221548" cy="712432"/>
+            <a:off x="4025322" y="2890003"/>
+            <a:ext cx="3221549" cy="894530"/>
           </a:xfrm>
           <a:prstGeom prst="flowChartProcess">
             <a:avLst/>
@@ -25558,13 +25419,348 @@
                   <a:schemeClr val="tx1"/>
                 </a:solidFill>
               </a:rPr>
+              <a:t>7. Nominal/Nested Approaches</a:t>
+            </a:r>
+          </a:p>
+          <a:p>
+            <a:pPr algn="ctr"/>
+            <a:r>
+              <a:rPr lang="en-US" sz="1000" dirty="0">
+                <a:solidFill>
+                  <a:schemeClr val="tx1"/>
+                </a:solidFill>
+              </a:rPr>
+              <a:t>/docs/Nominal Approach Use-</a:t>
+            </a:r>
+            <a:r>
+              <a:rPr lang="en-US" sz="1000" dirty="0" err="1">
+                <a:solidFill>
+                  <a:schemeClr val="tx1"/>
+                </a:solidFill>
+              </a:rPr>
+              <a:t>Cases.ipynb</a:t>
+            </a:r>
+            <a:endParaRPr lang="en-US" sz="1000" dirty="0">
+              <a:solidFill>
+                <a:schemeClr val="tx1"/>
+              </a:solidFill>
+            </a:endParaRPr>
+          </a:p>
+          <a:p>
+            <a:pPr algn="ctr"/>
+            <a:r>
+              <a:rPr lang="en-US" sz="1000" dirty="0">
+                <a:solidFill>
+                  <a:schemeClr val="tx1"/>
+                </a:solidFill>
+              </a:rPr>
+              <a:t>/</a:t>
+            </a:r>
+            <a:r>
+              <a:rPr lang="en-US" sz="1000" dirty="0" err="1">
+                <a:solidFill>
+                  <a:schemeClr val="tx1"/>
+                </a:solidFill>
+              </a:rPr>
+              <a:t>example_rover</a:t>
+            </a:r>
+            <a:r>
+              <a:rPr lang="en-US" sz="1000" dirty="0">
+                <a:solidFill>
+                  <a:schemeClr val="tx1"/>
+                </a:solidFill>
+              </a:rPr>
+              <a:t>/</a:t>
+            </a:r>
+            <a:r>
+              <a:rPr lang="en-US" sz="1000" dirty="0" err="1">
+                <a:solidFill>
+                  <a:schemeClr val="tx1"/>
+                </a:solidFill>
+              </a:rPr>
+              <a:t>degradation_modelling</a:t>
+            </a:r>
+            <a:r>
+              <a:rPr lang="en-US" sz="1000" dirty="0">
+                <a:solidFill>
+                  <a:schemeClr val="tx1"/>
+                </a:solidFill>
+              </a:rPr>
+              <a:t>/Degradation Modelling </a:t>
+            </a:r>
+            <a:r>
+              <a:rPr lang="en-US" sz="1000" dirty="0" err="1">
+                <a:solidFill>
+                  <a:schemeClr val="tx1"/>
+                </a:solidFill>
+              </a:rPr>
+              <a:t>Notebook.ipynb</a:t>
+            </a:r>
+            <a:endParaRPr lang="en-US" sz="1000" dirty="0">
+              <a:solidFill>
+                <a:schemeClr val="tx1"/>
+              </a:solidFill>
+            </a:endParaRPr>
+          </a:p>
+        </p:txBody>
+      </p:sp>
+      <p:sp>
+        <p:nvSpPr>
+          <p:cNvPr id="2" name="Title 1">
+            <a:extLst>
+              <a:ext uri="{FF2B5EF4-FFF2-40B4-BE49-F238E27FC236}">
+                <a16:creationId xmlns:a16="http://schemas.microsoft.com/office/drawing/2014/main" id="{649BD08B-7BD7-4253-86D2-B422D04F88EA}"/>
+              </a:ext>
+            </a:extLst>
+          </p:cNvPr>
+          <p:cNvSpPr>
+            <a:spLocks noGrp="1"/>
+          </p:cNvSpPr>
+          <p:nvPr>
+            <p:ph type="title"/>
+          </p:nvPr>
+        </p:nvSpPr>
+        <p:spPr/>
+        <p:txBody>
+          <a:bodyPr/>
+          <a:lstStyle/>
+          <a:p>
+            <a:r>
+              <a:rPr lang="en-US" dirty="0"/>
+              <a:t>Further Reading</a:t>
+            </a:r>
+          </a:p>
+        </p:txBody>
+      </p:sp>
+      <p:sp>
+        <p:nvSpPr>
+          <p:cNvPr id="3" name="Content Placeholder 2">
+            <a:extLst>
+              <a:ext uri="{FF2B5EF4-FFF2-40B4-BE49-F238E27FC236}">
+                <a16:creationId xmlns:a16="http://schemas.microsoft.com/office/drawing/2014/main" id="{A5EE87F7-4734-48A0-B7B7-7C2AE4C68364}"/>
+              </a:ext>
+            </a:extLst>
+          </p:cNvPr>
+          <p:cNvSpPr>
+            <a:spLocks noGrp="1"/>
+          </p:cNvSpPr>
+          <p:nvPr>
+            <p:ph idx="1"/>
+          </p:nvPr>
+        </p:nvSpPr>
+        <p:spPr>
+          <a:xfrm>
+            <a:off x="838200" y="4791398"/>
+            <a:ext cx="10515600" cy="1706617"/>
+          </a:xfrm>
+        </p:spPr>
+        <p:txBody>
+          <a:bodyPr>
+            <a:normAutofit fontScale="40000" lnSpcReduction="20000"/>
+          </a:bodyPr>
+          <a:lstStyle/>
+          <a:p>
+            <a:r>
+              <a:rPr lang="en-US" dirty="0">
+                <a:latin typeface="Bahnschrift SemiBold Condensed" panose="020B0502040204020203" pitchFamily="34" charset="0"/>
+              </a:rPr>
+              <a:t>D. Hulse, H. Walsh, A. Dong, C. Hoyle, I.Y. </a:t>
+            </a:r>
+            <a:r>
+              <a:rPr lang="en-US" dirty="0" err="1">
+                <a:latin typeface="Bahnschrift SemiBold Condensed" panose="020B0502040204020203" pitchFamily="34" charset="0"/>
+              </a:rPr>
+              <a:t>Tumer</a:t>
+            </a:r>
+            <a:r>
+              <a:rPr lang="en-US" dirty="0">
+                <a:latin typeface="Bahnschrift SemiBold Condensed" panose="020B0502040204020203" pitchFamily="34" charset="0"/>
+              </a:rPr>
+              <a:t>, C. Kulkarni, K. Goebel, “</a:t>
+            </a:r>
+            <a:r>
+              <a:rPr lang="en-US" dirty="0" err="1">
+                <a:latin typeface="Bahnschrift SemiBold Condensed" panose="020B0502040204020203" pitchFamily="34" charset="0"/>
+              </a:rPr>
+              <a:t>fmdtools</a:t>
+            </a:r>
+            <a:r>
+              <a:rPr lang="en-US" dirty="0">
+                <a:latin typeface="Bahnschrift SemiBold Condensed" panose="020B0502040204020203" pitchFamily="34" charset="0"/>
+              </a:rPr>
+              <a:t>: A Fault Propagation Toolkit for Resilience Assessment in Early Design“ IJPHM. Submitted</a:t>
+            </a:r>
+          </a:p>
+          <a:p>
+            <a:r>
+              <a:rPr lang="en-US" dirty="0">
+                <a:latin typeface="Bahnschrift SemiBold Condensed" panose="020B0502040204020203" pitchFamily="34" charset="0"/>
+              </a:rPr>
+              <a:t>D. Hulse, C. Hoyle, I.Y. </a:t>
+            </a:r>
+            <a:r>
+              <a:rPr lang="en-US" dirty="0" err="1">
+                <a:latin typeface="Bahnschrift SemiBold Condensed" panose="020B0502040204020203" pitchFamily="34" charset="0"/>
+              </a:rPr>
+              <a:t>Tumer</a:t>
+            </a:r>
+            <a:r>
+              <a:rPr lang="en-US" dirty="0">
+                <a:latin typeface="Bahnschrift SemiBold Condensed" panose="020B0502040204020203" pitchFamily="34" charset="0"/>
+              </a:rPr>
+              <a:t>, K. Goebel, C. Kulkarni, “Temporal Fault Injection Considerations in Resilience Quantification.” ASME IDETC/CIE 2020, Design Automation Conference. IDETC2020-19287. </a:t>
+            </a:r>
+          </a:p>
+          <a:p>
+            <a:r>
+              <a:rPr lang="en-US" dirty="0">
+                <a:latin typeface="Bahnschrift SemiBold Condensed" panose="020B0502040204020203" pitchFamily="34" charset="0"/>
+              </a:rPr>
+              <a:t>Hulse, D., &amp; Irshad, L. (2022). Synthetic fault mode generation for resilience analysis and failure mechanism discovery. Journal of Mechanical Design, 145(3), 031707.</a:t>
+            </a:r>
+          </a:p>
+          <a:p>
+            <a:r>
+              <a:rPr lang="en-US" dirty="0">
+                <a:latin typeface="Bahnschrift SemiBold Condensed" panose="020B0502040204020203" pitchFamily="34" charset="0"/>
+              </a:rPr>
+              <a:t>Hulse, D., &amp; Irshad, L. (2022, September). Using Degradation Modeling to Identify Fragile Operational Conditions in Human-and Component-driven Resilience Assessment. In 2022 IEEE/AIAA 41st Digital Avionics Systems Conference (DASC) (pp. 1-10). IEEE.</a:t>
+            </a:r>
+          </a:p>
+          <a:p>
+            <a:r>
+              <a:rPr lang="en-US" dirty="0">
+                <a:latin typeface="Bahnschrift SemiBold Condensed" panose="020B0502040204020203" pitchFamily="34" charset="0"/>
+              </a:rPr>
+              <a:t>Irshad, L., &amp; Hulse, D. (2022, August). Resilience Modeling in Complex Engineered Systems With Human-Machine Interactions. In International Design Engineering Technical Conferences and Computers and Information in Engineering Conference (Vol. 86212, p. V002T02A024). American Society of Mechanical Engineers.</a:t>
+            </a:r>
+          </a:p>
+        </p:txBody>
+      </p:sp>
+      <p:sp>
+        <p:nvSpPr>
+          <p:cNvPr id="4" name="Date Placeholder 3">
+            <a:extLst>
+              <a:ext uri="{FF2B5EF4-FFF2-40B4-BE49-F238E27FC236}">
+                <a16:creationId xmlns:a16="http://schemas.microsoft.com/office/drawing/2014/main" id="{284263ED-CD25-4CBA-9796-D1266F68690B}"/>
+              </a:ext>
+            </a:extLst>
+          </p:cNvPr>
+          <p:cNvSpPr>
+            <a:spLocks noGrp="1"/>
+          </p:cNvSpPr>
+          <p:nvPr>
+            <p:ph type="dt" sz="half" idx="10"/>
+          </p:nvPr>
+        </p:nvSpPr>
+        <p:spPr/>
+        <p:txBody>
+          <a:bodyPr/>
+          <a:lstStyle/>
+          <a:p>
+            <a:fld id="{F2B4AA4E-DFA2-485D-8105-D345E4DF8240}" type="datetime1">
+              <a:rPr lang="en-US" smtClean="0"/>
+              <a:t>12/21/2022</a:t>
+            </a:fld>
+            <a:endParaRPr lang="en-US"/>
+          </a:p>
+        </p:txBody>
+      </p:sp>
+      <p:sp>
+        <p:nvSpPr>
+          <p:cNvPr id="5" name="Slide Number Placeholder 4">
+            <a:extLst>
+              <a:ext uri="{FF2B5EF4-FFF2-40B4-BE49-F238E27FC236}">
+                <a16:creationId xmlns:a16="http://schemas.microsoft.com/office/drawing/2014/main" id="{B7E9811C-CDA6-4272-881F-417F62C1A4A7}"/>
+              </a:ext>
+            </a:extLst>
+          </p:cNvPr>
+          <p:cNvSpPr>
+            <a:spLocks noGrp="1"/>
+          </p:cNvSpPr>
+          <p:nvPr>
+            <p:ph type="sldNum" sz="quarter" idx="12"/>
+          </p:nvPr>
+        </p:nvSpPr>
+        <p:spPr/>
+        <p:txBody>
+          <a:bodyPr/>
+          <a:lstStyle/>
+          <a:p>
+            <a:fld id="{7A4D9045-47C6-4ED3-A320-E2DFE9546330}" type="slidenum">
+              <a:rPr lang="en-US" smtClean="0"/>
+              <a:t>37</a:t>
+            </a:fld>
+            <a:endParaRPr lang="en-US" dirty="0"/>
+          </a:p>
+        </p:txBody>
+      </p:sp>
+      <p:sp>
+        <p:nvSpPr>
+          <p:cNvPr id="6" name="Flowchart: Process 5">
+            <a:extLst>
+              <a:ext uri="{FF2B5EF4-FFF2-40B4-BE49-F238E27FC236}">
+                <a16:creationId xmlns:a16="http://schemas.microsoft.com/office/drawing/2014/main" id="{BB429D8C-249B-4BEA-AAC2-3E7F806D3147}"/>
+              </a:ext>
+            </a:extLst>
+          </p:cNvPr>
+          <p:cNvSpPr/>
+          <p:nvPr/>
+        </p:nvSpPr>
+        <p:spPr>
+          <a:xfrm>
+            <a:off x="4028623" y="3781335"/>
+            <a:ext cx="3221548" cy="859342"/>
+          </a:xfrm>
+          <a:prstGeom prst="flowChartProcess">
+            <a:avLst/>
+          </a:prstGeom>
+          <a:solidFill>
+            <a:schemeClr val="bg1"/>
+          </a:solidFill>
+          <a:ln w="38100">
+            <a:solidFill>
+              <a:schemeClr val="tx1">
+                <a:lumMod val="50000"/>
+                <a:lumOff val="50000"/>
+              </a:schemeClr>
+            </a:solidFill>
+          </a:ln>
+        </p:spPr>
+        <p:style>
+          <a:lnRef idx="2">
+            <a:schemeClr val="accent1">
+              <a:shade val="50000"/>
+            </a:schemeClr>
+          </a:lnRef>
+          <a:fillRef idx="1">
+            <a:schemeClr val="accent1"/>
+          </a:fillRef>
+          <a:effectRef idx="0">
+            <a:schemeClr val="accent1"/>
+          </a:effectRef>
+          <a:fontRef idx="minor">
+            <a:schemeClr val="lt1"/>
+          </a:fontRef>
+        </p:style>
+        <p:txBody>
+          <a:bodyPr rtlCol="0" anchor="ctr"/>
+          <a:lstStyle/>
+          <a:p>
+            <a:pPr algn="ctr"/>
+            <a:r>
+              <a:rPr lang="en-US" b="1" dirty="0">
+                <a:solidFill>
+                  <a:schemeClr val="tx1"/>
+                </a:solidFill>
+              </a:rPr>
               <a:t>8. Stochastic Simulation</a:t>
             </a:r>
           </a:p>
           <a:p>
             <a:pPr algn="ctr"/>
             <a:r>
-              <a:rPr lang="en-US" sz="1400" dirty="0">
+              <a:rPr lang="en-US" sz="1000" dirty="0">
                 <a:solidFill>
                   <a:schemeClr val="tx1"/>
                 </a:solidFill>
@@ -25572,7 +25768,7 @@
               <a:t>/</a:t>
             </a:r>
             <a:r>
-              <a:rPr lang="en-US" sz="1400" dirty="0" err="1">
+              <a:rPr lang="en-US" sz="1000" dirty="0" err="1">
                 <a:solidFill>
                   <a:schemeClr val="tx1"/>
                 </a:solidFill>
@@ -25580,7 +25776,7 @@
               <a:t>example_pump</a:t>
             </a:r>
             <a:r>
-              <a:rPr lang="en-US" sz="1400" dirty="0">
+              <a:rPr lang="en-US" sz="1000" dirty="0">
                 <a:solidFill>
                   <a:schemeClr val="tx1"/>
                 </a:solidFill>
@@ -25588,14 +25784,14 @@
               <a:t>/Stochastic </a:t>
             </a:r>
             <a:r>
-              <a:rPr lang="en-US" sz="1400" dirty="0" err="1">
+              <a:rPr lang="en-US" sz="1000" dirty="0" err="1">
                 <a:solidFill>
                   <a:schemeClr val="tx1"/>
                 </a:solidFill>
               </a:rPr>
               <a:t>Modelling.ipynb</a:t>
             </a:r>
-            <a:endParaRPr lang="en-US" sz="1400" dirty="0">
+            <a:endParaRPr lang="en-US" sz="1000" dirty="0">
               <a:solidFill>
                 <a:schemeClr val="tx1"/>
               </a:solidFill>
@@ -25668,30 +25864,22 @@
           <a:p>
             <a:pPr algn="ctr"/>
             <a:r>
-              <a:rPr lang="en-US" sz="1600" dirty="0">
-                <a:solidFill>
-                  <a:schemeClr val="tx1"/>
-                </a:solidFill>
-              </a:rPr>
-              <a:t>/</a:t>
-            </a:r>
-            <a:r>
-              <a:rPr lang="en-US" sz="1400" dirty="0">
-                <a:solidFill>
-                  <a:schemeClr val="tx1"/>
-                </a:solidFill>
-              </a:rPr>
-              <a:t>docs/Model Structure Visualization </a:t>
-            </a:r>
-            <a:r>
-              <a:rPr lang="en-US" sz="1400" dirty="0" err="1">
+              <a:rPr lang="en-US" sz="1000" dirty="0">
+                <a:solidFill>
+                  <a:schemeClr val="tx1"/>
+                </a:solidFill>
+              </a:rPr>
+              <a:t>/docs/Model Structure Visualization </a:t>
+            </a:r>
+            <a:r>
+              <a:rPr lang="en-US" sz="1000" dirty="0" err="1">
                 <a:solidFill>
                   <a:schemeClr val="tx1"/>
                 </a:solidFill>
               </a:rPr>
               <a:t>Tutorial.ipynb</a:t>
             </a:r>
-            <a:endParaRPr lang="en-US" sz="1400" dirty="0">
+            <a:endParaRPr lang="en-US" sz="1000" dirty="0">
               <a:solidFill>
                 <a:schemeClr val="tx1"/>
               </a:solidFill>
@@ -25713,8 +25901,8 @@
         </p:nvSpPr>
         <p:spPr>
           <a:xfrm>
-            <a:off x="708600" y="3611446"/>
-            <a:ext cx="2774400" cy="712432"/>
+            <a:off x="708600" y="3164518"/>
+            <a:ext cx="2774400" cy="519030"/>
           </a:xfrm>
           <a:prstGeom prst="flowChartProcess">
             <a:avLst/>
@@ -25764,7 +25952,7 @@
           <a:p>
             <a:pPr algn="ctr"/>
             <a:r>
-              <a:rPr lang="en-US" sz="1400" dirty="0">
+              <a:rPr lang="en-US" sz="1000" dirty="0">
                 <a:solidFill>
                   <a:schemeClr val="tx1"/>
                 </a:solidFill>
@@ -25772,7 +25960,7 @@
               <a:t>/</a:t>
             </a:r>
             <a:r>
-              <a:rPr lang="en-US" sz="1400" dirty="0" err="1">
+              <a:rPr lang="en-US" sz="1000" dirty="0" err="1">
                 <a:solidFill>
                   <a:schemeClr val="tx1"/>
                 </a:solidFill>
@@ -25780,7 +25968,7 @@
               <a:t>example_pump</a:t>
             </a:r>
             <a:r>
-              <a:rPr lang="en-US" sz="1400" dirty="0">
+              <a:rPr lang="en-US" sz="1000" dirty="0">
                 <a:solidFill>
                   <a:schemeClr val="tx1"/>
                 </a:solidFill>
@@ -25788,14 +25976,14 @@
               <a:t>/Pump Example </a:t>
             </a:r>
             <a:r>
-              <a:rPr lang="en-US" sz="1400" dirty="0" err="1">
+              <a:rPr lang="en-US" sz="1000" dirty="0" err="1">
                 <a:solidFill>
                   <a:schemeClr val="tx1"/>
                 </a:solidFill>
               </a:rPr>
               <a:t>Notebook.ipynb</a:t>
             </a:r>
-            <a:endParaRPr lang="en-US" dirty="0">
+            <a:endParaRPr lang="en-US" sz="1000" dirty="0">
               <a:solidFill>
                 <a:schemeClr val="tx1"/>
               </a:solidFill>
@@ -25818,7 +26006,7 @@
         <p:spPr>
           <a:xfrm>
             <a:off x="4031924" y="1860855"/>
-            <a:ext cx="3221549" cy="712432"/>
+            <a:ext cx="3221549" cy="504406"/>
           </a:xfrm>
           <a:prstGeom prst="flowChartProcess">
             <a:avLst/>
@@ -25862,36 +26050,28 @@
                   <a:schemeClr val="tx1"/>
                 </a:solidFill>
               </a:rPr>
-              <a:t>4. Fault Sampling Approaches</a:t>
+              <a:t>5. Fault Sampling Approaches</a:t>
             </a:r>
           </a:p>
           <a:p>
             <a:pPr algn="ctr"/>
             <a:r>
-              <a:rPr lang="en-US" sz="1600" dirty="0">
-                <a:solidFill>
-                  <a:schemeClr val="tx1"/>
-                </a:solidFill>
-              </a:rPr>
-              <a:t>/</a:t>
-            </a:r>
-            <a:r>
-              <a:rPr lang="en-US" sz="1400" dirty="0">
-                <a:solidFill>
-                  <a:schemeClr val="tx1"/>
-                </a:solidFill>
-              </a:rPr>
-              <a:t>docs/Approach Use-</a:t>
-            </a:r>
-            <a:r>
-              <a:rPr lang="en-US" sz="1400" dirty="0" err="1">
+              <a:rPr lang="en-US" sz="1000" dirty="0">
+                <a:solidFill>
+                  <a:schemeClr val="tx1"/>
+                </a:solidFill>
+              </a:rPr>
+              <a:t>/docs/Approach Use-</a:t>
+            </a:r>
+            <a:r>
+              <a:rPr lang="en-US" sz="1000" dirty="0" err="1">
                 <a:solidFill>
                   <a:schemeClr val="tx1"/>
                 </a:solidFill>
               </a:rPr>
               <a:t>Cases.ipynb</a:t>
             </a:r>
-            <a:endParaRPr lang="en-US" sz="1400" dirty="0">
+            <a:endParaRPr lang="en-US" sz="1000" dirty="0">
               <a:solidFill>
                 <a:schemeClr val="tx1"/>
               </a:solidFill>
@@ -25913,8 +26093,8 @@
         </p:nvSpPr>
         <p:spPr>
           <a:xfrm>
-            <a:off x="4031924" y="2719626"/>
-            <a:ext cx="3221549" cy="712432"/>
+            <a:off x="4028623" y="2365753"/>
+            <a:ext cx="3221549" cy="543212"/>
           </a:xfrm>
           <a:prstGeom prst="flowChartProcess">
             <a:avLst/>
@@ -25964,7 +26144,7 @@
           <a:p>
             <a:pPr algn="ctr"/>
             <a:r>
-              <a:rPr lang="en-US" sz="1600" dirty="0">
+              <a:rPr lang="en-US" sz="1000" dirty="0">
                 <a:solidFill>
                   <a:schemeClr val="tx1"/>
                 </a:solidFill>
@@ -25972,7 +26152,7 @@
               <a:t>/</a:t>
             </a:r>
             <a:r>
-              <a:rPr lang="en-US" sz="1400" dirty="0" err="1">
+              <a:rPr lang="en-US" sz="1000" dirty="0" err="1">
                 <a:solidFill>
                   <a:schemeClr val="tx1"/>
                 </a:solidFill>
@@ -25980,7 +26160,7 @@
               <a:t>example_pump</a:t>
             </a:r>
             <a:r>
-              <a:rPr lang="en-US" sz="1400" dirty="0">
+              <a:rPr lang="en-US" sz="1000" dirty="0">
                 <a:solidFill>
                   <a:schemeClr val="tx1"/>
                 </a:solidFill>
@@ -25988,14 +26168,14 @@
               <a:t>/Parallelism </a:t>
             </a:r>
             <a:r>
-              <a:rPr lang="en-US" sz="1400" dirty="0" err="1">
+              <a:rPr lang="en-US" sz="1000" dirty="0" err="1">
                 <a:solidFill>
                   <a:schemeClr val="tx1"/>
                 </a:solidFill>
               </a:rPr>
               <a:t>Tutorial.ipynb</a:t>
             </a:r>
-            <a:endParaRPr lang="en-US" sz="1400" dirty="0">
+            <a:endParaRPr lang="en-US" sz="1000" dirty="0">
               <a:solidFill>
                 <a:schemeClr val="tx1"/>
               </a:solidFill>
@@ -26148,8 +26328,8 @@
         </p:nvSpPr>
         <p:spPr>
           <a:xfrm>
-            <a:off x="708600" y="2719626"/>
-            <a:ext cx="2774400" cy="712432"/>
+            <a:off x="708600" y="2592764"/>
+            <a:ext cx="2774400" cy="581689"/>
           </a:xfrm>
           <a:prstGeom prst="flowChartProcess">
             <a:avLst/>
@@ -26199,7 +26379,7 @@
           <a:p>
             <a:pPr algn="ctr"/>
             <a:r>
-              <a:rPr lang="en-US" sz="1600" dirty="0">
+              <a:rPr lang="en-US" sz="1000" dirty="0">
                 <a:solidFill>
                   <a:schemeClr val="tx1"/>
                 </a:solidFill>
@@ -26207,7 +26387,7 @@
               <a:t>/</a:t>
             </a:r>
             <a:r>
-              <a:rPr lang="en-US" sz="1400" dirty="0" err="1">
+              <a:rPr lang="en-US" sz="1000" dirty="0" err="1">
                 <a:solidFill>
                   <a:schemeClr val="tx1"/>
                 </a:solidFill>
@@ -26215,7 +26395,7 @@
               <a:t>example_multirotor</a:t>
             </a:r>
             <a:r>
-              <a:rPr lang="en-US" sz="1400" dirty="0">
+              <a:rPr lang="en-US" sz="1000" dirty="0">
                 <a:solidFill>
                   <a:schemeClr val="tx1"/>
                 </a:solidFill>
@@ -26223,14 +26403,14 @@
               <a:t>/</a:t>
             </a:r>
             <a:r>
-              <a:rPr lang="en-US" sz="1400" dirty="0" err="1">
+              <a:rPr lang="en-US" sz="1000" dirty="0" err="1">
                 <a:solidFill>
                   <a:schemeClr val="tx1"/>
                 </a:solidFill>
               </a:rPr>
               <a:t>Demonstration.ipynb</a:t>
             </a:r>
-            <a:endParaRPr lang="en-US" sz="1400" dirty="0">
+            <a:endParaRPr lang="en-US" sz="1000" dirty="0">
               <a:solidFill>
                 <a:schemeClr val="tx1"/>
               </a:solidFill>
@@ -26318,10 +26498,10 @@
       </p:sp>
       <p:sp>
         <p:nvSpPr>
-          <p:cNvPr id="24" name="Flowchart: Process 23">
-            <a:extLst>
-              <a:ext uri="{FF2B5EF4-FFF2-40B4-BE49-F238E27FC236}">
-                <a16:creationId xmlns:a16="http://schemas.microsoft.com/office/drawing/2014/main" id="{0DA22C5F-7356-4811-8DCD-8F01DB90DD2C}"/>
+          <p:cNvPr id="25" name="Flowchart: Process 24">
+            <a:extLst>
+              <a:ext uri="{FF2B5EF4-FFF2-40B4-BE49-F238E27FC236}">
+                <a16:creationId xmlns:a16="http://schemas.microsoft.com/office/drawing/2014/main" id="{8B1382E9-DCDF-429F-8209-AC2309FE35DF}"/>
               </a:ext>
             </a:extLst>
           </p:cNvPr>
@@ -26330,8 +26510,8 @@
         </p:nvSpPr>
         <p:spPr>
           <a:xfrm>
-            <a:off x="4028624" y="3622580"/>
-            <a:ext cx="3221549" cy="712432"/>
+            <a:off x="7817738" y="3842006"/>
+            <a:ext cx="3536062" cy="737999"/>
           </a:xfrm>
           <a:prstGeom prst="flowChartProcess">
             <a:avLst/>
@@ -26375,13 +26555,13 @@
                   <a:schemeClr val="tx1"/>
                 </a:solidFill>
               </a:rPr>
-              <a:t>7. Nominal/Nested Approaches</a:t>
+              <a:t>11. Further Examples</a:t>
             </a:r>
           </a:p>
           <a:p>
             <a:pPr algn="ctr"/>
             <a:r>
-              <a:rPr lang="en-US" sz="1600" dirty="0">
+              <a:rPr lang="en-US" sz="1000" dirty="0">
                 <a:solidFill>
                   <a:schemeClr val="tx1"/>
                 </a:solidFill>
@@ -26389,35 +26569,83 @@
               <a:t>/</a:t>
             </a:r>
             <a:r>
-              <a:rPr lang="en-US" sz="1400" dirty="0">
-                <a:solidFill>
-                  <a:schemeClr val="tx1"/>
-                </a:solidFill>
-              </a:rPr>
-              <a:t>docs/Nominal Approach Use-</a:t>
-            </a:r>
-            <a:r>
-              <a:rPr lang="en-US" sz="1400" dirty="0" err="1">
-                <a:solidFill>
-                  <a:schemeClr val="tx1"/>
-                </a:solidFill>
-              </a:rPr>
-              <a:t>Cases.ipynb</a:t>
-            </a:r>
-            <a:endParaRPr lang="en-US" sz="1400" dirty="0">
+              <a:rPr lang="en-US" sz="1000" dirty="0" err="1">
+                <a:solidFill>
+                  <a:schemeClr val="tx1"/>
+                </a:solidFill>
+              </a:rPr>
+              <a:t>example_tank</a:t>
+            </a:r>
+            <a:r>
+              <a:rPr lang="en-US" sz="1000" dirty="0">
+                <a:solidFill>
+                  <a:schemeClr val="tx1"/>
+                </a:solidFill>
+              </a:rPr>
+              <a:t>/Tank </a:t>
+            </a:r>
+            <a:r>
+              <a:rPr lang="en-US" sz="1000" dirty="0" err="1">
+                <a:solidFill>
+                  <a:schemeClr val="tx1"/>
+                </a:solidFill>
+              </a:rPr>
+              <a:t>Analysis.ipynb</a:t>
+            </a:r>
+            <a:endParaRPr lang="en-US" sz="1000" dirty="0">
               <a:solidFill>
                 <a:schemeClr val="tx1"/>
               </a:solidFill>
             </a:endParaRPr>
           </a:p>
-        </p:txBody>
-      </p:sp>
-      <p:sp>
-        <p:nvSpPr>
-          <p:cNvPr id="25" name="Flowchart: Process 24">
-            <a:extLst>
-              <a:ext uri="{FF2B5EF4-FFF2-40B4-BE49-F238E27FC236}">
-                <a16:creationId xmlns:a16="http://schemas.microsoft.com/office/drawing/2014/main" id="{8B1382E9-DCDF-429F-8209-AC2309FE35DF}"/>
+          <a:p>
+            <a:pPr algn="ctr"/>
+            <a:r>
+              <a:rPr lang="en-US" sz="1000" dirty="0">
+                <a:solidFill>
+                  <a:schemeClr val="tx1"/>
+                </a:solidFill>
+              </a:rPr>
+              <a:t>/</a:t>
+            </a:r>
+            <a:r>
+              <a:rPr lang="en-US" sz="1000" dirty="0" err="1">
+                <a:solidFill>
+                  <a:schemeClr val="tx1"/>
+                </a:solidFill>
+              </a:rPr>
+              <a:t>example_eps</a:t>
+            </a:r>
+            <a:r>
+              <a:rPr lang="en-US" sz="1000" dirty="0">
+                <a:solidFill>
+                  <a:schemeClr val="tx1"/>
+                </a:solidFill>
+              </a:rPr>
+              <a:t>/EPS Example </a:t>
+            </a:r>
+            <a:r>
+              <a:rPr lang="en-US" sz="1000" dirty="0" err="1">
+                <a:solidFill>
+                  <a:schemeClr val="tx1"/>
+                </a:solidFill>
+              </a:rPr>
+              <a:t>Notebook.ipynb</a:t>
+            </a:r>
+            <a:endParaRPr lang="en-US" sz="1000" dirty="0">
+              <a:solidFill>
+                <a:schemeClr val="tx1"/>
+              </a:solidFill>
+            </a:endParaRPr>
+          </a:p>
+        </p:txBody>
+      </p:sp>
+      <p:sp>
+        <p:nvSpPr>
+          <p:cNvPr id="8" name="Flowchart: Process 7">
+            <a:extLst>
+              <a:ext uri="{FF2B5EF4-FFF2-40B4-BE49-F238E27FC236}">
+                <a16:creationId xmlns:a16="http://schemas.microsoft.com/office/drawing/2014/main" id="{E3C66144-7E0B-7F30-B41D-AE677CD9448E}"/>
               </a:ext>
             </a:extLst>
           </p:cNvPr>
@@ -26426,8 +26654,8 @@
         </p:nvSpPr>
         <p:spPr>
           <a:xfrm>
-            <a:off x="7802397" y="3129022"/>
-            <a:ext cx="3221549" cy="737999"/>
+            <a:off x="7817738" y="2670499"/>
+            <a:ext cx="3536062" cy="1162450"/>
           </a:xfrm>
           <a:prstGeom prst="flowChartProcess">
             <a:avLst/>
@@ -26471,44 +26699,9 @@
                   <a:schemeClr val="tx1"/>
                 </a:solidFill>
               </a:rPr>
-              <a:t>9. Further Examples</a:t>
-            </a:r>
-          </a:p>
-          <a:p>
-            <a:pPr algn="ctr"/>
-            <a:r>
-              <a:rPr lang="en-US" sz="1200" dirty="0">
-                <a:solidFill>
-                  <a:schemeClr val="tx1"/>
-                </a:solidFill>
-              </a:rPr>
-              <a:t>/</a:t>
-            </a:r>
-            <a:r>
-              <a:rPr lang="en-US" sz="1200" dirty="0" err="1">
-                <a:solidFill>
-                  <a:schemeClr val="tx1"/>
-                </a:solidFill>
-              </a:rPr>
-              <a:t>example_tank</a:t>
-            </a:r>
-            <a:r>
-              <a:rPr lang="en-US" sz="1200" dirty="0">
-                <a:solidFill>
-                  <a:schemeClr val="tx1"/>
-                </a:solidFill>
-              </a:rPr>
-              <a:t>/Tank </a:t>
-            </a:r>
-            <a:r>
-              <a:rPr lang="en-US" sz="1200" dirty="0" err="1">
-                <a:solidFill>
-                  <a:schemeClr val="tx1"/>
-                </a:solidFill>
-              </a:rPr>
-              <a:t>Analysis.ipynb</a:t>
-            </a:r>
-            <a:endParaRPr lang="en-US" sz="1200" dirty="0">
+              <a:t>10. Optimization</a:t>
+            </a:r>
+            <a:endParaRPr lang="en-US" sz="1600" dirty="0">
               <a:solidFill>
                 <a:schemeClr val="tx1"/>
               </a:solidFill>
@@ -26517,7 +26710,7 @@
           <a:p>
             <a:pPr algn="ctr"/>
             <a:r>
-              <a:rPr lang="en-US" sz="1200" dirty="0">
+              <a:rPr lang="en-US" sz="1000" dirty="0">
                 <a:solidFill>
                   <a:schemeClr val="tx1"/>
                 </a:solidFill>
@@ -26525,30 +26718,708 @@
               <a:t>/</a:t>
             </a:r>
             <a:r>
-              <a:rPr lang="en-US" sz="1200" dirty="0" err="1">
-                <a:solidFill>
-                  <a:schemeClr val="tx1"/>
-                </a:solidFill>
-              </a:rPr>
-              <a:t>example_eps</a:t>
-            </a:r>
-            <a:r>
-              <a:rPr lang="en-US" sz="1200" dirty="0">
-                <a:solidFill>
-                  <a:schemeClr val="tx1"/>
-                </a:solidFill>
-              </a:rPr>
-              <a:t>/EPS Example </a:t>
-            </a:r>
-            <a:r>
-              <a:rPr lang="en-US" sz="1200" dirty="0" err="1">
+              <a:rPr lang="en-US" sz="1000" dirty="0" err="1">
+                <a:solidFill>
+                  <a:schemeClr val="tx1"/>
+                </a:solidFill>
+              </a:rPr>
+              <a:t>example_rover</a:t>
+            </a:r>
+            <a:r>
+              <a:rPr lang="en-US" sz="1000" dirty="0">
+                <a:solidFill>
+                  <a:schemeClr val="tx1"/>
+                </a:solidFill>
+              </a:rPr>
+              <a:t>/optimization/Rover Response </a:t>
+            </a:r>
+            <a:r>
+              <a:rPr lang="en-US" sz="1000" dirty="0" err="1">
+                <a:solidFill>
+                  <a:schemeClr val="tx1"/>
+                </a:solidFill>
+              </a:rPr>
+              <a:t>Optimization.ipynb</a:t>
+            </a:r>
+            <a:endParaRPr lang="en-US" sz="1000" dirty="0">
+              <a:solidFill>
+                <a:schemeClr val="tx1"/>
+              </a:solidFill>
+            </a:endParaRPr>
+          </a:p>
+          <a:p>
+            <a:pPr algn="ctr"/>
+            <a:r>
+              <a:rPr lang="en-US" sz="1000" dirty="0">
+                <a:solidFill>
+                  <a:schemeClr val="tx1"/>
+                </a:solidFill>
+              </a:rPr>
+              <a:t>/</a:t>
+            </a:r>
+            <a:r>
+              <a:rPr lang="en-US" sz="1000" dirty="0" err="1">
+                <a:solidFill>
+                  <a:schemeClr val="tx1"/>
+                </a:solidFill>
+              </a:rPr>
+              <a:t>example_multirotor</a:t>
+            </a:r>
+            <a:r>
+              <a:rPr lang="en-US" sz="1000" dirty="0">
+                <a:solidFill>
+                  <a:schemeClr val="tx1"/>
+                </a:solidFill>
+              </a:rPr>
+              <a:t>/Multirotor </a:t>
+            </a:r>
+            <a:r>
+              <a:rPr lang="en-US" sz="1000" dirty="0" err="1">
+                <a:solidFill>
+                  <a:schemeClr val="tx1"/>
+                </a:solidFill>
+              </a:rPr>
+              <a:t>Optimization.ipynb</a:t>
+            </a:r>
+            <a:endParaRPr lang="en-US" sz="1000" dirty="0">
+              <a:solidFill>
+                <a:schemeClr val="tx1"/>
+              </a:solidFill>
+            </a:endParaRPr>
+          </a:p>
+          <a:p>
+            <a:pPr algn="ctr"/>
+            <a:r>
+              <a:rPr lang="en-US" sz="1000" dirty="0">
+                <a:solidFill>
+                  <a:schemeClr val="tx1"/>
+                </a:solidFill>
+              </a:rPr>
+              <a:t>/</a:t>
+            </a:r>
+            <a:r>
+              <a:rPr lang="en-US" sz="1000" dirty="0" err="1">
+                <a:solidFill>
+                  <a:schemeClr val="tx1"/>
+                </a:solidFill>
+              </a:rPr>
+              <a:t>example_pump</a:t>
+            </a:r>
+            <a:r>
+              <a:rPr lang="en-US" sz="1000" dirty="0">
+                <a:solidFill>
+                  <a:schemeClr val="tx1"/>
+                </a:solidFill>
+              </a:rPr>
+              <a:t>/</a:t>
+            </a:r>
+            <a:r>
+              <a:rPr lang="en-US" sz="1000" dirty="0" err="1">
+                <a:solidFill>
+                  <a:schemeClr val="tx1"/>
+                </a:solidFill>
+              </a:rPr>
+              <a:t>Optimization.ipynb</a:t>
+            </a:r>
+            <a:endParaRPr lang="en-US" sz="1000" dirty="0">
+              <a:solidFill>
+                <a:schemeClr val="tx1"/>
+              </a:solidFill>
+            </a:endParaRPr>
+          </a:p>
+          <a:p>
+            <a:pPr algn="ctr"/>
+            <a:r>
+              <a:rPr lang="en-US" sz="1000" dirty="0">
+                <a:solidFill>
+                  <a:schemeClr val="tx1"/>
+                </a:solidFill>
+              </a:rPr>
+              <a:t>/</a:t>
+            </a:r>
+            <a:r>
+              <a:rPr lang="en-US" sz="1000" dirty="0" err="1">
+                <a:solidFill>
+                  <a:schemeClr val="tx1"/>
+                </a:solidFill>
+              </a:rPr>
+              <a:t>example_tank</a:t>
+            </a:r>
+            <a:r>
+              <a:rPr lang="en-US" sz="1000" dirty="0">
+                <a:solidFill>
+                  <a:schemeClr val="tx1"/>
+                </a:solidFill>
+              </a:rPr>
+              <a:t>/Tank </a:t>
+            </a:r>
+            <a:r>
+              <a:rPr lang="en-US" sz="1000" dirty="0" err="1">
+                <a:solidFill>
+                  <a:schemeClr val="tx1"/>
+                </a:solidFill>
+              </a:rPr>
+              <a:t>Optimization.ipynb</a:t>
+            </a:r>
+            <a:endParaRPr lang="en-US" sz="1000" dirty="0">
+              <a:solidFill>
+                <a:schemeClr val="tx1"/>
+              </a:solidFill>
+            </a:endParaRPr>
+          </a:p>
+        </p:txBody>
+      </p:sp>
+      <p:sp>
+        <p:nvSpPr>
+          <p:cNvPr id="12" name="Flowchart: Process 11">
+            <a:extLst>
+              <a:ext uri="{FF2B5EF4-FFF2-40B4-BE49-F238E27FC236}">
+                <a16:creationId xmlns:a16="http://schemas.microsoft.com/office/drawing/2014/main" id="{8CBE7008-8103-C4EE-4299-63096F25E10D}"/>
+              </a:ext>
+            </a:extLst>
+          </p:cNvPr>
+          <p:cNvSpPr/>
+          <p:nvPr/>
+        </p:nvSpPr>
+        <p:spPr>
+          <a:xfrm>
+            <a:off x="708600" y="3693245"/>
+            <a:ext cx="2774400" cy="947432"/>
+          </a:xfrm>
+          <a:prstGeom prst="flowChartProcess">
+            <a:avLst/>
+          </a:prstGeom>
+          <a:solidFill>
+            <a:schemeClr val="bg1"/>
+          </a:solidFill>
+          <a:ln w="38100">
+            <a:solidFill>
+              <a:schemeClr val="tx1">
+                <a:lumMod val="50000"/>
+                <a:lumOff val="50000"/>
+              </a:schemeClr>
+            </a:solidFill>
+          </a:ln>
+        </p:spPr>
+        <p:style>
+          <a:lnRef idx="2">
+            <a:schemeClr val="accent1">
+              <a:shade val="50000"/>
+            </a:schemeClr>
+          </a:lnRef>
+          <a:fillRef idx="1">
+            <a:schemeClr val="accent1"/>
+          </a:fillRef>
+          <a:effectRef idx="0">
+            <a:schemeClr val="accent1"/>
+          </a:effectRef>
+          <a:fontRef idx="minor">
+            <a:schemeClr val="lt1"/>
+          </a:fontRef>
+        </p:style>
+        <p:txBody>
+          <a:bodyPr rtlCol="0" anchor="ctr"/>
+          <a:lstStyle/>
+          <a:p>
+            <a:pPr algn="ctr"/>
+            <a:r>
+              <a:rPr lang="en-US" b="1" dirty="0">
+                <a:solidFill>
+                  <a:schemeClr val="tx1"/>
+                </a:solidFill>
+              </a:rPr>
+              <a:t>4. Human Modelling</a:t>
+            </a:r>
+          </a:p>
+          <a:p>
+            <a:pPr algn="ctr"/>
+            <a:r>
+              <a:rPr lang="en-US" sz="1000" dirty="0">
+                <a:solidFill>
+                  <a:schemeClr val="tx1"/>
+                </a:solidFill>
+              </a:rPr>
+              <a:t>/</a:t>
+            </a:r>
+            <a:r>
+              <a:rPr lang="en-US" sz="1000" dirty="0" err="1">
+                <a:solidFill>
+                  <a:schemeClr val="tx1"/>
+                </a:solidFill>
+              </a:rPr>
+              <a:t>example_rover</a:t>
+            </a:r>
+            <a:r>
+              <a:rPr lang="en-US" sz="1000" dirty="0">
+                <a:solidFill>
+                  <a:schemeClr val="tx1"/>
+                </a:solidFill>
+              </a:rPr>
+              <a:t>/Rover Setup </a:t>
+            </a:r>
+            <a:r>
+              <a:rPr lang="en-US" sz="1000" dirty="0" err="1">
                 <a:solidFill>
                   <a:schemeClr val="tx1"/>
                 </a:solidFill>
               </a:rPr>
               <a:t>Notebook.ipynb</a:t>
             </a:r>
-            <a:endParaRPr lang="en-US" sz="1200" dirty="0">
+            <a:endParaRPr lang="en-US" sz="1000" dirty="0">
+              <a:solidFill>
+                <a:schemeClr val="tx1"/>
+              </a:solidFill>
+            </a:endParaRPr>
+          </a:p>
+          <a:p>
+            <a:pPr marL="0" marR="0" lvl="0" indent="0" algn="ctr" defTabSz="914400" rtl="0" eaLnBrk="1" fontAlgn="auto" latinLnBrk="0" hangingPunct="1">
+              <a:lnSpc>
+                <a:spcPct val="100000"/>
+              </a:lnSpc>
+              <a:spcBef>
+                <a:spcPts val="0"/>
+              </a:spcBef>
+              <a:spcAft>
+                <a:spcPts val="0"/>
+              </a:spcAft>
+              <a:buClrTx/>
+              <a:buSzTx/>
+              <a:buFontTx/>
+              <a:buNone/>
+              <a:tabLst/>
+              <a:defRPr/>
+            </a:pPr>
+            <a:r>
+              <a:rPr kumimoji="0" lang="en-US" sz="1000" b="0" i="0" u="none" strike="noStrike" kern="1200" cap="none" spc="0" normalizeH="0" baseline="0" noProof="0" dirty="0">
+                <a:ln>
+                  <a:noFill/>
+                </a:ln>
+                <a:solidFill>
+                  <a:prstClr val="black"/>
+                </a:solidFill>
+                <a:effectLst/>
+                <a:uLnTx/>
+                <a:uFillTx/>
+                <a:latin typeface="Calibri" panose="020F0502020204030204"/>
+                <a:ea typeface="+mn-ea"/>
+                <a:cs typeface="+mn-cs"/>
+              </a:rPr>
+              <a:t>/</a:t>
+            </a:r>
+            <a:r>
+              <a:rPr kumimoji="0" lang="en-US" sz="1000" b="0" i="0" u="none" strike="noStrike" kern="1200" cap="none" spc="0" normalizeH="0" baseline="0" noProof="0" dirty="0" err="1">
+                <a:ln>
+                  <a:noFill/>
+                </a:ln>
+                <a:solidFill>
+                  <a:prstClr val="black"/>
+                </a:solidFill>
+                <a:effectLst/>
+                <a:uLnTx/>
+                <a:uFillTx/>
+                <a:latin typeface="Calibri" panose="020F0502020204030204"/>
+                <a:ea typeface="+mn-ea"/>
+                <a:cs typeface="+mn-cs"/>
+              </a:rPr>
+              <a:t>example_rover</a:t>
+            </a:r>
+            <a:r>
+              <a:rPr kumimoji="0" lang="en-US" sz="1000" b="0" i="0" u="none" strike="noStrike" kern="1200" cap="none" spc="0" normalizeH="0" baseline="0" noProof="0" dirty="0">
+                <a:ln>
+                  <a:noFill/>
+                </a:ln>
+                <a:solidFill>
+                  <a:prstClr val="black"/>
+                </a:solidFill>
+                <a:effectLst/>
+                <a:uLnTx/>
+                <a:uFillTx/>
+                <a:latin typeface="Calibri" panose="020F0502020204030204"/>
+                <a:ea typeface="+mn-ea"/>
+                <a:cs typeface="+mn-cs"/>
+              </a:rPr>
+              <a:t>/HFAC </a:t>
+            </a:r>
+            <a:r>
+              <a:rPr kumimoji="0" lang="en-US" sz="1000" b="0" i="0" u="none" strike="noStrike" kern="1200" cap="none" spc="0" normalizeH="0" baseline="0" noProof="0" dirty="0" err="1">
+                <a:ln>
+                  <a:noFill/>
+                </a:ln>
+                <a:solidFill>
+                  <a:prstClr val="black"/>
+                </a:solidFill>
+                <a:effectLst/>
+                <a:uLnTx/>
+                <a:uFillTx/>
+                <a:latin typeface="Calibri" panose="020F0502020204030204"/>
+                <a:ea typeface="+mn-ea"/>
+                <a:cs typeface="+mn-cs"/>
+              </a:rPr>
+              <a:t>Analyses.ipynb</a:t>
+            </a:r>
+            <a:endParaRPr kumimoji="0" lang="en-US" sz="1000" b="0" i="0" u="none" strike="noStrike" kern="1200" cap="none" spc="0" normalizeH="0" baseline="0" noProof="0" dirty="0">
+              <a:ln>
+                <a:noFill/>
+              </a:ln>
+              <a:solidFill>
+                <a:prstClr val="black"/>
+              </a:solidFill>
+              <a:effectLst/>
+              <a:uLnTx/>
+              <a:uFillTx/>
+              <a:latin typeface="Calibri" panose="020F0502020204030204"/>
+              <a:ea typeface="+mn-ea"/>
+              <a:cs typeface="+mn-cs"/>
+            </a:endParaRPr>
+          </a:p>
+          <a:p>
+            <a:pPr marL="0" marR="0" lvl="0" indent="0" algn="ctr" defTabSz="914400" rtl="0" eaLnBrk="1" fontAlgn="auto" latinLnBrk="0" hangingPunct="1">
+              <a:lnSpc>
+                <a:spcPct val="100000"/>
+              </a:lnSpc>
+              <a:spcBef>
+                <a:spcPts val="0"/>
+              </a:spcBef>
+              <a:spcAft>
+                <a:spcPts val="0"/>
+              </a:spcAft>
+              <a:buClrTx/>
+              <a:buSzTx/>
+              <a:buFontTx/>
+              <a:buNone/>
+              <a:tabLst/>
+              <a:defRPr/>
+            </a:pPr>
+            <a:r>
+              <a:rPr kumimoji="0" lang="en-US" sz="1000" b="0" i="0" u="none" strike="noStrike" kern="1200" cap="none" spc="0" normalizeH="0" baseline="0" noProof="0" dirty="0">
+                <a:ln>
+                  <a:noFill/>
+                </a:ln>
+                <a:solidFill>
+                  <a:prstClr val="black"/>
+                </a:solidFill>
+                <a:effectLst/>
+                <a:uLnTx/>
+                <a:uFillTx/>
+                <a:latin typeface="Calibri" panose="020F0502020204030204"/>
+                <a:ea typeface="+mn-ea"/>
+                <a:cs typeface="+mn-cs"/>
+              </a:rPr>
+              <a:t>/</a:t>
+            </a:r>
+            <a:r>
+              <a:rPr kumimoji="0" lang="en-US" sz="1000" b="0" i="0" u="none" strike="noStrike" kern="1200" cap="none" spc="0" normalizeH="0" baseline="0" noProof="0" dirty="0" err="1">
+                <a:ln>
+                  <a:noFill/>
+                </a:ln>
+                <a:solidFill>
+                  <a:prstClr val="black"/>
+                </a:solidFill>
+                <a:effectLst/>
+                <a:uLnTx/>
+                <a:uFillTx/>
+                <a:latin typeface="Calibri" panose="020F0502020204030204"/>
+                <a:ea typeface="+mn-ea"/>
+                <a:cs typeface="+mn-cs"/>
+              </a:rPr>
+              <a:t>example_rover</a:t>
+            </a:r>
+            <a:r>
+              <a:rPr kumimoji="0" lang="en-US" sz="1000" b="0" i="0" u="none" strike="noStrike" kern="1200" cap="none" spc="0" normalizeH="0" baseline="0" noProof="0" dirty="0">
+                <a:ln>
+                  <a:noFill/>
+                </a:ln>
+                <a:solidFill>
+                  <a:prstClr val="black"/>
+                </a:solidFill>
+                <a:effectLst/>
+                <a:uLnTx/>
+                <a:uFillTx/>
+                <a:latin typeface="Calibri" panose="020F0502020204030204"/>
+                <a:ea typeface="+mn-ea"/>
+                <a:cs typeface="+mn-cs"/>
+              </a:rPr>
+              <a:t>/</a:t>
+            </a:r>
+            <a:r>
+              <a:rPr kumimoji="0" lang="en-US" sz="1000" b="0" i="0" u="none" strike="noStrike" kern="1200" cap="none" spc="0" normalizeH="0" baseline="0" noProof="0" dirty="0" err="1">
+                <a:ln>
+                  <a:noFill/>
+                </a:ln>
+                <a:solidFill>
+                  <a:prstClr val="black"/>
+                </a:solidFill>
+                <a:effectLst/>
+                <a:uLnTx/>
+                <a:uFillTx/>
+                <a:latin typeface="Calibri" panose="020F0502020204030204"/>
+                <a:ea typeface="+mn-ea"/>
+                <a:cs typeface="+mn-cs"/>
+              </a:rPr>
+              <a:t>IDETC_Human_Paper_Analysis.ipynb</a:t>
+            </a:r>
+            <a:endParaRPr kumimoji="0" lang="en-US" sz="1000" b="0" i="0" u="none" strike="noStrike" kern="1200" cap="none" spc="0" normalizeH="0" baseline="0" noProof="0" dirty="0">
+              <a:ln>
+                <a:noFill/>
+              </a:ln>
+              <a:solidFill>
+                <a:prstClr val="black"/>
+              </a:solidFill>
+              <a:effectLst/>
+              <a:uLnTx/>
+              <a:uFillTx/>
+              <a:latin typeface="Calibri" panose="020F0502020204030204"/>
+              <a:ea typeface="+mn-ea"/>
+              <a:cs typeface="+mn-cs"/>
+            </a:endParaRPr>
+          </a:p>
+        </p:txBody>
+      </p:sp>
+      <p:sp>
+        <p:nvSpPr>
+          <p:cNvPr id="13" name="Flowchart: Process 12">
+            <a:extLst>
+              <a:ext uri="{FF2B5EF4-FFF2-40B4-BE49-F238E27FC236}">
+                <a16:creationId xmlns:a16="http://schemas.microsoft.com/office/drawing/2014/main" id="{566EF60A-E076-5748-46E2-91A55F4718AF}"/>
+              </a:ext>
+            </a:extLst>
+          </p:cNvPr>
+          <p:cNvSpPr/>
+          <p:nvPr/>
+        </p:nvSpPr>
+        <p:spPr>
+          <a:xfrm>
+            <a:off x="7817738" y="1870076"/>
+            <a:ext cx="3536062" cy="814622"/>
+          </a:xfrm>
+          <a:prstGeom prst="flowChartProcess">
+            <a:avLst/>
+          </a:prstGeom>
+          <a:solidFill>
+            <a:schemeClr val="bg1"/>
+          </a:solidFill>
+          <a:ln w="38100">
+            <a:solidFill>
+              <a:schemeClr val="tx1">
+                <a:lumMod val="50000"/>
+                <a:lumOff val="50000"/>
+              </a:schemeClr>
+            </a:solidFill>
+          </a:ln>
+        </p:spPr>
+        <p:style>
+          <a:lnRef idx="2">
+            <a:schemeClr val="accent1">
+              <a:shade val="50000"/>
+            </a:schemeClr>
+          </a:lnRef>
+          <a:fillRef idx="1">
+            <a:schemeClr val="accent1"/>
+          </a:fillRef>
+          <a:effectRef idx="0">
+            <a:schemeClr val="accent1"/>
+          </a:effectRef>
+          <a:fontRef idx="minor">
+            <a:schemeClr val="lt1"/>
+          </a:fontRef>
+        </p:style>
+        <p:txBody>
+          <a:bodyPr rtlCol="0" anchor="ctr"/>
+          <a:lstStyle/>
+          <a:p>
+            <a:pPr algn="ctr"/>
+            <a:r>
+              <a:rPr lang="en-US" b="1" dirty="0">
+                <a:solidFill>
+                  <a:schemeClr val="tx1"/>
+                </a:solidFill>
+              </a:rPr>
+              <a:t>9. Advanced Scenario Sampling</a:t>
+            </a:r>
+          </a:p>
+          <a:p>
+            <a:pPr algn="ctr"/>
+            <a:r>
+              <a:rPr lang="en-US" sz="1000" dirty="0">
+                <a:solidFill>
+                  <a:schemeClr val="tx1"/>
+                </a:solidFill>
+              </a:rPr>
+              <a:t>/</a:t>
+            </a:r>
+            <a:r>
+              <a:rPr lang="en-US" sz="1000" dirty="0" err="1">
+                <a:solidFill>
+                  <a:schemeClr val="tx1"/>
+                </a:solidFill>
+              </a:rPr>
+              <a:t>example_rover</a:t>
+            </a:r>
+            <a:r>
+              <a:rPr lang="en-US" sz="1000" dirty="0">
+                <a:solidFill>
+                  <a:schemeClr val="tx1"/>
+                </a:solidFill>
+              </a:rPr>
+              <a:t>/</a:t>
+            </a:r>
+            <a:r>
+              <a:rPr lang="en-US" sz="1000" dirty="0" err="1">
+                <a:solidFill>
+                  <a:schemeClr val="tx1"/>
+                </a:solidFill>
+              </a:rPr>
+              <a:t>fault_sampling</a:t>
+            </a:r>
+            <a:r>
+              <a:rPr lang="en-US" sz="1000" dirty="0">
+                <a:solidFill>
+                  <a:schemeClr val="tx1"/>
+                </a:solidFill>
+              </a:rPr>
+              <a:t>/Rover Mode </a:t>
+            </a:r>
+            <a:r>
+              <a:rPr lang="en-US" sz="1000" dirty="0" err="1">
+                <a:solidFill>
+                  <a:schemeClr val="tx1"/>
+                </a:solidFill>
+              </a:rPr>
+              <a:t>Notebook.ipynb</a:t>
+            </a:r>
+            <a:endParaRPr lang="en-US" sz="1000" dirty="0">
+              <a:solidFill>
+                <a:schemeClr val="tx1"/>
+              </a:solidFill>
+            </a:endParaRPr>
+          </a:p>
+          <a:p>
+            <a:pPr algn="ctr"/>
+            <a:r>
+              <a:rPr lang="en-US" sz="1000" dirty="0">
+                <a:solidFill>
+                  <a:schemeClr val="tx1"/>
+                </a:solidFill>
+              </a:rPr>
+              <a:t>/</a:t>
+            </a:r>
+            <a:r>
+              <a:rPr lang="en-US" sz="1000" dirty="0" err="1">
+                <a:solidFill>
+                  <a:schemeClr val="tx1"/>
+                </a:solidFill>
+              </a:rPr>
+              <a:t>example_pump</a:t>
+            </a:r>
+            <a:r>
+              <a:rPr lang="en-US" sz="1000" dirty="0">
+                <a:solidFill>
+                  <a:schemeClr val="tx1"/>
+                </a:solidFill>
+              </a:rPr>
+              <a:t>/</a:t>
+            </a:r>
+            <a:r>
+              <a:rPr lang="en-US" sz="1000" dirty="0" err="1">
+                <a:solidFill>
+                  <a:schemeClr val="tx1"/>
+                </a:solidFill>
+              </a:rPr>
+              <a:t>AST_Sampling.ipynb</a:t>
+            </a:r>
+            <a:endParaRPr lang="en-US" sz="1000" dirty="0">
+              <a:solidFill>
+                <a:schemeClr val="tx1"/>
+              </a:solidFill>
+            </a:endParaRPr>
+          </a:p>
+          <a:p>
+            <a:pPr marL="0" marR="0" lvl="0" indent="0" algn="ctr" defTabSz="914400" rtl="0" eaLnBrk="1" fontAlgn="auto" latinLnBrk="0" hangingPunct="1">
+              <a:lnSpc>
+                <a:spcPct val="100000"/>
+              </a:lnSpc>
+              <a:spcBef>
+                <a:spcPts val="0"/>
+              </a:spcBef>
+              <a:spcAft>
+                <a:spcPts val="0"/>
+              </a:spcAft>
+              <a:buClrTx/>
+              <a:buSzTx/>
+              <a:buFontTx/>
+              <a:buNone/>
+              <a:tabLst/>
+              <a:defRPr/>
+            </a:pPr>
+            <a:r>
+              <a:rPr kumimoji="0" lang="en-US" sz="1000" b="0" i="0" u="none" strike="noStrike" kern="1200" cap="none" spc="0" normalizeH="0" baseline="0" noProof="0" dirty="0">
+                <a:ln>
+                  <a:noFill/>
+                </a:ln>
+                <a:solidFill>
+                  <a:prstClr val="black"/>
+                </a:solidFill>
+                <a:effectLst/>
+                <a:uLnTx/>
+                <a:uFillTx/>
+                <a:latin typeface="Calibri" panose="020F0502020204030204"/>
+                <a:ea typeface="+mn-ea"/>
+                <a:cs typeface="+mn-cs"/>
+              </a:rPr>
+              <a:t>/</a:t>
+            </a:r>
+            <a:r>
+              <a:rPr kumimoji="0" lang="en-US" sz="1000" b="0" i="0" u="none" strike="noStrike" kern="1200" cap="none" spc="0" normalizeH="0" baseline="0" noProof="0" dirty="0" err="1">
+                <a:ln>
+                  <a:noFill/>
+                </a:ln>
+                <a:solidFill>
+                  <a:prstClr val="black"/>
+                </a:solidFill>
+                <a:effectLst/>
+                <a:uLnTx/>
+                <a:uFillTx/>
+                <a:latin typeface="Calibri" panose="020F0502020204030204"/>
+                <a:ea typeface="+mn-ea"/>
+                <a:cs typeface="+mn-cs"/>
+              </a:rPr>
+              <a:t>example_rover</a:t>
+            </a:r>
+            <a:r>
+              <a:rPr kumimoji="0" lang="en-US" sz="1000" b="0" i="0" u="none" strike="noStrike" kern="1200" cap="none" spc="0" normalizeH="0" baseline="0" noProof="0" dirty="0">
+                <a:ln>
+                  <a:noFill/>
+                </a:ln>
+                <a:solidFill>
+                  <a:prstClr val="black"/>
+                </a:solidFill>
+                <a:effectLst/>
+                <a:uLnTx/>
+                <a:uFillTx/>
+                <a:latin typeface="Calibri" panose="020F0502020204030204"/>
+                <a:ea typeface="+mn-ea"/>
+                <a:cs typeface="+mn-cs"/>
+              </a:rPr>
+              <a:t>/optimization/Search </a:t>
+            </a:r>
+            <a:r>
+              <a:rPr kumimoji="0" lang="en-US" sz="1000" b="0" i="0" u="none" strike="noStrike" kern="1200" cap="none" spc="0" normalizeH="0" baseline="0" noProof="0" dirty="0" err="1">
+                <a:ln>
+                  <a:noFill/>
+                </a:ln>
+                <a:solidFill>
+                  <a:prstClr val="black"/>
+                </a:solidFill>
+                <a:effectLst/>
+                <a:uLnTx/>
+                <a:uFillTx/>
+                <a:latin typeface="Calibri" panose="020F0502020204030204"/>
+                <a:ea typeface="+mn-ea"/>
+                <a:cs typeface="+mn-cs"/>
+              </a:rPr>
+              <a:t>Comparison.ipynb</a:t>
+            </a:r>
+            <a:endParaRPr lang="en-US" sz="1400" dirty="0">
               <a:solidFill>
                 <a:schemeClr val="tx1"/>
               </a:solidFill>
@@ -26659,7 +27530,7 @@
           <a:p>
             <a:fld id="{37A4B9B3-CD86-4259-A27A-F9B9C6081119}" type="datetime1">
               <a:rPr lang="en-US" smtClean="0"/>
-              <a:t>6/21/2022</a:t>
+              <a:t>12/21/2022</a:t>
             </a:fld>
             <a:endParaRPr lang="en-US"/>
           </a:p>
@@ -28047,7 +28918,7 @@
           <a:p>
             <a:fld id="{97B5B71A-C210-4A41-9D4A-E72BF6E30274}" type="datetime1">
               <a:rPr lang="en-US" smtClean="0"/>
-              <a:t>6/21/2022</a:t>
+              <a:t>12/21/2022</a:t>
             </a:fld>
             <a:endParaRPr lang="en-US"/>
           </a:p>
@@ -30691,7 +31562,7 @@
           <a:p>
             <a:fld id="{4F293EC2-9353-465E-8275-590A21556A4C}" type="datetime1">
               <a:rPr lang="en-US" smtClean="0"/>
-              <a:t>6/21/2022</a:t>
+              <a:t>12/21/2022</a:t>
             </a:fld>
             <a:endParaRPr lang="en-US"/>
           </a:p>
@@ -32314,7 +33185,7 @@
           <a:p>
             <a:fld id="{BFA3C805-31B6-4A11-AAC4-FD0B22218204}" type="datetime1">
               <a:rPr lang="en-US" smtClean="0"/>
-              <a:t>6/21/2022</a:t>
+              <a:t>12/21/2022</a:t>
             </a:fld>
             <a:endParaRPr lang="en-US"/>
           </a:p>
@@ -32550,7 +33421,7 @@
           <a:p>
             <a:fld id="{2EF51449-35FB-44B7-9F78-8BE693FE99B8}" type="datetime1">
               <a:rPr lang="en-US" smtClean="0"/>
-              <a:t>6/21/2022</a:t>
+              <a:t>12/21/2022</a:t>
             </a:fld>
             <a:endParaRPr lang="en-US"/>
           </a:p>
@@ -32750,7 +33621,7 @@
           <a:p>
             <a:fld id="{3CD4156D-2DFA-4CBC-8BBF-D9C396665CA3}" type="datetime1">
               <a:rPr lang="en-US" smtClean="0"/>
-              <a:t>6/21/2022</a:t>
+              <a:t>12/21/2022</a:t>
             </a:fld>
             <a:endParaRPr lang="en-US"/>
           </a:p>
@@ -32874,7 +33745,7 @@
           <a:p>
             <a:fld id="{E8F6B82B-A579-437C-AABB-EF257589C124}" type="datetime1">
               <a:rPr lang="en-US" smtClean="0"/>
-              <a:t>6/21/2022</a:t>
+              <a:t>12/21/2022</a:t>
             </a:fld>
             <a:endParaRPr lang="en-US"/>
           </a:p>
@@ -34796,6 +35667,15 @@
 </file>
 
 <file path=customXml/item1.xml><?xml version="1.0" encoding="utf-8"?>
+<?mso-contentType ?>
+<FormTemplates xmlns="http://schemas.microsoft.com/sharepoint/v3/contenttype/forms">
+  <Display>DocumentLibraryForm</Display>
+  <Edit>DocumentLibraryForm</Edit>
+  <New>DocumentLibraryForm</New>
+</FormTemplates>
+</file>
+
+<file path=customXml/item2.xml><?xml version="1.0" encoding="utf-8"?>
 <ct:contentTypeSchema xmlns:ct="http://schemas.microsoft.com/office/2006/metadata/contentType" xmlns:ma="http://schemas.microsoft.com/office/2006/metadata/properties/metaAttributes" ct:_="" ma:_="" ma:contentTypeName="Document" ma:contentTypeID="0x0101002F0B4413AAFFE34B9A5E0B87EBB2BF4F" ma:contentTypeVersion="0" ma:contentTypeDescription="Create a new document." ma:contentTypeScope="" ma:versionID="9632435baf965c6c093711282b9a8698">
   <xsd:schema xmlns:xsd="http://www.w3.org/2001/XMLSchema" xmlns:xs="http://www.w3.org/2001/XMLSchema" xmlns:p="http://schemas.microsoft.com/office/2006/metadata/properties" targetNamespace="http://schemas.microsoft.com/office/2006/metadata/properties" ma:root="true" ma:fieldsID="ad47a0f10127d9e30d85633090e6731d">
     <xsd:element name="properties">
@@ -34909,15 +35789,6 @@
 </ct:contentTypeSchema>
 </file>
 
-<file path=customXml/item2.xml><?xml version="1.0" encoding="utf-8"?>
-<?mso-contentType ?>
-<FormTemplates xmlns="http://schemas.microsoft.com/sharepoint/v3/contenttype/forms">
-  <Display>DocumentLibraryForm</Display>
-  <Edit>DocumentLibraryForm</Edit>
-  <New>DocumentLibraryForm</New>
-</FormTemplates>
-</file>
-
 <file path=customXml/item3.xml><?xml version="1.0" encoding="utf-8"?>
 <p:properties xmlns:p="http://schemas.microsoft.com/office/2006/metadata/properties" xmlns:xsi="http://www.w3.org/2001/XMLSchema-instance" xmlns:pc="http://schemas.microsoft.com/office/infopath/2007/PartnerControls">
   <documentManagement/>
@@ -34925,6 +35796,14 @@
 </file>
 
 <file path=customXml/itemProps1.xml><?xml version="1.0" encoding="utf-8"?>
+<ds:datastoreItem xmlns:ds="http://schemas.openxmlformats.org/officeDocument/2006/customXml" ds:itemID="{D3728C9A-7C9B-4A99-A7F5-4857043C7DB3}">
+  <ds:schemaRefs>
+    <ds:schemaRef ds:uri="http://schemas.microsoft.com/sharepoint/v3/contenttype/forms"/>
+  </ds:schemaRefs>
+</ds:datastoreItem>
+</file>
+
+<file path=customXml/itemProps2.xml><?xml version="1.0" encoding="utf-8"?>
 <ds:datastoreItem xmlns:ds="http://schemas.openxmlformats.org/officeDocument/2006/customXml" ds:itemID="{8807AEC1-3868-4489-99AA-F6101CBA6951}">
   <ds:schemaRefs>
     <ds:schemaRef ds:uri="http://schemas.microsoft.com/office/2006/metadata/contentType"/>
@@ -34936,14 +35815,6 @@
     <ds:schemaRef ds:uri="http://purl.org/dc/terms/"/>
     <ds:schemaRef ds:uri="http://schemas.microsoft.com/internal/obd"/>
     <ds:schemaRef ds:uri="http://schemas.microsoft.com/office/infopath/2007/PartnerControls"/>
-  </ds:schemaRefs>
-</ds:datastoreItem>
-</file>
-
-<file path=customXml/itemProps2.xml><?xml version="1.0" encoding="utf-8"?>
-<ds:datastoreItem xmlns:ds="http://schemas.openxmlformats.org/officeDocument/2006/customXml" ds:itemID="{D3728C9A-7C9B-4A99-A7F5-4857043C7DB3}">
-  <ds:schemaRefs>
-    <ds:schemaRef ds:uri="http://schemas.microsoft.com/sharepoint/v3/contenttype/forms"/>
   </ds:schemaRefs>
 </ds:datastoreItem>
 </file>

</xml_diff>